<commit_message>
Foundation for applying security camera feed name to monitors
</commit_message>
<xml_diff>
--- a/Assets/Materials + Textures/Personal/Roomnames/Roomnames.pptx
+++ b/Assets/Materials + Textures/Personal/Roomnames/Roomnames.pptx
@@ -7,9 +7,13 @@
   <p:sldIdLst>
     <p:sldId id="257" r:id="rId2"/>
     <p:sldId id="256" r:id="rId3"/>
-    <p:sldId id="260" r:id="rId4"/>
-    <p:sldId id="258" r:id="rId5"/>
-    <p:sldId id="259" r:id="rId6"/>
+    <p:sldId id="261" r:id="rId4"/>
+    <p:sldId id="260" r:id="rId5"/>
+    <p:sldId id="263" r:id="rId6"/>
+    <p:sldId id="264" r:id="rId7"/>
+    <p:sldId id="265" r:id="rId8"/>
+    <p:sldId id="258" r:id="rId9"/>
+    <p:sldId id="259" r:id="rId10"/>
   </p:sldIdLst>
   <p:sldSz cx="12192000" cy="6858000"/>
   <p:notesSz cx="6858000" cy="9144000"/>
@@ -265,7 +269,7 @@
           <a:p>
             <a:fld id="{14389514-1D2E-45F5-8DC5-A75A64E20C29}" type="datetimeFigureOut">
               <a:rPr lang="en-GB" smtClean="0"/>
-              <a:t>16/06/2025</a:t>
+              <a:t>14/08/2025</a:t>
             </a:fld>
             <a:endParaRPr lang="en-GB"/>
           </a:p>
@@ -465,7 +469,7 @@
           <a:p>
             <a:fld id="{14389514-1D2E-45F5-8DC5-A75A64E20C29}" type="datetimeFigureOut">
               <a:rPr lang="en-GB" smtClean="0"/>
-              <a:t>16/06/2025</a:t>
+              <a:t>14/08/2025</a:t>
             </a:fld>
             <a:endParaRPr lang="en-GB"/>
           </a:p>
@@ -675,7 +679,7 @@
           <a:p>
             <a:fld id="{14389514-1D2E-45F5-8DC5-A75A64E20C29}" type="datetimeFigureOut">
               <a:rPr lang="en-GB" smtClean="0"/>
-              <a:t>16/06/2025</a:t>
+              <a:t>14/08/2025</a:t>
             </a:fld>
             <a:endParaRPr lang="en-GB"/>
           </a:p>
@@ -875,7 +879,7 @@
           <a:p>
             <a:fld id="{14389514-1D2E-45F5-8DC5-A75A64E20C29}" type="datetimeFigureOut">
               <a:rPr lang="en-GB" smtClean="0"/>
-              <a:t>16/06/2025</a:t>
+              <a:t>14/08/2025</a:t>
             </a:fld>
             <a:endParaRPr lang="en-GB"/>
           </a:p>
@@ -1151,7 +1155,7 @@
           <a:p>
             <a:fld id="{14389514-1D2E-45F5-8DC5-A75A64E20C29}" type="datetimeFigureOut">
               <a:rPr lang="en-GB" smtClean="0"/>
-              <a:t>16/06/2025</a:t>
+              <a:t>14/08/2025</a:t>
             </a:fld>
             <a:endParaRPr lang="en-GB"/>
           </a:p>
@@ -1419,7 +1423,7 @@
           <a:p>
             <a:fld id="{14389514-1D2E-45F5-8DC5-A75A64E20C29}" type="datetimeFigureOut">
               <a:rPr lang="en-GB" smtClean="0"/>
-              <a:t>16/06/2025</a:t>
+              <a:t>14/08/2025</a:t>
             </a:fld>
             <a:endParaRPr lang="en-GB"/>
           </a:p>
@@ -1834,7 +1838,7 @@
           <a:p>
             <a:fld id="{14389514-1D2E-45F5-8DC5-A75A64E20C29}" type="datetimeFigureOut">
               <a:rPr lang="en-GB" smtClean="0"/>
-              <a:t>16/06/2025</a:t>
+              <a:t>14/08/2025</a:t>
             </a:fld>
             <a:endParaRPr lang="en-GB"/>
           </a:p>
@@ -1976,7 +1980,7 @@
           <a:p>
             <a:fld id="{14389514-1D2E-45F5-8DC5-A75A64E20C29}" type="datetimeFigureOut">
               <a:rPr lang="en-GB" smtClean="0"/>
-              <a:t>16/06/2025</a:t>
+              <a:t>14/08/2025</a:t>
             </a:fld>
             <a:endParaRPr lang="en-GB"/>
           </a:p>
@@ -2089,7 +2093,7 @@
           <a:p>
             <a:fld id="{14389514-1D2E-45F5-8DC5-A75A64E20C29}" type="datetimeFigureOut">
               <a:rPr lang="en-GB" smtClean="0"/>
-              <a:t>16/06/2025</a:t>
+              <a:t>14/08/2025</a:t>
             </a:fld>
             <a:endParaRPr lang="en-GB"/>
           </a:p>
@@ -2402,7 +2406,7 @@
           <a:p>
             <a:fld id="{14389514-1D2E-45F5-8DC5-A75A64E20C29}" type="datetimeFigureOut">
               <a:rPr lang="en-GB" smtClean="0"/>
-              <a:t>16/06/2025</a:t>
+              <a:t>14/08/2025</a:t>
             </a:fld>
             <a:endParaRPr lang="en-GB"/>
           </a:p>
@@ -2691,7 +2695,7 @@
           <a:p>
             <a:fld id="{14389514-1D2E-45F5-8DC5-A75A64E20C29}" type="datetimeFigureOut">
               <a:rPr lang="en-GB" smtClean="0"/>
-              <a:t>16/06/2025</a:t>
+              <a:t>14/08/2025</a:t>
             </a:fld>
             <a:endParaRPr lang="en-GB"/>
           </a:p>
@@ -2934,7 +2938,7 @@
           <a:p>
             <a:fld id="{14389514-1D2E-45F5-8DC5-A75A64E20C29}" type="datetimeFigureOut">
               <a:rPr lang="en-GB" smtClean="0"/>
-              <a:t>16/06/2025</a:t>
+              <a:t>14/08/2025</a:t>
             </a:fld>
             <a:endParaRPr lang="en-GB"/>
           </a:p>
@@ -3424,10 +3428,10 @@
       </p:grpSpPr>
       <p:sp>
         <p:nvSpPr>
-          <p:cNvPr id="5" name="TextBox 4">
-            <a:extLst>
-              <a:ext uri="{FF2B5EF4-FFF2-40B4-BE49-F238E27FC236}">
-                <a16:creationId xmlns:a16="http://schemas.microsoft.com/office/drawing/2014/main" id="{0417B245-8635-3BFA-227D-3B6A74BC08FE}"/>
+          <p:cNvPr id="2" name="TextBox 1">
+            <a:extLst>
+              <a:ext uri="{FF2B5EF4-FFF2-40B4-BE49-F238E27FC236}">
+                <a16:creationId xmlns:a16="http://schemas.microsoft.com/office/drawing/2014/main" id="{6F9A4D01-1960-C905-6308-A9A6DD437A1F}"/>
               </a:ext>
             </a:extLst>
           </p:cNvPr>
@@ -3436,98 +3440,8 @@
         </p:nvSpPr>
         <p:spPr>
           <a:xfrm>
-            <a:off x="347416" y="355590"/>
-            <a:ext cx="5040000" cy="1440000"/>
-          </a:xfrm>
-          <a:prstGeom prst="rect">
-            <a:avLst/>
-          </a:prstGeom>
-          <a:noFill/>
-        </p:spPr>
-        <p:txBody>
-          <a:bodyPr wrap="none" rtlCol="0" anchor="ctr">
-            <a:noAutofit/>
-          </a:bodyPr>
-          <a:lstStyle/>
-          <a:p>
-            <a:pPr algn="ctr"/>
-            <a:r>
-              <a:rPr lang="en-GB" sz="6000" dirty="0">
-                <a:ln w="0"/>
-                <a:effectLst>
-                  <a:outerShdw blurRad="38100" dist="19050" dir="2700000" algn="tl" rotWithShape="0">
-                    <a:schemeClr val="dk1">
-                      <a:alpha val="40000"/>
-                    </a:schemeClr>
-                  </a:outerShdw>
-                </a:effectLst>
-              </a:rPr>
-              <a:t>Ingestion</a:t>
-            </a:r>
-          </a:p>
-        </p:txBody>
-      </p:sp>
-      <p:sp>
-        <p:nvSpPr>
-          <p:cNvPr id="6" name="TextBox 5">
-            <a:extLst>
-              <a:ext uri="{FF2B5EF4-FFF2-40B4-BE49-F238E27FC236}">
-                <a16:creationId xmlns:a16="http://schemas.microsoft.com/office/drawing/2014/main" id="{F4BADA5A-6644-26F4-06CD-E43E557C1F22}"/>
-              </a:ext>
-            </a:extLst>
-          </p:cNvPr>
-          <p:cNvSpPr txBox="1"/>
-          <p:nvPr/>
-        </p:nvSpPr>
-        <p:spPr>
-          <a:xfrm>
-            <a:off x="347416" y="1795590"/>
-            <a:ext cx="5040000" cy="1440000"/>
-          </a:xfrm>
-          <a:prstGeom prst="rect">
-            <a:avLst/>
-          </a:prstGeom>
-          <a:noFill/>
-        </p:spPr>
-        <p:txBody>
-          <a:bodyPr wrap="none" rtlCol="0" anchor="ctr">
-            <a:noAutofit/>
-          </a:bodyPr>
-          <a:lstStyle/>
-          <a:p>
-            <a:pPr algn="ctr"/>
-            <a:r>
-              <a:rPr lang="en-GB" sz="6000" dirty="0">
-                <a:ln w="0"/>
-                <a:effectLst>
-                  <a:outerShdw blurRad="38100" dist="19050" dir="2700000" algn="tl" rotWithShape="0">
-                    <a:schemeClr val="dk1">
-                      <a:alpha val="40000"/>
-                    </a:schemeClr>
-                  </a:outerShdw>
-                </a:effectLst>
-              </a:rPr>
-              <a:t>Waiting Room</a:t>
-            </a:r>
-          </a:p>
-        </p:txBody>
-      </p:sp>
-      <p:sp>
-        <p:nvSpPr>
-          <p:cNvPr id="2" name="TextBox 1">
-            <a:extLst>
-              <a:ext uri="{FF2B5EF4-FFF2-40B4-BE49-F238E27FC236}">
-                <a16:creationId xmlns:a16="http://schemas.microsoft.com/office/drawing/2014/main" id="{6F9A4D01-1960-C905-6308-A9A6DD437A1F}"/>
-              </a:ext>
-            </a:extLst>
-          </p:cNvPr>
-          <p:cNvSpPr txBox="1"/>
-          <p:nvPr/>
-        </p:nvSpPr>
-        <p:spPr>
-          <a:xfrm>
-            <a:off x="347416" y="4147763"/>
-            <a:ext cx="5040000" cy="1440000"/>
+            <a:off x="-2" y="0"/>
+            <a:ext cx="6480000" cy="1440000"/>
           </a:xfrm>
           <a:prstGeom prst="rect">
             <a:avLst/>
@@ -3571,8 +3485,8 @@
         </p:nvSpPr>
         <p:spPr>
           <a:xfrm>
-            <a:off x="5954131" y="2174584"/>
-            <a:ext cx="5040000" cy="1440000"/>
+            <a:off x="-2" y="1438651"/>
+            <a:ext cx="6480000" cy="1440000"/>
           </a:xfrm>
           <a:prstGeom prst="rect">
             <a:avLst/>
@@ -3597,17 +3511,17 @@
                   </a:outerShdw>
                 </a:effectLst>
               </a:rPr>
-              <a:t>SECURITY</a:t>
-            </a:r>
-          </a:p>
-        </p:txBody>
-      </p:sp>
-      <p:sp>
-        <p:nvSpPr>
-          <p:cNvPr id="4" name="TextBox 3">
-            <a:extLst>
-              <a:ext uri="{FF2B5EF4-FFF2-40B4-BE49-F238E27FC236}">
-                <a16:creationId xmlns:a16="http://schemas.microsoft.com/office/drawing/2014/main" id="{45808483-EE7F-7FF6-46AB-955D84ED6FC9}"/>
+              <a:t>SECURITY OFFICE</a:t>
+            </a:r>
+          </a:p>
+        </p:txBody>
+      </p:sp>
+      <p:sp>
+        <p:nvSpPr>
+          <p:cNvPr id="7" name="TextBox 6">
+            <a:extLst>
+              <a:ext uri="{FF2B5EF4-FFF2-40B4-BE49-F238E27FC236}">
+                <a16:creationId xmlns:a16="http://schemas.microsoft.com/office/drawing/2014/main" id="{84C03903-AFB1-4559-E65D-E9C976966460}"/>
               </a:ext>
             </a:extLst>
           </p:cNvPr>
@@ -3616,8 +3530,8 @@
         </p:nvSpPr>
         <p:spPr>
           <a:xfrm>
-            <a:off x="3633537" y="5034089"/>
-            <a:ext cx="7091889" cy="1440000"/>
+            <a:off x="-1" y="2877977"/>
+            <a:ext cx="6480000" cy="1440000"/>
           </a:xfrm>
           <a:prstGeom prst="rect">
             <a:avLst/>
@@ -3642,17 +3556,17 @@
                   </a:outerShdw>
                 </a:effectLst>
               </a:rPr>
-              <a:t>DEPARTURES/ARRIVALS</a:t>
-            </a:r>
-          </a:p>
-        </p:txBody>
-      </p:sp>
-      <p:sp>
-        <p:nvSpPr>
-          <p:cNvPr id="7" name="TextBox 6">
-            <a:extLst>
-              <a:ext uri="{FF2B5EF4-FFF2-40B4-BE49-F238E27FC236}">
-                <a16:creationId xmlns:a16="http://schemas.microsoft.com/office/drawing/2014/main" id="{84C03903-AFB1-4559-E65D-E9C976966460}"/>
+              <a:t>MEDICAL OFFICE</a:t>
+            </a:r>
+          </a:p>
+        </p:txBody>
+      </p:sp>
+      <p:sp>
+        <p:nvSpPr>
+          <p:cNvPr id="8" name="TextBox 7">
+            <a:extLst>
+              <a:ext uri="{FF2B5EF4-FFF2-40B4-BE49-F238E27FC236}">
+                <a16:creationId xmlns:a16="http://schemas.microsoft.com/office/drawing/2014/main" id="{EF61FDA3-C4FE-00DA-587F-8051C1FDA452}"/>
               </a:ext>
             </a:extLst>
           </p:cNvPr>
@@ -3661,8 +3575,8 @@
         </p:nvSpPr>
         <p:spPr>
           <a:xfrm>
-            <a:off x="5954131" y="734584"/>
-            <a:ext cx="5040000" cy="1440000"/>
+            <a:off x="-3" y="4315469"/>
+            <a:ext cx="6480000" cy="1440000"/>
           </a:xfrm>
           <a:prstGeom prst="rect">
             <a:avLst/>
@@ -3687,187 +3601,7 @@
                   </a:outerShdw>
                 </a:effectLst>
               </a:rPr>
-              <a:t>MEDICAL</a:t>
-            </a:r>
-          </a:p>
-        </p:txBody>
-      </p:sp>
-      <p:sp>
-        <p:nvSpPr>
-          <p:cNvPr id="8" name="TextBox 7">
-            <a:extLst>
-              <a:ext uri="{FF2B5EF4-FFF2-40B4-BE49-F238E27FC236}">
-                <a16:creationId xmlns:a16="http://schemas.microsoft.com/office/drawing/2014/main" id="{EF61FDA3-C4FE-00DA-587F-8051C1FDA452}"/>
-              </a:ext>
-            </a:extLst>
-          </p:cNvPr>
-          <p:cNvSpPr txBox="1"/>
-          <p:nvPr/>
-        </p:nvSpPr>
-        <p:spPr>
-          <a:xfrm>
-            <a:off x="5954131" y="3429000"/>
-            <a:ext cx="5040000" cy="1440000"/>
-          </a:xfrm>
-          <a:prstGeom prst="rect">
-            <a:avLst/>
-          </a:prstGeom>
-          <a:noFill/>
-        </p:spPr>
-        <p:txBody>
-          <a:bodyPr wrap="none" rtlCol="0" anchor="ctr">
-            <a:noAutofit/>
-          </a:bodyPr>
-          <a:lstStyle/>
-          <a:p>
-            <a:pPr algn="ctr"/>
-            <a:r>
-              <a:rPr lang="en-GB" sz="6000" dirty="0">
-                <a:ln w="0"/>
-                <a:effectLst>
-                  <a:outerShdw blurRad="38100" dist="19050" dir="2700000" algn="tl" rotWithShape="0">
-                    <a:schemeClr val="dk1">
-                      <a:alpha val="40000"/>
-                    </a:schemeClr>
-                  </a:outerShdw>
-                </a:effectLst>
-              </a:rPr>
-              <a:t>PROPERTY</a:t>
-            </a:r>
-          </a:p>
-        </p:txBody>
-      </p:sp>
-      <p:sp>
-        <p:nvSpPr>
-          <p:cNvPr id="9" name="TextBox 8">
-            <a:extLst>
-              <a:ext uri="{FF2B5EF4-FFF2-40B4-BE49-F238E27FC236}">
-                <a16:creationId xmlns:a16="http://schemas.microsoft.com/office/drawing/2014/main" id="{7FFE56A5-10F2-A24E-E97B-1FD06E929B07}"/>
-              </a:ext>
-            </a:extLst>
-          </p:cNvPr>
-          <p:cNvSpPr txBox="1"/>
-          <p:nvPr/>
-        </p:nvSpPr>
-        <p:spPr>
-          <a:xfrm>
-            <a:off x="851297" y="2958753"/>
-            <a:ext cx="5040000" cy="1440000"/>
-          </a:xfrm>
-          <a:prstGeom prst="rect">
-            <a:avLst/>
-          </a:prstGeom>
-          <a:noFill/>
-        </p:spPr>
-        <p:txBody>
-          <a:bodyPr wrap="none" rtlCol="0" anchor="ctr">
-            <a:noAutofit/>
-          </a:bodyPr>
-          <a:lstStyle/>
-          <a:p>
-            <a:pPr algn="ctr"/>
-            <a:r>
-              <a:rPr lang="en-GB" sz="6000" dirty="0">
-                <a:ln w="0"/>
-                <a:effectLst>
-                  <a:outerShdw blurRad="38100" dist="19050" dir="2700000" algn="tl" rotWithShape="0">
-                    <a:schemeClr val="dk1">
-                      <a:alpha val="40000"/>
-                    </a:schemeClr>
-                  </a:outerShdw>
-                </a:effectLst>
-              </a:rPr>
-              <a:t>RESTRICTED ACCESS</a:t>
-            </a:r>
-          </a:p>
-        </p:txBody>
-      </p:sp>
-      <p:sp>
-        <p:nvSpPr>
-          <p:cNvPr id="10" name="TextBox 9">
-            <a:extLst>
-              <a:ext uri="{FF2B5EF4-FFF2-40B4-BE49-F238E27FC236}">
-                <a16:creationId xmlns:a16="http://schemas.microsoft.com/office/drawing/2014/main" id="{DCF7A1B1-B022-812F-CF77-ED2D18B01DD7}"/>
-              </a:ext>
-            </a:extLst>
-          </p:cNvPr>
-          <p:cNvSpPr txBox="1"/>
-          <p:nvPr/>
-        </p:nvSpPr>
-        <p:spPr>
-          <a:xfrm>
-            <a:off x="508129" y="1062667"/>
-            <a:ext cx="5040000" cy="1440000"/>
-          </a:xfrm>
-          <a:prstGeom prst="rect">
-            <a:avLst/>
-          </a:prstGeom>
-          <a:noFill/>
-        </p:spPr>
-        <p:txBody>
-          <a:bodyPr wrap="none" rtlCol="0" anchor="ctr">
-            <a:noAutofit/>
-          </a:bodyPr>
-          <a:lstStyle/>
-          <a:p>
-            <a:pPr algn="ctr"/>
-            <a:r>
-              <a:rPr lang="en-GB" sz="6000" dirty="0">
-                <a:ln w="0"/>
-                <a:effectLst>
-                  <a:outerShdw blurRad="38100" dist="19050" dir="2700000" algn="tl" rotWithShape="0">
-                    <a:schemeClr val="dk1">
-                      <a:alpha val="40000"/>
-                    </a:schemeClr>
-                  </a:outerShdw>
-                </a:effectLst>
-              </a:rPr>
-              <a:t>Property Deposit</a:t>
-            </a:r>
-          </a:p>
-        </p:txBody>
-      </p:sp>
-      <p:sp>
-        <p:nvSpPr>
-          <p:cNvPr id="11" name="TextBox 10">
-            <a:extLst>
-              <a:ext uri="{FF2B5EF4-FFF2-40B4-BE49-F238E27FC236}">
-                <a16:creationId xmlns:a16="http://schemas.microsoft.com/office/drawing/2014/main" id="{F4F2223D-72E7-0C3C-9CF7-152BF72D402A}"/>
-              </a:ext>
-            </a:extLst>
-          </p:cNvPr>
-          <p:cNvSpPr txBox="1"/>
-          <p:nvPr/>
-        </p:nvSpPr>
-        <p:spPr>
-          <a:xfrm>
-            <a:off x="-618246" y="5587763"/>
-            <a:ext cx="5040000" cy="1440000"/>
-          </a:xfrm>
-          <a:prstGeom prst="rect">
-            <a:avLst/>
-          </a:prstGeom>
-          <a:noFill/>
-        </p:spPr>
-        <p:txBody>
-          <a:bodyPr wrap="none" rtlCol="0" anchor="ctr">
-            <a:noAutofit/>
-          </a:bodyPr>
-          <a:lstStyle/>
-          <a:p>
-            <a:pPr algn="ctr"/>
-            <a:r>
-              <a:rPr lang="en-GB" sz="6000" dirty="0">
-                <a:ln w="0"/>
-                <a:effectLst>
-                  <a:outerShdw blurRad="38100" dist="19050" dir="2700000" algn="tl" rotWithShape="0">
-                    <a:schemeClr val="dk1">
-                      <a:alpha val="40000"/>
-                    </a:schemeClr>
-                  </a:outerShdw>
-                </a:effectLst>
-              </a:rPr>
-              <a:t>ROOM NAME GOES HERE</a:t>
+              <a:t>PROPERTY OFFICE</a:t>
             </a:r>
           </a:p>
         </p:txBody>
@@ -3886,6 +3620,177 @@
 </file>
 
 <file path=ppt/slides/slide3.xml><?xml version="1.0" encoding="utf-8"?>
+<p:sld xmlns:a="http://schemas.openxmlformats.org/drawingml/2006/main" xmlns:r="http://schemas.openxmlformats.org/officeDocument/2006/relationships" xmlns:p="http://schemas.openxmlformats.org/presentationml/2006/main">
+  <p:cSld>
+    <p:spTree>
+      <p:nvGrpSpPr>
+        <p:cNvPr id="1" name="">
+          <a:extLst>
+            <a:ext uri="{FF2B5EF4-FFF2-40B4-BE49-F238E27FC236}">
+              <a16:creationId xmlns:a16="http://schemas.microsoft.com/office/drawing/2014/main" id="{C3F0B17F-EC5E-E16E-8833-3B015B93E336}"/>
+            </a:ext>
+          </a:extLst>
+        </p:cNvPr>
+        <p:cNvGrpSpPr/>
+        <p:nvPr/>
+      </p:nvGrpSpPr>
+      <p:grpSpPr>
+        <a:xfrm>
+          <a:off x="0" y="0"/>
+          <a:ext cx="0" cy="0"/>
+          <a:chOff x="0" y="0"/>
+          <a:chExt cx="0" cy="0"/>
+        </a:xfrm>
+      </p:grpSpPr>
+      <p:sp>
+        <p:nvSpPr>
+          <p:cNvPr id="2" name="TextBox 1">
+            <a:extLst>
+              <a:ext uri="{FF2B5EF4-FFF2-40B4-BE49-F238E27FC236}">
+                <a16:creationId xmlns:a16="http://schemas.microsoft.com/office/drawing/2014/main" id="{2798AA69-86B8-01AC-912A-E7CE6F7573AE}"/>
+              </a:ext>
+            </a:extLst>
+          </p:cNvPr>
+          <p:cNvSpPr txBox="1"/>
+          <p:nvPr/>
+        </p:nvSpPr>
+        <p:spPr>
+          <a:xfrm>
+            <a:off x="-2" y="0"/>
+            <a:ext cx="6480000" cy="1440000"/>
+          </a:xfrm>
+          <a:prstGeom prst="rect">
+            <a:avLst/>
+          </a:prstGeom>
+          <a:noFill/>
+        </p:spPr>
+        <p:txBody>
+          <a:bodyPr wrap="none" rtlCol="0" anchor="ctr">
+            <a:noAutofit/>
+          </a:bodyPr>
+          <a:lstStyle/>
+          <a:p>
+            <a:pPr algn="ctr"/>
+            <a:r>
+              <a:rPr lang="en-GB" sz="6000" dirty="0">
+                <a:ln w="0"/>
+                <a:effectLst>
+                  <a:outerShdw blurRad="38100" dist="19050" dir="2700000" algn="tl" rotWithShape="0">
+                    <a:schemeClr val="dk1">
+                      <a:alpha val="40000"/>
+                    </a:schemeClr>
+                  </a:outerShdw>
+                </a:effectLst>
+              </a:rPr>
+              <a:t>TV ROOM</a:t>
+            </a:r>
+          </a:p>
+        </p:txBody>
+      </p:sp>
+      <p:sp>
+        <p:nvSpPr>
+          <p:cNvPr id="3" name="TextBox 2">
+            <a:extLst>
+              <a:ext uri="{FF2B5EF4-FFF2-40B4-BE49-F238E27FC236}">
+                <a16:creationId xmlns:a16="http://schemas.microsoft.com/office/drawing/2014/main" id="{662C592C-E0E2-195F-A738-B937E7FA5F40}"/>
+              </a:ext>
+            </a:extLst>
+          </p:cNvPr>
+          <p:cNvSpPr txBox="1"/>
+          <p:nvPr/>
+        </p:nvSpPr>
+        <p:spPr>
+          <a:xfrm>
+            <a:off x="-2" y="1438651"/>
+            <a:ext cx="6480000" cy="1440000"/>
+          </a:xfrm>
+          <a:prstGeom prst="rect">
+            <a:avLst/>
+          </a:prstGeom>
+          <a:noFill/>
+        </p:spPr>
+        <p:txBody>
+          <a:bodyPr wrap="none" rtlCol="0" anchor="ctr">
+            <a:noAutofit/>
+          </a:bodyPr>
+          <a:lstStyle/>
+          <a:p>
+            <a:pPr algn="ctr"/>
+            <a:r>
+              <a:rPr lang="en-GB" sz="6000" dirty="0">
+                <a:ln w="0"/>
+                <a:effectLst>
+                  <a:outerShdw blurRad="38100" dist="19050" dir="2700000" algn="tl" rotWithShape="0">
+                    <a:schemeClr val="dk1">
+                      <a:alpha val="40000"/>
+                    </a:schemeClr>
+                  </a:outerShdw>
+                </a:effectLst>
+              </a:rPr>
+              <a:t>DINING ROOM</a:t>
+            </a:r>
+          </a:p>
+        </p:txBody>
+      </p:sp>
+      <p:sp>
+        <p:nvSpPr>
+          <p:cNvPr id="7" name="TextBox 6">
+            <a:extLst>
+              <a:ext uri="{FF2B5EF4-FFF2-40B4-BE49-F238E27FC236}">
+                <a16:creationId xmlns:a16="http://schemas.microsoft.com/office/drawing/2014/main" id="{8DA3C82D-49EB-FF4B-AEF1-8DA282E3B987}"/>
+              </a:ext>
+            </a:extLst>
+          </p:cNvPr>
+          <p:cNvSpPr txBox="1"/>
+          <p:nvPr/>
+        </p:nvSpPr>
+        <p:spPr>
+          <a:xfrm>
+            <a:off x="-1" y="2877977"/>
+            <a:ext cx="6480000" cy="1440000"/>
+          </a:xfrm>
+          <a:prstGeom prst="rect">
+            <a:avLst/>
+          </a:prstGeom>
+          <a:noFill/>
+        </p:spPr>
+        <p:txBody>
+          <a:bodyPr wrap="none" rtlCol="0" anchor="ctr">
+            <a:noAutofit/>
+          </a:bodyPr>
+          <a:lstStyle/>
+          <a:p>
+            <a:pPr algn="ctr"/>
+            <a:r>
+              <a:rPr lang="en-GB" sz="6000" dirty="0">
+                <a:ln w="0"/>
+                <a:effectLst>
+                  <a:outerShdw blurRad="38100" dist="19050" dir="2700000" algn="tl" rotWithShape="0">
+                    <a:schemeClr val="dk1">
+                      <a:alpha val="40000"/>
+                    </a:schemeClr>
+                  </a:outerShdw>
+                </a:effectLst>
+              </a:rPr>
+              <a:t>GYMNASIUM</a:t>
+            </a:r>
+          </a:p>
+        </p:txBody>
+      </p:sp>
+    </p:spTree>
+    <p:extLst>
+      <p:ext uri="{BB962C8B-B14F-4D97-AF65-F5344CB8AC3E}">
+        <p14:creationId xmlns:p14="http://schemas.microsoft.com/office/powerpoint/2010/main" val="211190840"/>
+      </p:ext>
+    </p:extLst>
+  </p:cSld>
+  <p:clrMapOvr>
+    <a:masterClrMapping/>
+  </p:clrMapOvr>
+</p:sld>
+</file>
+
+<file path=ppt/slides/slide4.xml><?xml version="1.0" encoding="utf-8"?>
 <p:sld xmlns:a="http://schemas.openxmlformats.org/drawingml/2006/main" xmlns:r="http://schemas.openxmlformats.org/officeDocument/2006/relationships" xmlns:p="http://schemas.openxmlformats.org/presentationml/2006/main">
   <p:cSld>
     <p:spTree>
@@ -3910,10 +3815,10 @@
       </p:grpSpPr>
       <p:sp>
         <p:nvSpPr>
-          <p:cNvPr id="7" name="TextBox 6">
-            <a:extLst>
-              <a:ext uri="{FF2B5EF4-FFF2-40B4-BE49-F238E27FC236}">
-                <a16:creationId xmlns:a16="http://schemas.microsoft.com/office/drawing/2014/main" id="{BB48B827-FDA0-1C9B-BDC0-84A84751C6BD}"/>
+          <p:cNvPr id="14" name="TextBox 13">
+            <a:extLst>
+              <a:ext uri="{FF2B5EF4-FFF2-40B4-BE49-F238E27FC236}">
+                <a16:creationId xmlns:a16="http://schemas.microsoft.com/office/drawing/2014/main" id="{A4897DFA-13D4-3D21-AEED-2D2418D5E04A}"/>
               </a:ext>
             </a:extLst>
           </p:cNvPr>
@@ -3922,8 +3827,8 @@
         </p:nvSpPr>
         <p:spPr>
           <a:xfrm>
-            <a:off x="0" y="0"/>
-            <a:ext cx="5040000" cy="1440000"/>
+            <a:off x="0" y="1440000"/>
+            <a:ext cx="6480000" cy="1440000"/>
           </a:xfrm>
           <a:prstGeom prst="rect">
             <a:avLst/>
@@ -3948,17 +3853,17 @@
                   </a:outerShdw>
                 </a:effectLst>
               </a:rPr>
-              <a:t>CELL #1</a:t>
-            </a:r>
-          </a:p>
-        </p:txBody>
-      </p:sp>
-      <p:sp>
-        <p:nvSpPr>
-          <p:cNvPr id="11" name="TextBox 10">
-            <a:extLst>
-              <a:ext uri="{FF2B5EF4-FFF2-40B4-BE49-F238E27FC236}">
-                <a16:creationId xmlns:a16="http://schemas.microsoft.com/office/drawing/2014/main" id="{F8C0D481-33AF-6FBA-188E-8C1C935FBFD6}"/>
+              <a:t>TOILET BLOCK</a:t>
+            </a:r>
+          </a:p>
+        </p:txBody>
+      </p:sp>
+      <p:sp>
+        <p:nvSpPr>
+          <p:cNvPr id="15" name="TextBox 14">
+            <a:extLst>
+              <a:ext uri="{FF2B5EF4-FFF2-40B4-BE49-F238E27FC236}">
+                <a16:creationId xmlns:a16="http://schemas.microsoft.com/office/drawing/2014/main" id="{4DF9813B-A4B0-23DD-F35C-A32B2822D0DB}"/>
               </a:ext>
             </a:extLst>
           </p:cNvPr>
@@ -3967,8 +3872,8 @@
         </p:nvSpPr>
         <p:spPr>
           <a:xfrm>
-            <a:off x="0" y="1440000"/>
-            <a:ext cx="5040000" cy="1440000"/>
+            <a:off x="0" y="0"/>
+            <a:ext cx="6480000" cy="1440000"/>
           </a:xfrm>
           <a:prstGeom prst="rect">
             <a:avLst/>
@@ -3993,187 +3898,7 @@
                   </a:outerShdw>
                 </a:effectLst>
               </a:rPr>
-              <a:t>CELL #2</a:t>
-            </a:r>
-          </a:p>
-        </p:txBody>
-      </p:sp>
-      <p:sp>
-        <p:nvSpPr>
-          <p:cNvPr id="12" name="TextBox 11">
-            <a:extLst>
-              <a:ext uri="{FF2B5EF4-FFF2-40B4-BE49-F238E27FC236}">
-                <a16:creationId xmlns:a16="http://schemas.microsoft.com/office/drawing/2014/main" id="{630A5462-1C53-3967-88DD-01083728C8B1}"/>
-              </a:ext>
-            </a:extLst>
-          </p:cNvPr>
-          <p:cNvSpPr txBox="1"/>
-          <p:nvPr/>
-        </p:nvSpPr>
-        <p:spPr>
-          <a:xfrm>
-            <a:off x="0" y="2880000"/>
-            <a:ext cx="5040000" cy="1440000"/>
-          </a:xfrm>
-          <a:prstGeom prst="rect">
-            <a:avLst/>
-          </a:prstGeom>
-          <a:noFill/>
-        </p:spPr>
-        <p:txBody>
-          <a:bodyPr wrap="none" rtlCol="0" anchor="ctr">
-            <a:noAutofit/>
-          </a:bodyPr>
-          <a:lstStyle/>
-          <a:p>
-            <a:pPr algn="ctr"/>
-            <a:r>
-              <a:rPr lang="en-GB" sz="6000" dirty="0">
-                <a:ln w="0"/>
-                <a:effectLst>
-                  <a:outerShdw blurRad="38100" dist="19050" dir="2700000" algn="tl" rotWithShape="0">
-                    <a:schemeClr val="dk1">
-                      <a:alpha val="40000"/>
-                    </a:schemeClr>
-                  </a:outerShdw>
-                </a:effectLst>
-              </a:rPr>
-              <a:t>CELL #3</a:t>
-            </a:r>
-          </a:p>
-        </p:txBody>
-      </p:sp>
-      <p:sp>
-        <p:nvSpPr>
-          <p:cNvPr id="13" name="TextBox 12">
-            <a:extLst>
-              <a:ext uri="{FF2B5EF4-FFF2-40B4-BE49-F238E27FC236}">
-                <a16:creationId xmlns:a16="http://schemas.microsoft.com/office/drawing/2014/main" id="{4778887D-C72C-4E26-B6F1-A9565A40D0E9}"/>
-              </a:ext>
-            </a:extLst>
-          </p:cNvPr>
-          <p:cNvSpPr txBox="1"/>
-          <p:nvPr/>
-        </p:nvSpPr>
-        <p:spPr>
-          <a:xfrm>
-            <a:off x="0" y="4320000"/>
-            <a:ext cx="5040000" cy="1440000"/>
-          </a:xfrm>
-          <a:prstGeom prst="rect">
-            <a:avLst/>
-          </a:prstGeom>
-          <a:noFill/>
-        </p:spPr>
-        <p:txBody>
-          <a:bodyPr wrap="none" rtlCol="0" anchor="ctr">
-            <a:noAutofit/>
-          </a:bodyPr>
-          <a:lstStyle/>
-          <a:p>
-            <a:pPr algn="ctr"/>
-            <a:r>
-              <a:rPr lang="en-GB" sz="6000" dirty="0">
-                <a:ln w="0"/>
-                <a:effectLst>
-                  <a:outerShdw blurRad="38100" dist="19050" dir="2700000" algn="tl" rotWithShape="0">
-                    <a:schemeClr val="dk1">
-                      <a:alpha val="40000"/>
-                    </a:schemeClr>
-                  </a:outerShdw>
-                </a:effectLst>
-              </a:rPr>
-              <a:t>CELL #4</a:t>
-            </a:r>
-          </a:p>
-        </p:txBody>
-      </p:sp>
-      <p:sp>
-        <p:nvSpPr>
-          <p:cNvPr id="14" name="TextBox 13">
-            <a:extLst>
-              <a:ext uri="{FF2B5EF4-FFF2-40B4-BE49-F238E27FC236}">
-                <a16:creationId xmlns:a16="http://schemas.microsoft.com/office/drawing/2014/main" id="{A4897DFA-13D4-3D21-AEED-2D2418D5E04A}"/>
-              </a:ext>
-            </a:extLst>
-          </p:cNvPr>
-          <p:cNvSpPr txBox="1"/>
-          <p:nvPr/>
-        </p:nvSpPr>
-        <p:spPr>
-          <a:xfrm>
-            <a:off x="5040000" y="4320000"/>
-            <a:ext cx="5040000" cy="1440000"/>
-          </a:xfrm>
-          <a:prstGeom prst="rect">
-            <a:avLst/>
-          </a:prstGeom>
-          <a:noFill/>
-        </p:spPr>
-        <p:txBody>
-          <a:bodyPr wrap="none" rtlCol="0" anchor="ctr">
-            <a:noAutofit/>
-          </a:bodyPr>
-          <a:lstStyle/>
-          <a:p>
-            <a:pPr algn="ctr"/>
-            <a:r>
-              <a:rPr lang="en-GB" sz="6000" dirty="0">
-                <a:ln w="0"/>
-                <a:effectLst>
-                  <a:outerShdw blurRad="38100" dist="19050" dir="2700000" algn="tl" rotWithShape="0">
-                    <a:schemeClr val="dk1">
-                      <a:alpha val="40000"/>
-                    </a:schemeClr>
-                  </a:outerShdw>
-                </a:effectLst>
-              </a:rPr>
-              <a:t>TOILETS</a:t>
-            </a:r>
-          </a:p>
-        </p:txBody>
-      </p:sp>
-      <p:sp>
-        <p:nvSpPr>
-          <p:cNvPr id="15" name="TextBox 14">
-            <a:extLst>
-              <a:ext uri="{FF2B5EF4-FFF2-40B4-BE49-F238E27FC236}">
-                <a16:creationId xmlns:a16="http://schemas.microsoft.com/office/drawing/2014/main" id="{4DF9813B-A4B0-23DD-F35C-A32B2822D0DB}"/>
-              </a:ext>
-            </a:extLst>
-          </p:cNvPr>
-          <p:cNvSpPr txBox="1"/>
-          <p:nvPr/>
-        </p:nvSpPr>
-        <p:spPr>
-          <a:xfrm>
-            <a:off x="5040000" y="2880000"/>
-            <a:ext cx="5040000" cy="1440000"/>
-          </a:xfrm>
-          <a:prstGeom prst="rect">
-            <a:avLst/>
-          </a:prstGeom>
-          <a:noFill/>
-        </p:spPr>
-        <p:txBody>
-          <a:bodyPr wrap="none" rtlCol="0" anchor="ctr">
-            <a:noAutofit/>
-          </a:bodyPr>
-          <a:lstStyle/>
-          <a:p>
-            <a:pPr algn="ctr"/>
-            <a:r>
-              <a:rPr lang="en-GB" sz="6000" dirty="0">
-                <a:ln w="0"/>
-                <a:effectLst>
-                  <a:outerShdw blurRad="38100" dist="19050" dir="2700000" algn="tl" rotWithShape="0">
-                    <a:schemeClr val="dk1">
-                      <a:alpha val="40000"/>
-                    </a:schemeClr>
-                  </a:outerShdw>
-                </a:effectLst>
-              </a:rPr>
-              <a:t>SHOWERS</a:t>
+              <a:t>SHOWER BLOCK</a:t>
             </a:r>
           </a:p>
         </p:txBody>
@@ -4191,7 +3916,610 @@
 </p:sld>
 </file>
 
-<file path=ppt/slides/slide4.xml><?xml version="1.0" encoding="utf-8"?>
+<file path=ppt/slides/slide5.xml><?xml version="1.0" encoding="utf-8"?>
+<p:sld xmlns:a="http://schemas.openxmlformats.org/drawingml/2006/main" xmlns:r="http://schemas.openxmlformats.org/officeDocument/2006/relationships" xmlns:p="http://schemas.openxmlformats.org/presentationml/2006/main">
+  <p:cSld>
+    <p:spTree>
+      <p:nvGrpSpPr>
+        <p:cNvPr id="1" name="">
+          <a:extLst>
+            <a:ext uri="{FF2B5EF4-FFF2-40B4-BE49-F238E27FC236}">
+              <a16:creationId xmlns:a16="http://schemas.microsoft.com/office/drawing/2014/main" id="{73CCB66F-79A2-35B1-4934-88D70FFE31C7}"/>
+            </a:ext>
+          </a:extLst>
+        </p:cNvPr>
+        <p:cNvGrpSpPr/>
+        <p:nvPr/>
+      </p:nvGrpSpPr>
+      <p:grpSpPr>
+        <a:xfrm>
+          <a:off x="0" y="0"/>
+          <a:ext cx="0" cy="0"/>
+          <a:chOff x="0" y="0"/>
+          <a:chExt cx="0" cy="0"/>
+        </a:xfrm>
+      </p:grpSpPr>
+      <p:sp>
+        <p:nvSpPr>
+          <p:cNvPr id="7" name="TextBox 6">
+            <a:extLst>
+              <a:ext uri="{FF2B5EF4-FFF2-40B4-BE49-F238E27FC236}">
+                <a16:creationId xmlns:a16="http://schemas.microsoft.com/office/drawing/2014/main" id="{4EF4F078-5AD0-1488-3A94-0A7979AC10B6}"/>
+              </a:ext>
+            </a:extLst>
+          </p:cNvPr>
+          <p:cNvSpPr txBox="1"/>
+          <p:nvPr/>
+        </p:nvSpPr>
+        <p:spPr>
+          <a:xfrm>
+            <a:off x="0" y="0"/>
+            <a:ext cx="6480000" cy="1440000"/>
+          </a:xfrm>
+          <a:prstGeom prst="rect">
+            <a:avLst/>
+          </a:prstGeom>
+          <a:noFill/>
+        </p:spPr>
+        <p:txBody>
+          <a:bodyPr wrap="none" rtlCol="0" anchor="ctr">
+            <a:noAutofit/>
+          </a:bodyPr>
+          <a:lstStyle/>
+          <a:p>
+            <a:pPr algn="ctr"/>
+            <a:r>
+              <a:rPr lang="en-GB" sz="6000" dirty="0">
+                <a:ln w="0"/>
+                <a:effectLst>
+                  <a:outerShdw blurRad="38100" dist="19050" dir="2700000" algn="tl" rotWithShape="0">
+                    <a:schemeClr val="dk1">
+                      <a:alpha val="40000"/>
+                    </a:schemeClr>
+                  </a:outerShdw>
+                </a:effectLst>
+              </a:rPr>
+              <a:t>CELL #1</a:t>
+            </a:r>
+          </a:p>
+        </p:txBody>
+      </p:sp>
+      <p:sp>
+        <p:nvSpPr>
+          <p:cNvPr id="11" name="TextBox 10">
+            <a:extLst>
+              <a:ext uri="{FF2B5EF4-FFF2-40B4-BE49-F238E27FC236}">
+                <a16:creationId xmlns:a16="http://schemas.microsoft.com/office/drawing/2014/main" id="{519A5F10-05B1-A109-067C-8926C85B6AB9}"/>
+              </a:ext>
+            </a:extLst>
+          </p:cNvPr>
+          <p:cNvSpPr txBox="1"/>
+          <p:nvPr/>
+        </p:nvSpPr>
+        <p:spPr>
+          <a:xfrm>
+            <a:off x="0" y="1440000"/>
+            <a:ext cx="6480000" cy="1440000"/>
+          </a:xfrm>
+          <a:prstGeom prst="rect">
+            <a:avLst/>
+          </a:prstGeom>
+          <a:noFill/>
+        </p:spPr>
+        <p:txBody>
+          <a:bodyPr wrap="none" rtlCol="0" anchor="ctr">
+            <a:noAutofit/>
+          </a:bodyPr>
+          <a:lstStyle/>
+          <a:p>
+            <a:pPr algn="ctr"/>
+            <a:r>
+              <a:rPr lang="en-GB" sz="6000" dirty="0">
+                <a:ln w="0"/>
+                <a:effectLst>
+                  <a:outerShdw blurRad="38100" dist="19050" dir="2700000" algn="tl" rotWithShape="0">
+                    <a:schemeClr val="dk1">
+                      <a:alpha val="40000"/>
+                    </a:schemeClr>
+                  </a:outerShdw>
+                </a:effectLst>
+              </a:rPr>
+              <a:t>CELL #2</a:t>
+            </a:r>
+          </a:p>
+        </p:txBody>
+      </p:sp>
+      <p:sp>
+        <p:nvSpPr>
+          <p:cNvPr id="12" name="TextBox 11">
+            <a:extLst>
+              <a:ext uri="{FF2B5EF4-FFF2-40B4-BE49-F238E27FC236}">
+                <a16:creationId xmlns:a16="http://schemas.microsoft.com/office/drawing/2014/main" id="{2A012F32-6575-1FB7-E97A-20D3DC1BFBB8}"/>
+              </a:ext>
+            </a:extLst>
+          </p:cNvPr>
+          <p:cNvSpPr txBox="1"/>
+          <p:nvPr/>
+        </p:nvSpPr>
+        <p:spPr>
+          <a:xfrm>
+            <a:off x="0" y="2880000"/>
+            <a:ext cx="6480000" cy="1440000"/>
+          </a:xfrm>
+          <a:prstGeom prst="rect">
+            <a:avLst/>
+          </a:prstGeom>
+          <a:noFill/>
+        </p:spPr>
+        <p:txBody>
+          <a:bodyPr wrap="none" rtlCol="0" anchor="ctr">
+            <a:noAutofit/>
+          </a:bodyPr>
+          <a:lstStyle/>
+          <a:p>
+            <a:pPr algn="ctr"/>
+            <a:r>
+              <a:rPr lang="en-GB" sz="6000" dirty="0">
+                <a:ln w="0"/>
+                <a:effectLst>
+                  <a:outerShdw blurRad="38100" dist="19050" dir="2700000" algn="tl" rotWithShape="0">
+                    <a:schemeClr val="dk1">
+                      <a:alpha val="40000"/>
+                    </a:schemeClr>
+                  </a:outerShdw>
+                </a:effectLst>
+              </a:rPr>
+              <a:t>CELL #3</a:t>
+            </a:r>
+          </a:p>
+        </p:txBody>
+      </p:sp>
+      <p:sp>
+        <p:nvSpPr>
+          <p:cNvPr id="13" name="TextBox 12">
+            <a:extLst>
+              <a:ext uri="{FF2B5EF4-FFF2-40B4-BE49-F238E27FC236}">
+                <a16:creationId xmlns:a16="http://schemas.microsoft.com/office/drawing/2014/main" id="{449CD37D-F841-D75E-D105-1F713E931A71}"/>
+              </a:ext>
+            </a:extLst>
+          </p:cNvPr>
+          <p:cNvSpPr txBox="1"/>
+          <p:nvPr/>
+        </p:nvSpPr>
+        <p:spPr>
+          <a:xfrm>
+            <a:off x="0" y="4320000"/>
+            <a:ext cx="6480000" cy="1440000"/>
+          </a:xfrm>
+          <a:prstGeom prst="rect">
+            <a:avLst/>
+          </a:prstGeom>
+          <a:noFill/>
+        </p:spPr>
+        <p:txBody>
+          <a:bodyPr wrap="none" rtlCol="0" anchor="ctr">
+            <a:noAutofit/>
+          </a:bodyPr>
+          <a:lstStyle/>
+          <a:p>
+            <a:pPr algn="ctr"/>
+            <a:r>
+              <a:rPr lang="en-GB" sz="6000" dirty="0">
+                <a:ln w="0"/>
+                <a:effectLst>
+                  <a:outerShdw blurRad="38100" dist="19050" dir="2700000" algn="tl" rotWithShape="0">
+                    <a:schemeClr val="dk1">
+                      <a:alpha val="40000"/>
+                    </a:schemeClr>
+                  </a:outerShdw>
+                </a:effectLst>
+              </a:rPr>
+              <a:t>CELL #4</a:t>
+            </a:r>
+          </a:p>
+        </p:txBody>
+      </p:sp>
+    </p:spTree>
+    <p:extLst>
+      <p:ext uri="{BB962C8B-B14F-4D97-AF65-F5344CB8AC3E}">
+        <p14:creationId xmlns:p14="http://schemas.microsoft.com/office/powerpoint/2010/main" val="868011999"/>
+      </p:ext>
+    </p:extLst>
+  </p:cSld>
+  <p:clrMapOvr>
+    <a:masterClrMapping/>
+  </p:clrMapOvr>
+</p:sld>
+</file>
+
+<file path=ppt/slides/slide6.xml><?xml version="1.0" encoding="utf-8"?>
+<p:sld xmlns:a="http://schemas.openxmlformats.org/drawingml/2006/main" xmlns:r="http://schemas.openxmlformats.org/officeDocument/2006/relationships" xmlns:p="http://schemas.openxmlformats.org/presentationml/2006/main">
+  <p:cSld>
+    <p:spTree>
+      <p:nvGrpSpPr>
+        <p:cNvPr id="1" name="">
+          <a:extLst>
+            <a:ext uri="{FF2B5EF4-FFF2-40B4-BE49-F238E27FC236}">
+              <a16:creationId xmlns:a16="http://schemas.microsoft.com/office/drawing/2014/main" id="{B5DE7AC6-353B-1C05-3179-AD7C43CFFAE1}"/>
+            </a:ext>
+          </a:extLst>
+        </p:cNvPr>
+        <p:cNvGrpSpPr/>
+        <p:nvPr/>
+      </p:nvGrpSpPr>
+      <p:grpSpPr>
+        <a:xfrm>
+          <a:off x="0" y="0"/>
+          <a:ext cx="0" cy="0"/>
+          <a:chOff x="0" y="0"/>
+          <a:chExt cx="0" cy="0"/>
+        </a:xfrm>
+      </p:grpSpPr>
+      <p:sp>
+        <p:nvSpPr>
+          <p:cNvPr id="2" name="TextBox 1">
+            <a:extLst>
+              <a:ext uri="{FF2B5EF4-FFF2-40B4-BE49-F238E27FC236}">
+                <a16:creationId xmlns:a16="http://schemas.microsoft.com/office/drawing/2014/main" id="{CACBB003-6C6B-D484-9114-9E5E7F60BD32}"/>
+              </a:ext>
+            </a:extLst>
+          </p:cNvPr>
+          <p:cNvSpPr txBox="1"/>
+          <p:nvPr/>
+        </p:nvSpPr>
+        <p:spPr>
+          <a:xfrm>
+            <a:off x="-2" y="0"/>
+            <a:ext cx="7920000" cy="1440000"/>
+          </a:xfrm>
+          <a:prstGeom prst="rect">
+            <a:avLst/>
+          </a:prstGeom>
+          <a:noFill/>
+        </p:spPr>
+        <p:txBody>
+          <a:bodyPr wrap="none" rtlCol="0" anchor="ctr">
+            <a:noAutofit/>
+          </a:bodyPr>
+          <a:lstStyle/>
+          <a:p>
+            <a:pPr algn="ctr"/>
+            <a:r>
+              <a:rPr lang="en-GB" sz="6000" dirty="0">
+                <a:ln w="0"/>
+                <a:effectLst>
+                  <a:outerShdw blurRad="38100" dist="19050" dir="2700000" algn="tl" rotWithShape="0">
+                    <a:schemeClr val="dk1">
+                      <a:alpha val="40000"/>
+                    </a:schemeClr>
+                  </a:outerShdw>
+                </a:effectLst>
+              </a:rPr>
+              <a:t>RECEPTION CORRIDOR</a:t>
+            </a:r>
+          </a:p>
+        </p:txBody>
+      </p:sp>
+      <p:sp>
+        <p:nvSpPr>
+          <p:cNvPr id="3" name="TextBox 2">
+            <a:extLst>
+              <a:ext uri="{FF2B5EF4-FFF2-40B4-BE49-F238E27FC236}">
+                <a16:creationId xmlns:a16="http://schemas.microsoft.com/office/drawing/2014/main" id="{9301B013-FBE5-188F-2993-16C396D63687}"/>
+              </a:ext>
+            </a:extLst>
+          </p:cNvPr>
+          <p:cNvSpPr txBox="1"/>
+          <p:nvPr/>
+        </p:nvSpPr>
+        <p:spPr>
+          <a:xfrm>
+            <a:off x="-2" y="1438651"/>
+            <a:ext cx="7920000" cy="1440000"/>
+          </a:xfrm>
+          <a:prstGeom prst="rect">
+            <a:avLst/>
+          </a:prstGeom>
+          <a:noFill/>
+        </p:spPr>
+        <p:txBody>
+          <a:bodyPr wrap="none" rtlCol="0" anchor="ctr">
+            <a:noAutofit/>
+          </a:bodyPr>
+          <a:lstStyle/>
+          <a:p>
+            <a:pPr algn="ctr"/>
+            <a:r>
+              <a:rPr lang="en-GB" sz="6000" dirty="0">
+                <a:ln w="0"/>
+                <a:effectLst>
+                  <a:outerShdw blurRad="38100" dist="19050" dir="2700000" algn="tl" rotWithShape="0">
+                    <a:schemeClr val="dk1">
+                      <a:alpha val="40000"/>
+                    </a:schemeClr>
+                  </a:outerShdw>
+                </a:effectLst>
+              </a:rPr>
+              <a:t>OFFICE CORRIDOR</a:t>
+            </a:r>
+          </a:p>
+        </p:txBody>
+      </p:sp>
+      <p:sp>
+        <p:nvSpPr>
+          <p:cNvPr id="7" name="TextBox 6">
+            <a:extLst>
+              <a:ext uri="{FF2B5EF4-FFF2-40B4-BE49-F238E27FC236}">
+                <a16:creationId xmlns:a16="http://schemas.microsoft.com/office/drawing/2014/main" id="{CEECAAFE-6510-BC08-A68A-4D6AAF242B0B}"/>
+              </a:ext>
+            </a:extLst>
+          </p:cNvPr>
+          <p:cNvSpPr txBox="1"/>
+          <p:nvPr/>
+        </p:nvSpPr>
+        <p:spPr>
+          <a:xfrm>
+            <a:off x="-1" y="2877977"/>
+            <a:ext cx="7920000" cy="1440000"/>
+          </a:xfrm>
+          <a:prstGeom prst="rect">
+            <a:avLst/>
+          </a:prstGeom>
+          <a:noFill/>
+        </p:spPr>
+        <p:txBody>
+          <a:bodyPr wrap="none" rtlCol="0" anchor="ctr">
+            <a:noAutofit/>
+          </a:bodyPr>
+          <a:lstStyle/>
+          <a:p>
+            <a:pPr algn="ctr"/>
+            <a:r>
+              <a:rPr lang="en-GB" sz="6000" dirty="0">
+                <a:ln w="0"/>
+                <a:effectLst>
+                  <a:outerShdw blurRad="38100" dist="19050" dir="2700000" algn="tl" rotWithShape="0">
+                    <a:schemeClr val="dk1">
+                      <a:alpha val="40000"/>
+                    </a:schemeClr>
+                  </a:outerShdw>
+                </a:effectLst>
+              </a:rPr>
+              <a:t>BACK CORRIDOR</a:t>
+            </a:r>
+          </a:p>
+        </p:txBody>
+      </p:sp>
+      <p:sp>
+        <p:nvSpPr>
+          <p:cNvPr id="8" name="TextBox 7">
+            <a:extLst>
+              <a:ext uri="{FF2B5EF4-FFF2-40B4-BE49-F238E27FC236}">
+                <a16:creationId xmlns:a16="http://schemas.microsoft.com/office/drawing/2014/main" id="{51063EFD-D87B-47E5-79E9-FFB1599A69D4}"/>
+              </a:ext>
+            </a:extLst>
+          </p:cNvPr>
+          <p:cNvSpPr txBox="1"/>
+          <p:nvPr/>
+        </p:nvSpPr>
+        <p:spPr>
+          <a:xfrm>
+            <a:off x="-3" y="4315469"/>
+            <a:ext cx="7920000" cy="1440000"/>
+          </a:xfrm>
+          <a:prstGeom prst="rect">
+            <a:avLst/>
+          </a:prstGeom>
+          <a:noFill/>
+        </p:spPr>
+        <p:txBody>
+          <a:bodyPr wrap="none" rtlCol="0" anchor="ctr">
+            <a:noAutofit/>
+          </a:bodyPr>
+          <a:lstStyle/>
+          <a:p>
+            <a:pPr algn="ctr"/>
+            <a:r>
+              <a:rPr lang="en-GB" sz="6000" dirty="0">
+                <a:ln w="0"/>
+                <a:effectLst>
+                  <a:outerShdw blurRad="38100" dist="19050" dir="2700000" algn="tl" rotWithShape="0">
+                    <a:schemeClr val="dk1">
+                      <a:alpha val="40000"/>
+                    </a:schemeClr>
+                  </a:outerShdw>
+                </a:effectLst>
+              </a:rPr>
+              <a:t>RECREATION CORRIDOR</a:t>
+            </a:r>
+          </a:p>
+        </p:txBody>
+      </p:sp>
+    </p:spTree>
+    <p:extLst>
+      <p:ext uri="{BB962C8B-B14F-4D97-AF65-F5344CB8AC3E}">
+        <p14:creationId xmlns:p14="http://schemas.microsoft.com/office/powerpoint/2010/main" val="3715862531"/>
+      </p:ext>
+    </p:extLst>
+  </p:cSld>
+  <p:clrMapOvr>
+    <a:masterClrMapping/>
+  </p:clrMapOvr>
+</p:sld>
+</file>
+
+<file path=ppt/slides/slide7.xml><?xml version="1.0" encoding="utf-8"?>
+<p:sld xmlns:a="http://schemas.openxmlformats.org/drawingml/2006/main" xmlns:r="http://schemas.openxmlformats.org/officeDocument/2006/relationships" xmlns:p="http://schemas.openxmlformats.org/presentationml/2006/main">
+  <p:cSld>
+    <p:spTree>
+      <p:nvGrpSpPr>
+        <p:cNvPr id="1" name="">
+          <a:extLst>
+            <a:ext uri="{FF2B5EF4-FFF2-40B4-BE49-F238E27FC236}">
+              <a16:creationId xmlns:a16="http://schemas.microsoft.com/office/drawing/2014/main" id="{57F0B349-CDED-3A53-B630-84FC42432586}"/>
+            </a:ext>
+          </a:extLst>
+        </p:cNvPr>
+        <p:cNvGrpSpPr/>
+        <p:nvPr/>
+      </p:nvGrpSpPr>
+      <p:grpSpPr>
+        <a:xfrm>
+          <a:off x="0" y="0"/>
+          <a:ext cx="0" cy="0"/>
+          <a:chOff x="0" y="0"/>
+          <a:chExt cx="0" cy="0"/>
+        </a:xfrm>
+      </p:grpSpPr>
+      <p:sp>
+        <p:nvSpPr>
+          <p:cNvPr id="2" name="TextBox 1">
+            <a:extLst>
+              <a:ext uri="{FF2B5EF4-FFF2-40B4-BE49-F238E27FC236}">
+                <a16:creationId xmlns:a16="http://schemas.microsoft.com/office/drawing/2014/main" id="{BB7647E1-BC2F-6C29-825C-B0F0C1CEAF80}"/>
+              </a:ext>
+            </a:extLst>
+          </p:cNvPr>
+          <p:cNvSpPr txBox="1"/>
+          <p:nvPr/>
+        </p:nvSpPr>
+        <p:spPr>
+          <a:xfrm>
+            <a:off x="-2" y="0"/>
+            <a:ext cx="7920000" cy="1440000"/>
+          </a:xfrm>
+          <a:prstGeom prst="rect">
+            <a:avLst/>
+          </a:prstGeom>
+          <a:noFill/>
+        </p:spPr>
+        <p:txBody>
+          <a:bodyPr wrap="none" rtlCol="0" anchor="ctr">
+            <a:noAutofit/>
+          </a:bodyPr>
+          <a:lstStyle/>
+          <a:p>
+            <a:pPr algn="ctr"/>
+            <a:r>
+              <a:rPr lang="en-GB" sz="6000" dirty="0">
+                <a:ln w="0"/>
+                <a:effectLst>
+                  <a:outerShdw blurRad="38100" dist="19050" dir="2700000" algn="tl" rotWithShape="0">
+                    <a:schemeClr val="dk1">
+                      <a:alpha val="40000"/>
+                    </a:schemeClr>
+                  </a:outerShdw>
+                </a:effectLst>
+              </a:rPr>
+              <a:t>STAIRS (DOWN)</a:t>
+            </a:r>
+          </a:p>
+        </p:txBody>
+      </p:sp>
+      <p:sp>
+        <p:nvSpPr>
+          <p:cNvPr id="3" name="TextBox 2">
+            <a:extLst>
+              <a:ext uri="{FF2B5EF4-FFF2-40B4-BE49-F238E27FC236}">
+                <a16:creationId xmlns:a16="http://schemas.microsoft.com/office/drawing/2014/main" id="{242804D0-0641-1DC3-266A-5AE127786469}"/>
+              </a:ext>
+            </a:extLst>
+          </p:cNvPr>
+          <p:cNvSpPr txBox="1"/>
+          <p:nvPr/>
+        </p:nvSpPr>
+        <p:spPr>
+          <a:xfrm>
+            <a:off x="-2" y="1438651"/>
+            <a:ext cx="7920000" cy="1440000"/>
+          </a:xfrm>
+          <a:prstGeom prst="rect">
+            <a:avLst/>
+          </a:prstGeom>
+          <a:noFill/>
+        </p:spPr>
+        <p:txBody>
+          <a:bodyPr wrap="none" rtlCol="0" anchor="ctr">
+            <a:noAutofit/>
+          </a:bodyPr>
+          <a:lstStyle/>
+          <a:p>
+            <a:pPr algn="ctr"/>
+            <a:r>
+              <a:rPr lang="en-GB" sz="6000" dirty="0">
+                <a:ln w="0"/>
+                <a:effectLst>
+                  <a:outerShdw blurRad="38100" dist="19050" dir="2700000" algn="tl" rotWithShape="0">
+                    <a:schemeClr val="dk1">
+                      <a:alpha val="40000"/>
+                    </a:schemeClr>
+                  </a:outerShdw>
+                </a:effectLst>
+              </a:rPr>
+              <a:t>STAIRS (UP)</a:t>
+            </a:r>
+          </a:p>
+        </p:txBody>
+      </p:sp>
+      <p:sp>
+        <p:nvSpPr>
+          <p:cNvPr id="7" name="TextBox 6">
+            <a:extLst>
+              <a:ext uri="{FF2B5EF4-FFF2-40B4-BE49-F238E27FC236}">
+                <a16:creationId xmlns:a16="http://schemas.microsoft.com/office/drawing/2014/main" id="{C2DDB21A-FC56-ACC9-CEE9-F896B50722FF}"/>
+              </a:ext>
+            </a:extLst>
+          </p:cNvPr>
+          <p:cNvSpPr txBox="1"/>
+          <p:nvPr/>
+        </p:nvSpPr>
+        <p:spPr>
+          <a:xfrm>
+            <a:off x="-1" y="2877977"/>
+            <a:ext cx="7920000" cy="1440000"/>
+          </a:xfrm>
+          <a:prstGeom prst="rect">
+            <a:avLst/>
+          </a:prstGeom>
+          <a:noFill/>
+        </p:spPr>
+        <p:txBody>
+          <a:bodyPr wrap="none" rtlCol="0" anchor="ctr">
+            <a:noAutofit/>
+          </a:bodyPr>
+          <a:lstStyle/>
+          <a:p>
+            <a:pPr algn="ctr"/>
+            <a:r>
+              <a:rPr lang="en-GB" sz="6000" dirty="0">
+                <a:ln w="0"/>
+                <a:effectLst>
+                  <a:outerShdw blurRad="38100" dist="19050" dir="2700000" algn="tl" rotWithShape="0">
+                    <a:schemeClr val="dk1">
+                      <a:alpha val="40000"/>
+                    </a:schemeClr>
+                  </a:outerShdw>
+                </a:effectLst>
+              </a:rPr>
+              <a:t>CELLS LANDING</a:t>
+            </a:r>
+          </a:p>
+        </p:txBody>
+      </p:sp>
+    </p:spTree>
+    <p:extLst>
+      <p:ext uri="{BB962C8B-B14F-4D97-AF65-F5344CB8AC3E}">
+        <p14:creationId xmlns:p14="http://schemas.microsoft.com/office/powerpoint/2010/main" val="3773736444"/>
+      </p:ext>
+    </p:extLst>
+  </p:cSld>
+  <p:clrMapOvr>
+    <a:masterClrMapping/>
+  </p:clrMapOvr>
+</p:sld>
+</file>
+
+<file path=ppt/slides/slide8.xml><?xml version="1.0" encoding="utf-8"?>
 <p:sld xmlns:a="http://schemas.openxmlformats.org/drawingml/2006/main" xmlns:r="http://schemas.openxmlformats.org/officeDocument/2006/relationships" xmlns:p="http://schemas.openxmlformats.org/presentationml/2006/main">
   <p:cSld>
     <p:spTree>
@@ -4367,7 +4695,7 @@
 </p:sld>
 </file>
 
-<file path=ppt/slides/slide5.xml><?xml version="1.0" encoding="utf-8"?>
+<file path=ppt/slides/slide9.xml><?xml version="1.0" encoding="utf-8"?>
 <p:sld xmlns:a="http://schemas.openxmlformats.org/drawingml/2006/main" xmlns:r="http://schemas.openxmlformats.org/officeDocument/2006/relationships" xmlns:p="http://schemas.openxmlformats.org/presentationml/2006/main">
   <p:cSld>
     <p:spTree>

</xml_diff>

<commit_message>
Completed Security Cameras feeding Security Monitors in Security office
</commit_message>
<xml_diff>
--- a/Assets/Materials + Textures/Personal/Roomnames/Roomnames.pptx
+++ b/Assets/Materials + Textures/Personal/Roomnames/Roomnames.pptx
@@ -269,7 +269,7 @@
           <a:p>
             <a:fld id="{14389514-1D2E-45F5-8DC5-A75A64E20C29}" type="datetimeFigureOut">
               <a:rPr lang="en-GB" smtClean="0"/>
-              <a:t>14/08/2025</a:t>
+              <a:t>15/08/2025</a:t>
             </a:fld>
             <a:endParaRPr lang="en-GB"/>
           </a:p>
@@ -469,7 +469,7 @@
           <a:p>
             <a:fld id="{14389514-1D2E-45F5-8DC5-A75A64E20C29}" type="datetimeFigureOut">
               <a:rPr lang="en-GB" smtClean="0"/>
-              <a:t>14/08/2025</a:t>
+              <a:t>15/08/2025</a:t>
             </a:fld>
             <a:endParaRPr lang="en-GB"/>
           </a:p>
@@ -679,7 +679,7 @@
           <a:p>
             <a:fld id="{14389514-1D2E-45F5-8DC5-A75A64E20C29}" type="datetimeFigureOut">
               <a:rPr lang="en-GB" smtClean="0"/>
-              <a:t>14/08/2025</a:t>
+              <a:t>15/08/2025</a:t>
             </a:fld>
             <a:endParaRPr lang="en-GB"/>
           </a:p>
@@ -879,7 +879,7 @@
           <a:p>
             <a:fld id="{14389514-1D2E-45F5-8DC5-A75A64E20C29}" type="datetimeFigureOut">
               <a:rPr lang="en-GB" smtClean="0"/>
-              <a:t>14/08/2025</a:t>
+              <a:t>15/08/2025</a:t>
             </a:fld>
             <a:endParaRPr lang="en-GB"/>
           </a:p>
@@ -1155,7 +1155,7 @@
           <a:p>
             <a:fld id="{14389514-1D2E-45F5-8DC5-A75A64E20C29}" type="datetimeFigureOut">
               <a:rPr lang="en-GB" smtClean="0"/>
-              <a:t>14/08/2025</a:t>
+              <a:t>15/08/2025</a:t>
             </a:fld>
             <a:endParaRPr lang="en-GB"/>
           </a:p>
@@ -1423,7 +1423,7 @@
           <a:p>
             <a:fld id="{14389514-1D2E-45F5-8DC5-A75A64E20C29}" type="datetimeFigureOut">
               <a:rPr lang="en-GB" smtClean="0"/>
-              <a:t>14/08/2025</a:t>
+              <a:t>15/08/2025</a:t>
             </a:fld>
             <a:endParaRPr lang="en-GB"/>
           </a:p>
@@ -1838,7 +1838,7 @@
           <a:p>
             <a:fld id="{14389514-1D2E-45F5-8DC5-A75A64E20C29}" type="datetimeFigureOut">
               <a:rPr lang="en-GB" smtClean="0"/>
-              <a:t>14/08/2025</a:t>
+              <a:t>15/08/2025</a:t>
             </a:fld>
             <a:endParaRPr lang="en-GB"/>
           </a:p>
@@ -1980,7 +1980,7 @@
           <a:p>
             <a:fld id="{14389514-1D2E-45F5-8DC5-A75A64E20C29}" type="datetimeFigureOut">
               <a:rPr lang="en-GB" smtClean="0"/>
-              <a:t>14/08/2025</a:t>
+              <a:t>15/08/2025</a:t>
             </a:fld>
             <a:endParaRPr lang="en-GB"/>
           </a:p>
@@ -2093,7 +2093,7 @@
           <a:p>
             <a:fld id="{14389514-1D2E-45F5-8DC5-A75A64E20C29}" type="datetimeFigureOut">
               <a:rPr lang="en-GB" smtClean="0"/>
-              <a:t>14/08/2025</a:t>
+              <a:t>15/08/2025</a:t>
             </a:fld>
             <a:endParaRPr lang="en-GB"/>
           </a:p>
@@ -2406,7 +2406,7 @@
           <a:p>
             <a:fld id="{14389514-1D2E-45F5-8DC5-A75A64E20C29}" type="datetimeFigureOut">
               <a:rPr lang="en-GB" smtClean="0"/>
-              <a:t>14/08/2025</a:t>
+              <a:t>15/08/2025</a:t>
             </a:fld>
             <a:endParaRPr lang="en-GB"/>
           </a:p>
@@ -2695,7 +2695,7 @@
           <a:p>
             <a:fld id="{14389514-1D2E-45F5-8DC5-A75A64E20C29}" type="datetimeFigureOut">
               <a:rPr lang="en-GB" smtClean="0"/>
-              <a:t>14/08/2025</a:t>
+              <a:t>15/08/2025</a:t>
             </a:fld>
             <a:endParaRPr lang="en-GB"/>
           </a:p>
@@ -2938,7 +2938,7 @@
           <a:p>
             <a:fld id="{14389514-1D2E-45F5-8DC5-A75A64E20C29}" type="datetimeFigureOut">
               <a:rPr lang="en-GB" smtClean="0"/>
-              <a:t>14/08/2025</a:t>
+              <a:t>15/08/2025</a:t>
             </a:fld>
             <a:endParaRPr lang="en-GB"/>
           </a:p>
@@ -3601,7 +3601,7 @@
                   </a:outerShdw>
                 </a:effectLst>
               </a:rPr>
-              <a:t>PROPERTY OFFICE</a:t>
+              <a:t>STORAGE ROOM</a:t>
             </a:r>
           </a:p>
         </p:txBody>
@@ -3899,6 +3899,51 @@
                 </a:effectLst>
               </a:rPr>
               <a:t>SHOWER BLOCK</a:t>
+            </a:r>
+          </a:p>
+        </p:txBody>
+      </p:sp>
+      <p:sp>
+        <p:nvSpPr>
+          <p:cNvPr id="2" name="TextBox 1">
+            <a:extLst>
+              <a:ext uri="{FF2B5EF4-FFF2-40B4-BE49-F238E27FC236}">
+                <a16:creationId xmlns:a16="http://schemas.microsoft.com/office/drawing/2014/main" id="{D869A6C0-B69E-F3EA-8985-1417FAAA426E}"/>
+              </a:ext>
+            </a:extLst>
+          </p:cNvPr>
+          <p:cNvSpPr txBox="1"/>
+          <p:nvPr/>
+        </p:nvSpPr>
+        <p:spPr>
+          <a:xfrm>
+            <a:off x="0" y="2880000"/>
+            <a:ext cx="6480000" cy="1440000"/>
+          </a:xfrm>
+          <a:prstGeom prst="rect">
+            <a:avLst/>
+          </a:prstGeom>
+          <a:noFill/>
+        </p:spPr>
+        <p:txBody>
+          <a:bodyPr wrap="none" rtlCol="0" anchor="ctr">
+            <a:noAutofit/>
+          </a:bodyPr>
+          <a:lstStyle/>
+          <a:p>
+            <a:pPr algn="ctr"/>
+            <a:r>
+              <a:rPr lang="en-GB" sz="6000" dirty="0">
+                <a:ln w="0"/>
+                <a:effectLst>
+                  <a:outerShdw blurRad="38100" dist="19050" dir="2700000" algn="tl" rotWithShape="0">
+                    <a:schemeClr val="dk1">
+                      <a:alpha val="40000"/>
+                    </a:schemeClr>
+                  </a:outerShdw>
+                </a:effectLst>
+              </a:rPr>
+              <a:t>NO CAMERA FEED</a:t>
             </a:r>
           </a:p>
         </p:txBody>

</xml_diff>

<commit_message>
Getting UIDocument in world space responding to mouse correctly
Many thanks to https://www.youtube.com/watch?v=gXx_j-6z8jY MadCat tutorials on getting mouse translated to the UI document
</commit_message>
<xml_diff>
--- a/Assets/Materials + Textures/Personal/Roomnames/Roomnames.pptx
+++ b/Assets/Materials + Textures/Personal/Roomnames/Roomnames.pptx
@@ -14,6 +14,7 @@
     <p:sldId id="265" r:id="rId8"/>
     <p:sldId id="258" r:id="rId9"/>
     <p:sldId id="259" r:id="rId10"/>
+    <p:sldId id="266" r:id="rId11"/>
   </p:sldIdLst>
   <p:sldSz cx="12192000" cy="6858000"/>
   <p:notesSz cx="6858000" cy="9144000"/>
@@ -269,7 +270,7 @@
           <a:p>
             <a:fld id="{14389514-1D2E-45F5-8DC5-A75A64E20C29}" type="datetimeFigureOut">
               <a:rPr lang="en-GB" smtClean="0"/>
-              <a:t>15/08/2025</a:t>
+              <a:t>17/08/2025</a:t>
             </a:fld>
             <a:endParaRPr lang="en-GB"/>
           </a:p>
@@ -469,7 +470,7 @@
           <a:p>
             <a:fld id="{14389514-1D2E-45F5-8DC5-A75A64E20C29}" type="datetimeFigureOut">
               <a:rPr lang="en-GB" smtClean="0"/>
-              <a:t>15/08/2025</a:t>
+              <a:t>17/08/2025</a:t>
             </a:fld>
             <a:endParaRPr lang="en-GB"/>
           </a:p>
@@ -679,7 +680,7 @@
           <a:p>
             <a:fld id="{14389514-1D2E-45F5-8DC5-A75A64E20C29}" type="datetimeFigureOut">
               <a:rPr lang="en-GB" smtClean="0"/>
-              <a:t>15/08/2025</a:t>
+              <a:t>17/08/2025</a:t>
             </a:fld>
             <a:endParaRPr lang="en-GB"/>
           </a:p>
@@ -879,7 +880,7 @@
           <a:p>
             <a:fld id="{14389514-1D2E-45F5-8DC5-A75A64E20C29}" type="datetimeFigureOut">
               <a:rPr lang="en-GB" smtClean="0"/>
-              <a:t>15/08/2025</a:t>
+              <a:t>17/08/2025</a:t>
             </a:fld>
             <a:endParaRPr lang="en-GB"/>
           </a:p>
@@ -1155,7 +1156,7 @@
           <a:p>
             <a:fld id="{14389514-1D2E-45F5-8DC5-A75A64E20C29}" type="datetimeFigureOut">
               <a:rPr lang="en-GB" smtClean="0"/>
-              <a:t>15/08/2025</a:t>
+              <a:t>17/08/2025</a:t>
             </a:fld>
             <a:endParaRPr lang="en-GB"/>
           </a:p>
@@ -1423,7 +1424,7 @@
           <a:p>
             <a:fld id="{14389514-1D2E-45F5-8DC5-A75A64E20C29}" type="datetimeFigureOut">
               <a:rPr lang="en-GB" smtClean="0"/>
-              <a:t>15/08/2025</a:t>
+              <a:t>17/08/2025</a:t>
             </a:fld>
             <a:endParaRPr lang="en-GB"/>
           </a:p>
@@ -1838,7 +1839,7 @@
           <a:p>
             <a:fld id="{14389514-1D2E-45F5-8DC5-A75A64E20C29}" type="datetimeFigureOut">
               <a:rPr lang="en-GB" smtClean="0"/>
-              <a:t>15/08/2025</a:t>
+              <a:t>17/08/2025</a:t>
             </a:fld>
             <a:endParaRPr lang="en-GB"/>
           </a:p>
@@ -1980,7 +1981,7 @@
           <a:p>
             <a:fld id="{14389514-1D2E-45F5-8DC5-A75A64E20C29}" type="datetimeFigureOut">
               <a:rPr lang="en-GB" smtClean="0"/>
-              <a:t>15/08/2025</a:t>
+              <a:t>17/08/2025</a:t>
             </a:fld>
             <a:endParaRPr lang="en-GB"/>
           </a:p>
@@ -2093,7 +2094,7 @@
           <a:p>
             <a:fld id="{14389514-1D2E-45F5-8DC5-A75A64E20C29}" type="datetimeFigureOut">
               <a:rPr lang="en-GB" smtClean="0"/>
-              <a:t>15/08/2025</a:t>
+              <a:t>17/08/2025</a:t>
             </a:fld>
             <a:endParaRPr lang="en-GB"/>
           </a:p>
@@ -2406,7 +2407,7 @@
           <a:p>
             <a:fld id="{14389514-1D2E-45F5-8DC5-A75A64E20C29}" type="datetimeFigureOut">
               <a:rPr lang="en-GB" smtClean="0"/>
-              <a:t>15/08/2025</a:t>
+              <a:t>17/08/2025</a:t>
             </a:fld>
             <a:endParaRPr lang="en-GB"/>
           </a:p>
@@ -2695,7 +2696,7 @@
           <a:p>
             <a:fld id="{14389514-1D2E-45F5-8DC5-A75A64E20C29}" type="datetimeFigureOut">
               <a:rPr lang="en-GB" smtClean="0"/>
-              <a:t>15/08/2025</a:t>
+              <a:t>17/08/2025</a:t>
             </a:fld>
             <a:endParaRPr lang="en-GB"/>
           </a:p>
@@ -2938,7 +2939,7 @@
           <a:p>
             <a:fld id="{14389514-1D2E-45F5-8DC5-A75A64E20C29}" type="datetimeFigureOut">
               <a:rPr lang="en-GB" smtClean="0"/>
-              <a:t>15/08/2025</a:t>
+              <a:t>17/08/2025</a:t>
             </a:fld>
             <a:endParaRPr lang="en-GB"/>
           </a:p>
@@ -3409,6 +3410,72 @@
 </p:sld>
 </file>
 
+<file path=ppt/slides/slide10.xml><?xml version="1.0" encoding="utf-8"?>
+<p:sld xmlns:a="http://schemas.openxmlformats.org/drawingml/2006/main" xmlns:r="http://schemas.openxmlformats.org/officeDocument/2006/relationships" xmlns:p="http://schemas.openxmlformats.org/presentationml/2006/main">
+  <p:cSld>
+    <p:spTree>
+      <p:nvGrpSpPr>
+        <p:cNvPr id="1" name=""/>
+        <p:cNvGrpSpPr/>
+        <p:nvPr/>
+      </p:nvGrpSpPr>
+      <p:grpSpPr>
+        <a:xfrm>
+          <a:off x="0" y="0"/>
+          <a:ext cx="0" cy="0"/>
+          <a:chOff x="0" y="0"/>
+          <a:chExt cx="0" cy="0"/>
+        </a:xfrm>
+      </p:grpSpPr>
+      <p:pic>
+        <p:nvPicPr>
+          <p:cNvPr id="3" name="Graphic 2" descr="Cursor with solid fill">
+            <a:extLst>
+              <a:ext uri="{FF2B5EF4-FFF2-40B4-BE49-F238E27FC236}">
+                <a16:creationId xmlns:a16="http://schemas.microsoft.com/office/drawing/2014/main" id="{6B2F1398-AF8F-6A7E-D642-6F0D89C572FB}"/>
+              </a:ext>
+            </a:extLst>
+          </p:cNvPr>
+          <p:cNvPicPr>
+            <a:picLocks noChangeAspect="1"/>
+          </p:cNvPicPr>
+          <p:nvPr/>
+        </p:nvPicPr>
+        <p:blipFill>
+          <a:blip r:embed="rId2">
+            <a:extLst>
+              <a:ext uri="{96DAC541-7B7A-43D3-8B79-37D633B846F1}">
+                <asvg:svgBlip xmlns:asvg="http://schemas.microsoft.com/office/drawing/2016/SVG/main" r:embed="rId3"/>
+              </a:ext>
+            </a:extLst>
+          </a:blip>
+          <a:stretch>
+            <a:fillRect/>
+          </a:stretch>
+        </p:blipFill>
+        <p:spPr>
+          <a:xfrm>
+            <a:off x="5638800" y="2971800"/>
+            <a:ext cx="914400" cy="914400"/>
+          </a:xfrm>
+          <a:prstGeom prst="rect">
+            <a:avLst/>
+          </a:prstGeom>
+        </p:spPr>
+      </p:pic>
+    </p:spTree>
+    <p:extLst>
+      <p:ext uri="{BB962C8B-B14F-4D97-AF65-F5344CB8AC3E}">
+        <p14:creationId xmlns:p14="http://schemas.microsoft.com/office/powerpoint/2010/main" val="692779925"/>
+      </p:ext>
+    </p:extLst>
+  </p:cSld>
+  <p:clrMapOvr>
+    <a:masterClrMapping/>
+  </p:clrMapOvr>
+</p:sld>
+</file>
+
 <file path=ppt/slides/slide2.xml><?xml version="1.0" encoding="utf-8"?>
 <p:sld xmlns:a="http://schemas.openxmlformats.org/drawingml/2006/main" xmlns:r="http://schemas.openxmlformats.org/officeDocument/2006/relationships" xmlns:p="http://schemas.openxmlformats.org/presentationml/2006/main">
   <p:cSld>

</xml_diff>

<commit_message>
Started to get list of security cameras to turn on/off on SecurityCamer App
</commit_message>
<xml_diff>
--- a/Assets/Materials + Textures/Personal/Roomnames/Roomnames.pptx
+++ b/Assets/Materials + Textures/Personal/Roomnames/Roomnames.pptx
@@ -270,7 +270,7 @@
           <a:p>
             <a:fld id="{14389514-1D2E-45F5-8DC5-A75A64E20C29}" type="datetimeFigureOut">
               <a:rPr lang="en-GB" smtClean="0"/>
-              <a:t>17/08/2025</a:t>
+              <a:t>23/08/2025</a:t>
             </a:fld>
             <a:endParaRPr lang="en-GB"/>
           </a:p>
@@ -470,7 +470,7 @@
           <a:p>
             <a:fld id="{14389514-1D2E-45F5-8DC5-A75A64E20C29}" type="datetimeFigureOut">
               <a:rPr lang="en-GB" smtClean="0"/>
-              <a:t>17/08/2025</a:t>
+              <a:t>23/08/2025</a:t>
             </a:fld>
             <a:endParaRPr lang="en-GB"/>
           </a:p>
@@ -680,7 +680,7 @@
           <a:p>
             <a:fld id="{14389514-1D2E-45F5-8DC5-A75A64E20C29}" type="datetimeFigureOut">
               <a:rPr lang="en-GB" smtClean="0"/>
-              <a:t>17/08/2025</a:t>
+              <a:t>23/08/2025</a:t>
             </a:fld>
             <a:endParaRPr lang="en-GB"/>
           </a:p>
@@ -880,7 +880,7 @@
           <a:p>
             <a:fld id="{14389514-1D2E-45F5-8DC5-A75A64E20C29}" type="datetimeFigureOut">
               <a:rPr lang="en-GB" smtClean="0"/>
-              <a:t>17/08/2025</a:t>
+              <a:t>23/08/2025</a:t>
             </a:fld>
             <a:endParaRPr lang="en-GB"/>
           </a:p>
@@ -1156,7 +1156,7 @@
           <a:p>
             <a:fld id="{14389514-1D2E-45F5-8DC5-A75A64E20C29}" type="datetimeFigureOut">
               <a:rPr lang="en-GB" smtClean="0"/>
-              <a:t>17/08/2025</a:t>
+              <a:t>23/08/2025</a:t>
             </a:fld>
             <a:endParaRPr lang="en-GB"/>
           </a:p>
@@ -1424,7 +1424,7 @@
           <a:p>
             <a:fld id="{14389514-1D2E-45F5-8DC5-A75A64E20C29}" type="datetimeFigureOut">
               <a:rPr lang="en-GB" smtClean="0"/>
-              <a:t>17/08/2025</a:t>
+              <a:t>23/08/2025</a:t>
             </a:fld>
             <a:endParaRPr lang="en-GB"/>
           </a:p>
@@ -1839,7 +1839,7 @@
           <a:p>
             <a:fld id="{14389514-1D2E-45F5-8DC5-A75A64E20C29}" type="datetimeFigureOut">
               <a:rPr lang="en-GB" smtClean="0"/>
-              <a:t>17/08/2025</a:t>
+              <a:t>23/08/2025</a:t>
             </a:fld>
             <a:endParaRPr lang="en-GB"/>
           </a:p>
@@ -1981,7 +1981,7 @@
           <a:p>
             <a:fld id="{14389514-1D2E-45F5-8DC5-A75A64E20C29}" type="datetimeFigureOut">
               <a:rPr lang="en-GB" smtClean="0"/>
-              <a:t>17/08/2025</a:t>
+              <a:t>23/08/2025</a:t>
             </a:fld>
             <a:endParaRPr lang="en-GB"/>
           </a:p>
@@ -2094,7 +2094,7 @@
           <a:p>
             <a:fld id="{14389514-1D2E-45F5-8DC5-A75A64E20C29}" type="datetimeFigureOut">
               <a:rPr lang="en-GB" smtClean="0"/>
-              <a:t>17/08/2025</a:t>
+              <a:t>23/08/2025</a:t>
             </a:fld>
             <a:endParaRPr lang="en-GB"/>
           </a:p>
@@ -2407,7 +2407,7 @@
           <a:p>
             <a:fld id="{14389514-1D2E-45F5-8DC5-A75A64E20C29}" type="datetimeFigureOut">
               <a:rPr lang="en-GB" smtClean="0"/>
-              <a:t>17/08/2025</a:t>
+              <a:t>23/08/2025</a:t>
             </a:fld>
             <a:endParaRPr lang="en-GB"/>
           </a:p>
@@ -2696,7 +2696,7 @@
           <a:p>
             <a:fld id="{14389514-1D2E-45F5-8DC5-A75A64E20C29}" type="datetimeFigureOut">
               <a:rPr lang="en-GB" smtClean="0"/>
-              <a:t>17/08/2025</a:t>
+              <a:t>23/08/2025</a:t>
             </a:fld>
             <a:endParaRPr lang="en-GB"/>
           </a:p>
@@ -2939,7 +2939,7 @@
           <a:p>
             <a:fld id="{14389514-1D2E-45F5-8DC5-A75A64E20C29}" type="datetimeFigureOut">
               <a:rPr lang="en-GB" smtClean="0"/>
-              <a:t>17/08/2025</a:t>
+              <a:t>23/08/2025</a:t>
             </a:fld>
             <a:endParaRPr lang="en-GB"/>
           </a:p>
@@ -3463,6 +3463,42 @@
           </a:prstGeom>
         </p:spPr>
       </p:pic>
+      <p:pic>
+        <p:nvPicPr>
+          <p:cNvPr id="4" name="Graphic 3" descr="Security camera with solid fill">
+            <a:extLst>
+              <a:ext uri="{FF2B5EF4-FFF2-40B4-BE49-F238E27FC236}">
+                <a16:creationId xmlns:a16="http://schemas.microsoft.com/office/drawing/2014/main" id="{39451223-6A3D-7745-E369-95169324885A}"/>
+              </a:ext>
+            </a:extLst>
+          </p:cNvPr>
+          <p:cNvPicPr>
+            <a:picLocks noChangeAspect="1"/>
+          </p:cNvPicPr>
+          <p:nvPr/>
+        </p:nvPicPr>
+        <p:blipFill>
+          <a:blip r:embed="rId4">
+            <a:extLst>
+              <a:ext uri="{96DAC541-7B7A-43D3-8B79-37D633B846F1}">
+                <asvg:svgBlip xmlns:asvg="http://schemas.microsoft.com/office/drawing/2016/SVG/main" r:embed="rId5"/>
+              </a:ext>
+            </a:extLst>
+          </a:blip>
+          <a:stretch>
+            <a:fillRect/>
+          </a:stretch>
+        </p:blipFill>
+        <p:spPr>
+          <a:xfrm>
+            <a:off x="2837330" y="1353671"/>
+            <a:ext cx="914400" cy="914400"/>
+          </a:xfrm>
+          <a:prstGeom prst="rect">
+            <a:avLst/>
+          </a:prstGeom>
+        </p:spPr>
+      </p:pic>
     </p:spTree>
     <p:extLst>
       <p:ext uri="{BB962C8B-B14F-4D97-AF65-F5344CB8AC3E}">

</xml_diff>

<commit_message>
Editor quest, task, completion events completed
Now use a single copy of the data held in Globals that is a copy of QuestHelper quests, tasks and completion events List<strings> rather than copying afresh every use
</commit_message>
<xml_diff>
--- a/Assets/Materials + Textures/Personal/Roomnames/Roomnames.pptx
+++ b/Assets/Materials + Textures/Personal/Roomnames/Roomnames.pptx
@@ -270,7 +270,7 @@
           <a:p>
             <a:fld id="{14389514-1D2E-45F5-8DC5-A75A64E20C29}" type="datetimeFigureOut">
               <a:rPr lang="en-GB" smtClean="0"/>
-              <a:t>24/08/2025</a:t>
+              <a:t>02/09/2025</a:t>
             </a:fld>
             <a:endParaRPr lang="en-GB"/>
           </a:p>
@@ -470,7 +470,7 @@
           <a:p>
             <a:fld id="{14389514-1D2E-45F5-8DC5-A75A64E20C29}" type="datetimeFigureOut">
               <a:rPr lang="en-GB" smtClean="0"/>
-              <a:t>24/08/2025</a:t>
+              <a:t>02/09/2025</a:t>
             </a:fld>
             <a:endParaRPr lang="en-GB"/>
           </a:p>
@@ -680,7 +680,7 @@
           <a:p>
             <a:fld id="{14389514-1D2E-45F5-8DC5-A75A64E20C29}" type="datetimeFigureOut">
               <a:rPr lang="en-GB" smtClean="0"/>
-              <a:t>24/08/2025</a:t>
+              <a:t>02/09/2025</a:t>
             </a:fld>
             <a:endParaRPr lang="en-GB"/>
           </a:p>
@@ -880,7 +880,7 @@
           <a:p>
             <a:fld id="{14389514-1D2E-45F5-8DC5-A75A64E20C29}" type="datetimeFigureOut">
               <a:rPr lang="en-GB" smtClean="0"/>
-              <a:t>24/08/2025</a:t>
+              <a:t>02/09/2025</a:t>
             </a:fld>
             <a:endParaRPr lang="en-GB"/>
           </a:p>
@@ -1156,7 +1156,7 @@
           <a:p>
             <a:fld id="{14389514-1D2E-45F5-8DC5-A75A64E20C29}" type="datetimeFigureOut">
               <a:rPr lang="en-GB" smtClean="0"/>
-              <a:t>24/08/2025</a:t>
+              <a:t>02/09/2025</a:t>
             </a:fld>
             <a:endParaRPr lang="en-GB"/>
           </a:p>
@@ -1424,7 +1424,7 @@
           <a:p>
             <a:fld id="{14389514-1D2E-45F5-8DC5-A75A64E20C29}" type="datetimeFigureOut">
               <a:rPr lang="en-GB" smtClean="0"/>
-              <a:t>24/08/2025</a:t>
+              <a:t>02/09/2025</a:t>
             </a:fld>
             <a:endParaRPr lang="en-GB"/>
           </a:p>
@@ -1839,7 +1839,7 @@
           <a:p>
             <a:fld id="{14389514-1D2E-45F5-8DC5-A75A64E20C29}" type="datetimeFigureOut">
               <a:rPr lang="en-GB" smtClean="0"/>
-              <a:t>24/08/2025</a:t>
+              <a:t>02/09/2025</a:t>
             </a:fld>
             <a:endParaRPr lang="en-GB"/>
           </a:p>
@@ -1981,7 +1981,7 @@
           <a:p>
             <a:fld id="{14389514-1D2E-45F5-8DC5-A75A64E20C29}" type="datetimeFigureOut">
               <a:rPr lang="en-GB" smtClean="0"/>
-              <a:t>24/08/2025</a:t>
+              <a:t>02/09/2025</a:t>
             </a:fld>
             <a:endParaRPr lang="en-GB"/>
           </a:p>
@@ -2094,7 +2094,7 @@
           <a:p>
             <a:fld id="{14389514-1D2E-45F5-8DC5-A75A64E20C29}" type="datetimeFigureOut">
               <a:rPr lang="en-GB" smtClean="0"/>
-              <a:t>24/08/2025</a:t>
+              <a:t>02/09/2025</a:t>
             </a:fld>
             <a:endParaRPr lang="en-GB"/>
           </a:p>
@@ -2407,7 +2407,7 @@
           <a:p>
             <a:fld id="{14389514-1D2E-45F5-8DC5-A75A64E20C29}" type="datetimeFigureOut">
               <a:rPr lang="en-GB" smtClean="0"/>
-              <a:t>24/08/2025</a:t>
+              <a:t>02/09/2025</a:t>
             </a:fld>
             <a:endParaRPr lang="en-GB"/>
           </a:p>
@@ -2696,7 +2696,7 @@
           <a:p>
             <a:fld id="{14389514-1D2E-45F5-8DC5-A75A64E20C29}" type="datetimeFigureOut">
               <a:rPr lang="en-GB" smtClean="0"/>
-              <a:t>24/08/2025</a:t>
+              <a:t>02/09/2025</a:t>
             </a:fld>
             <a:endParaRPr lang="en-GB"/>
           </a:p>
@@ -2939,7 +2939,7 @@
           <a:p>
             <a:fld id="{14389514-1D2E-45F5-8DC5-A75A64E20C29}" type="datetimeFigureOut">
               <a:rPr lang="en-GB" smtClean="0"/>
-              <a:t>24/08/2025</a:t>
+              <a:t>02/09/2025</a:t>
             </a:fld>
             <a:endParaRPr lang="en-GB"/>
           </a:p>
@@ -3535,6 +3535,267 @@
           </a:prstGeom>
         </p:spPr>
       </p:pic>
+      <p:grpSp>
+        <p:nvGrpSpPr>
+          <p:cNvPr id="14" name="Group 13">
+            <a:extLst>
+              <a:ext uri="{FF2B5EF4-FFF2-40B4-BE49-F238E27FC236}">
+                <a16:creationId xmlns:a16="http://schemas.microsoft.com/office/drawing/2014/main" id="{A19973E4-FF25-F4D0-24C2-4C1495700F5C}"/>
+              </a:ext>
+            </a:extLst>
+          </p:cNvPr>
+          <p:cNvGrpSpPr/>
+          <p:nvPr/>
+        </p:nvGrpSpPr>
+        <p:grpSpPr>
+          <a:xfrm>
+            <a:off x="7911540" y="1158875"/>
+            <a:ext cx="1873250" cy="1873250"/>
+            <a:chOff x="7911540" y="1158875"/>
+            <a:chExt cx="1873250" cy="1873250"/>
+          </a:xfrm>
+        </p:grpSpPr>
+        <p:grpSp>
+          <p:nvGrpSpPr>
+            <p:cNvPr id="13" name="Group 12">
+              <a:extLst>
+                <a:ext uri="{FF2B5EF4-FFF2-40B4-BE49-F238E27FC236}">
+                  <a16:creationId xmlns:a16="http://schemas.microsoft.com/office/drawing/2014/main" id="{64CFB030-CC85-137B-0E53-5FFCBDBDD299}"/>
+                </a:ext>
+              </a:extLst>
+            </p:cNvPr>
+            <p:cNvGrpSpPr/>
+            <p:nvPr/>
+          </p:nvGrpSpPr>
+          <p:grpSpPr>
+            <a:xfrm>
+              <a:off x="7933765" y="1353671"/>
+              <a:ext cx="1828800" cy="914400"/>
+              <a:chOff x="7933765" y="1353671"/>
+              <a:chExt cx="1828800" cy="914400"/>
+            </a:xfrm>
+          </p:grpSpPr>
+          <p:pic>
+            <p:nvPicPr>
+              <p:cNvPr id="6" name="Graphic 5" descr="Arrow Up with solid fill">
+                <a:extLst>
+                  <a:ext uri="{FF2B5EF4-FFF2-40B4-BE49-F238E27FC236}">
+                    <a16:creationId xmlns:a16="http://schemas.microsoft.com/office/drawing/2014/main" id="{529E2D4D-7C22-2C9A-1746-BC13FB690AFD}"/>
+                  </a:ext>
+                </a:extLst>
+              </p:cNvPr>
+              <p:cNvPicPr>
+                <a:picLocks noChangeAspect="1"/>
+              </p:cNvPicPr>
+              <p:nvPr/>
+            </p:nvPicPr>
+            <p:blipFill>
+              <a:blip r:embed="rId8">
+                <a:extLst>
+                  <a:ext uri="{96DAC541-7B7A-43D3-8B79-37D633B846F1}">
+                    <asvg:svgBlip xmlns:asvg="http://schemas.microsoft.com/office/drawing/2016/SVG/main" r:embed="rId9"/>
+                  </a:ext>
+                </a:extLst>
+              </a:blip>
+              <a:stretch>
+                <a:fillRect/>
+              </a:stretch>
+            </p:blipFill>
+            <p:spPr>
+              <a:xfrm>
+                <a:off x="7933765" y="1353671"/>
+                <a:ext cx="914400" cy="914400"/>
+              </a:xfrm>
+              <a:prstGeom prst="rect">
+                <a:avLst/>
+              </a:prstGeom>
+            </p:spPr>
+          </p:pic>
+          <p:pic>
+            <p:nvPicPr>
+              <p:cNvPr id="7" name="Graphic 6" descr="Arrow Up with solid fill">
+                <a:extLst>
+                  <a:ext uri="{FF2B5EF4-FFF2-40B4-BE49-F238E27FC236}">
+                    <a16:creationId xmlns:a16="http://schemas.microsoft.com/office/drawing/2014/main" id="{F432072F-0407-7295-04E0-DB42C98D9B01}"/>
+                  </a:ext>
+                </a:extLst>
+              </p:cNvPr>
+              <p:cNvPicPr>
+                <a:picLocks noChangeAspect="1"/>
+              </p:cNvPicPr>
+              <p:nvPr/>
+            </p:nvPicPr>
+            <p:blipFill>
+              <a:blip r:embed="rId8">
+                <a:extLst>
+                  <a:ext uri="{96DAC541-7B7A-43D3-8B79-37D633B846F1}">
+                    <asvg:svgBlip xmlns:asvg="http://schemas.microsoft.com/office/drawing/2016/SVG/main" r:embed="rId9"/>
+                  </a:ext>
+                </a:extLst>
+              </a:blip>
+              <a:stretch>
+                <a:fillRect/>
+              </a:stretch>
+            </p:blipFill>
+            <p:spPr>
+              <a:xfrm>
+                <a:off x="8848165" y="1353671"/>
+                <a:ext cx="914400" cy="914400"/>
+              </a:xfrm>
+              <a:prstGeom prst="rect">
+                <a:avLst/>
+              </a:prstGeom>
+            </p:spPr>
+          </p:pic>
+        </p:grpSp>
+        <p:sp>
+          <p:nvSpPr>
+            <p:cNvPr id="10" name="Rectangle 9">
+              <a:extLst>
+                <a:ext uri="{FF2B5EF4-FFF2-40B4-BE49-F238E27FC236}">
+                  <a16:creationId xmlns:a16="http://schemas.microsoft.com/office/drawing/2014/main" id="{4B0993CD-EF23-2403-1E69-B654C7AC0491}"/>
+                </a:ext>
+              </a:extLst>
+            </p:cNvPr>
+            <p:cNvSpPr/>
+            <p:nvPr/>
+          </p:nvSpPr>
+          <p:spPr>
+            <a:xfrm rot="10800000" flipV="1">
+              <a:off x="8148358" y="2305903"/>
+              <a:ext cx="1399614" cy="93166"/>
+            </a:xfrm>
+            <a:prstGeom prst="rect">
+              <a:avLst/>
+            </a:prstGeom>
+            <a:solidFill>
+              <a:schemeClr val="tx1"/>
+            </a:solidFill>
+            <a:ln>
+              <a:solidFill>
+                <a:schemeClr val="tx1"/>
+              </a:solidFill>
+            </a:ln>
+          </p:spPr>
+          <p:style>
+            <a:lnRef idx="2">
+              <a:schemeClr val="accent1">
+                <a:shade val="15000"/>
+              </a:schemeClr>
+            </a:lnRef>
+            <a:fillRef idx="1">
+              <a:schemeClr val="accent1"/>
+            </a:fillRef>
+            <a:effectRef idx="0">
+              <a:schemeClr val="accent1"/>
+            </a:effectRef>
+            <a:fontRef idx="minor">
+              <a:schemeClr val="lt1"/>
+            </a:fontRef>
+          </p:style>
+          <p:txBody>
+            <a:bodyPr rtlCol="0" anchor="ctr"/>
+            <a:lstStyle/>
+            <a:p>
+              <a:pPr algn="ctr"/>
+              <a:endParaRPr lang="en-GB"/>
+            </a:p>
+          </p:txBody>
+        </p:sp>
+        <p:sp>
+          <p:nvSpPr>
+            <p:cNvPr id="11" name="Rectangle: Rounded Corners 10">
+              <a:extLst>
+                <a:ext uri="{FF2B5EF4-FFF2-40B4-BE49-F238E27FC236}">
+                  <a16:creationId xmlns:a16="http://schemas.microsoft.com/office/drawing/2014/main" id="{68F3529A-EDE1-D2E4-C87C-B7BF1B3149F8}"/>
+                </a:ext>
+              </a:extLst>
+            </p:cNvPr>
+            <p:cNvSpPr/>
+            <p:nvPr/>
+          </p:nvSpPr>
+          <p:spPr>
+            <a:xfrm>
+              <a:off x="7911540" y="1158875"/>
+              <a:ext cx="1873250" cy="1873250"/>
+            </a:xfrm>
+            <a:prstGeom prst="roundRect">
+              <a:avLst/>
+            </a:prstGeom>
+            <a:noFill/>
+            <a:ln>
+              <a:solidFill>
+                <a:schemeClr val="tx1"/>
+              </a:solidFill>
+            </a:ln>
+          </p:spPr>
+          <p:style>
+            <a:lnRef idx="2">
+              <a:schemeClr val="accent1">
+                <a:shade val="15000"/>
+              </a:schemeClr>
+            </a:lnRef>
+            <a:fillRef idx="1">
+              <a:schemeClr val="accent1"/>
+            </a:fillRef>
+            <a:effectRef idx="0">
+              <a:schemeClr val="accent1"/>
+            </a:effectRef>
+            <a:fontRef idx="minor">
+              <a:schemeClr val="lt1"/>
+            </a:fontRef>
+          </p:style>
+          <p:txBody>
+            <a:bodyPr rtlCol="0" anchor="ctr"/>
+            <a:lstStyle/>
+            <a:p>
+              <a:pPr algn="ctr"/>
+              <a:endParaRPr lang="en-GB"/>
+            </a:p>
+          </p:txBody>
+        </p:sp>
+        <p:sp>
+          <p:nvSpPr>
+            <p:cNvPr id="12" name="TextBox 11">
+              <a:extLst>
+                <a:ext uri="{FF2B5EF4-FFF2-40B4-BE49-F238E27FC236}">
+                  <a16:creationId xmlns:a16="http://schemas.microsoft.com/office/drawing/2014/main" id="{69AF2C05-75CB-25E7-AB51-9523E69DA8C9}"/>
+                </a:ext>
+              </a:extLst>
+            </p:cNvPr>
+            <p:cNvSpPr txBox="1"/>
+            <p:nvPr/>
+          </p:nvSpPr>
+          <p:spPr>
+            <a:xfrm>
+              <a:off x="8148358" y="2484348"/>
+              <a:ext cx="1399614" cy="369332"/>
+            </a:xfrm>
+            <a:prstGeom prst="rect">
+              <a:avLst/>
+            </a:prstGeom>
+            <a:solidFill>
+              <a:schemeClr val="tx1"/>
+            </a:solidFill>
+          </p:spPr>
+          <p:txBody>
+            <a:bodyPr wrap="none" rtlCol="0">
+              <a:spAutoFit/>
+            </a:bodyPr>
+            <a:lstStyle/>
+            <a:p>
+              <a:r>
+                <a:rPr lang="en-GB" dirty="0">
+                  <a:solidFill>
+                    <a:schemeClr val="bg1"/>
+                  </a:solidFill>
+                </a:rPr>
+                <a:t>THIS WAY UP</a:t>
+              </a:r>
+            </a:p>
+          </p:txBody>
+        </p:sp>
+      </p:grpSp>
     </p:spTree>
     <p:extLst>
       <p:ext uri="{BB962C8B-B14F-4D97-AF65-F5344CB8AC3E}">

</xml_diff>

<commit_message>
Shelves and boxes in Storage Room
</commit_message>
<xml_diff>
--- a/Assets/Materials + Textures/Personal/Roomnames/Roomnames.pptx
+++ b/Assets/Materials + Textures/Personal/Roomnames/Roomnames.pptx
@@ -15,6 +15,7 @@
     <p:sldId id="258" r:id="rId9"/>
     <p:sldId id="259" r:id="rId10"/>
     <p:sldId id="266" r:id="rId11"/>
+    <p:sldId id="267" r:id="rId12"/>
   </p:sldIdLst>
   <p:sldSz cx="12192000" cy="6858000"/>
   <p:notesSz cx="6858000" cy="9144000"/>
@@ -270,7 +271,7 @@
           <a:p>
             <a:fld id="{14389514-1D2E-45F5-8DC5-A75A64E20C29}" type="datetimeFigureOut">
               <a:rPr lang="en-GB" smtClean="0"/>
-              <a:t>02/09/2025</a:t>
+              <a:t>03/09/2025</a:t>
             </a:fld>
             <a:endParaRPr lang="en-GB"/>
           </a:p>
@@ -470,7 +471,7 @@
           <a:p>
             <a:fld id="{14389514-1D2E-45F5-8DC5-A75A64E20C29}" type="datetimeFigureOut">
               <a:rPr lang="en-GB" smtClean="0"/>
-              <a:t>02/09/2025</a:t>
+              <a:t>03/09/2025</a:t>
             </a:fld>
             <a:endParaRPr lang="en-GB"/>
           </a:p>
@@ -680,7 +681,7 @@
           <a:p>
             <a:fld id="{14389514-1D2E-45F5-8DC5-A75A64E20C29}" type="datetimeFigureOut">
               <a:rPr lang="en-GB" smtClean="0"/>
-              <a:t>02/09/2025</a:t>
+              <a:t>03/09/2025</a:t>
             </a:fld>
             <a:endParaRPr lang="en-GB"/>
           </a:p>
@@ -880,7 +881,7 @@
           <a:p>
             <a:fld id="{14389514-1D2E-45F5-8DC5-A75A64E20C29}" type="datetimeFigureOut">
               <a:rPr lang="en-GB" smtClean="0"/>
-              <a:t>02/09/2025</a:t>
+              <a:t>03/09/2025</a:t>
             </a:fld>
             <a:endParaRPr lang="en-GB"/>
           </a:p>
@@ -1156,7 +1157,7 @@
           <a:p>
             <a:fld id="{14389514-1D2E-45F5-8DC5-A75A64E20C29}" type="datetimeFigureOut">
               <a:rPr lang="en-GB" smtClean="0"/>
-              <a:t>02/09/2025</a:t>
+              <a:t>03/09/2025</a:t>
             </a:fld>
             <a:endParaRPr lang="en-GB"/>
           </a:p>
@@ -1424,7 +1425,7 @@
           <a:p>
             <a:fld id="{14389514-1D2E-45F5-8DC5-A75A64E20C29}" type="datetimeFigureOut">
               <a:rPr lang="en-GB" smtClean="0"/>
-              <a:t>02/09/2025</a:t>
+              <a:t>03/09/2025</a:t>
             </a:fld>
             <a:endParaRPr lang="en-GB"/>
           </a:p>
@@ -1839,7 +1840,7 @@
           <a:p>
             <a:fld id="{14389514-1D2E-45F5-8DC5-A75A64E20C29}" type="datetimeFigureOut">
               <a:rPr lang="en-GB" smtClean="0"/>
-              <a:t>02/09/2025</a:t>
+              <a:t>03/09/2025</a:t>
             </a:fld>
             <a:endParaRPr lang="en-GB"/>
           </a:p>
@@ -1981,7 +1982,7 @@
           <a:p>
             <a:fld id="{14389514-1D2E-45F5-8DC5-A75A64E20C29}" type="datetimeFigureOut">
               <a:rPr lang="en-GB" smtClean="0"/>
-              <a:t>02/09/2025</a:t>
+              <a:t>03/09/2025</a:t>
             </a:fld>
             <a:endParaRPr lang="en-GB"/>
           </a:p>
@@ -2094,7 +2095,7 @@
           <a:p>
             <a:fld id="{14389514-1D2E-45F5-8DC5-A75A64E20C29}" type="datetimeFigureOut">
               <a:rPr lang="en-GB" smtClean="0"/>
-              <a:t>02/09/2025</a:t>
+              <a:t>03/09/2025</a:t>
             </a:fld>
             <a:endParaRPr lang="en-GB"/>
           </a:p>
@@ -2407,7 +2408,7 @@
           <a:p>
             <a:fld id="{14389514-1D2E-45F5-8DC5-A75A64E20C29}" type="datetimeFigureOut">
               <a:rPr lang="en-GB" smtClean="0"/>
-              <a:t>02/09/2025</a:t>
+              <a:t>03/09/2025</a:t>
             </a:fld>
             <a:endParaRPr lang="en-GB"/>
           </a:p>
@@ -2696,7 +2697,7 @@
           <a:p>
             <a:fld id="{14389514-1D2E-45F5-8DC5-A75A64E20C29}" type="datetimeFigureOut">
               <a:rPr lang="en-GB" smtClean="0"/>
-              <a:t>02/09/2025</a:t>
+              <a:t>03/09/2025</a:t>
             </a:fld>
             <a:endParaRPr lang="en-GB"/>
           </a:p>
@@ -2939,7 +2940,7 @@
           <a:p>
             <a:fld id="{14389514-1D2E-45F5-8DC5-A75A64E20C29}" type="datetimeFigureOut">
               <a:rPr lang="en-GB" smtClean="0"/>
-              <a:t>02/09/2025</a:t>
+              <a:t>03/09/2025</a:t>
             </a:fld>
             <a:endParaRPr lang="en-GB"/>
           </a:p>
@@ -3809,6 +3810,475 @@
 </p:sld>
 </file>
 
+<file path=ppt/slides/slide11.xml><?xml version="1.0" encoding="utf-8"?>
+<p:sld xmlns:a="http://schemas.openxmlformats.org/drawingml/2006/main" xmlns:r="http://schemas.openxmlformats.org/officeDocument/2006/relationships" xmlns:p="http://schemas.openxmlformats.org/presentationml/2006/main">
+  <p:cSld>
+    <p:spTree>
+      <p:nvGrpSpPr>
+        <p:cNvPr id="1" name=""/>
+        <p:cNvGrpSpPr/>
+        <p:nvPr/>
+      </p:nvGrpSpPr>
+      <p:grpSpPr>
+        <a:xfrm>
+          <a:off x="0" y="0"/>
+          <a:ext cx="0" cy="0"/>
+          <a:chOff x="0" y="0"/>
+          <a:chExt cx="0" cy="0"/>
+        </a:xfrm>
+      </p:grpSpPr>
+      <p:sp>
+        <p:nvSpPr>
+          <p:cNvPr id="2" name="Rectangle 1">
+            <a:extLst>
+              <a:ext uri="{FF2B5EF4-FFF2-40B4-BE49-F238E27FC236}">
+                <a16:creationId xmlns:a16="http://schemas.microsoft.com/office/drawing/2014/main" id="{386690CD-4364-C29C-39CE-4E90A5DDF899}"/>
+              </a:ext>
+            </a:extLst>
+          </p:cNvPr>
+          <p:cNvSpPr/>
+          <p:nvPr/>
+        </p:nvSpPr>
+        <p:spPr>
+          <a:xfrm>
+            <a:off x="16639" y="0"/>
+            <a:ext cx="3888000" cy="3384000"/>
+          </a:xfrm>
+          <a:prstGeom prst="rect">
+            <a:avLst/>
+          </a:prstGeom>
+          <a:solidFill>
+            <a:schemeClr val="bg1"/>
+          </a:solidFill>
+          <a:ln>
+            <a:solidFill>
+              <a:schemeClr val="tx1"/>
+            </a:solidFill>
+          </a:ln>
+        </p:spPr>
+        <p:style>
+          <a:lnRef idx="2">
+            <a:schemeClr val="accent1">
+              <a:shade val="15000"/>
+            </a:schemeClr>
+          </a:lnRef>
+          <a:fillRef idx="1">
+            <a:schemeClr val="accent1"/>
+          </a:fillRef>
+          <a:effectRef idx="0">
+            <a:schemeClr val="accent1"/>
+          </a:effectRef>
+          <a:fontRef idx="minor">
+            <a:schemeClr val="lt1"/>
+          </a:fontRef>
+        </p:style>
+        <p:txBody>
+          <a:bodyPr rtlCol="0" anchor="ctr"/>
+          <a:lstStyle/>
+          <a:p>
+            <a:pPr algn="ctr"/>
+            <a:r>
+              <a:rPr lang="en-GB" sz="3600" b="1" dirty="0">
+                <a:solidFill>
+                  <a:schemeClr val="tx1"/>
+                </a:solidFill>
+                <a:latin typeface="Ink Free" panose="03080402000500000000" pitchFamily="66" charset="0"/>
+              </a:rPr>
+              <a:t>Prisoner</a:t>
+            </a:r>
+          </a:p>
+          <a:p>
+            <a:pPr algn="ctr"/>
+            <a:r>
+              <a:rPr lang="en-GB" sz="3600" b="1" dirty="0">
+                <a:solidFill>
+                  <a:schemeClr val="tx1"/>
+                </a:solidFill>
+                <a:latin typeface="Ink Free" panose="03080402000500000000" pitchFamily="66" charset="0"/>
+              </a:rPr>
+              <a:t>Property</a:t>
+            </a:r>
+          </a:p>
+          <a:p>
+            <a:pPr algn="ctr"/>
+            <a:r>
+              <a:rPr lang="en-GB" sz="3600" b="1" dirty="0">
+                <a:solidFill>
+                  <a:schemeClr val="tx1"/>
+                </a:solidFill>
+                <a:latin typeface="Ink Free" panose="03080402000500000000" pitchFamily="66" charset="0"/>
+              </a:rPr>
+              <a:t>Log</a:t>
+            </a:r>
+          </a:p>
+          <a:p>
+            <a:pPr algn="ctr"/>
+            <a:endParaRPr lang="en-GB" sz="3600" b="1" dirty="0">
+              <a:solidFill>
+                <a:schemeClr val="tx1"/>
+              </a:solidFill>
+              <a:latin typeface="Ink Free" panose="03080402000500000000" pitchFamily="66" charset="0"/>
+            </a:endParaRPr>
+          </a:p>
+          <a:p>
+            <a:pPr algn="ctr"/>
+            <a:r>
+              <a:rPr lang="en-GB" sz="3600" b="1" dirty="0">
+                <a:solidFill>
+                  <a:schemeClr val="tx1"/>
+                </a:solidFill>
+                <a:latin typeface="Ink Free" panose="03080402000500000000" pitchFamily="66" charset="0"/>
+              </a:rPr>
+              <a:t>DO NOT REMOVE</a:t>
+            </a:r>
+          </a:p>
+        </p:txBody>
+      </p:sp>
+      <p:sp>
+        <p:nvSpPr>
+          <p:cNvPr id="3" name="Rectangle 2">
+            <a:extLst>
+              <a:ext uri="{FF2B5EF4-FFF2-40B4-BE49-F238E27FC236}">
+                <a16:creationId xmlns:a16="http://schemas.microsoft.com/office/drawing/2014/main" id="{D98F959B-C84B-9873-5029-8E2E022104EE}"/>
+              </a:ext>
+            </a:extLst>
+          </p:cNvPr>
+          <p:cNvSpPr/>
+          <p:nvPr/>
+        </p:nvSpPr>
+        <p:spPr>
+          <a:xfrm>
+            <a:off x="4420639" y="0"/>
+            <a:ext cx="1814400" cy="2890800"/>
+          </a:xfrm>
+          <a:prstGeom prst="rect">
+            <a:avLst/>
+          </a:prstGeom>
+          <a:solidFill>
+            <a:schemeClr val="bg1"/>
+          </a:solidFill>
+          <a:ln>
+            <a:solidFill>
+              <a:schemeClr val="tx1"/>
+            </a:solidFill>
+          </a:ln>
+        </p:spPr>
+        <p:style>
+          <a:lnRef idx="2">
+            <a:schemeClr val="accent1">
+              <a:shade val="15000"/>
+            </a:schemeClr>
+          </a:lnRef>
+          <a:fillRef idx="1">
+            <a:schemeClr val="accent1"/>
+          </a:fillRef>
+          <a:effectRef idx="0">
+            <a:schemeClr val="accent1"/>
+          </a:effectRef>
+          <a:fontRef idx="minor">
+            <a:schemeClr val="lt1"/>
+          </a:fontRef>
+        </p:style>
+        <p:txBody>
+          <a:bodyPr rtlCol="0" anchor="t"/>
+          <a:lstStyle/>
+          <a:p>
+            <a:pPr algn="ctr"/>
+            <a:r>
+              <a:rPr lang="en-GB" sz="3200" b="1" dirty="0">
+                <a:solidFill>
+                  <a:schemeClr val="tx1"/>
+                </a:solidFill>
+                <a:latin typeface="Ink Free" panose="03080402000500000000" pitchFamily="66" charset="0"/>
+              </a:rPr>
+              <a:t>Prisoner Property Log</a:t>
+            </a:r>
+          </a:p>
+          <a:p>
+            <a:pPr algn="ctr"/>
+            <a:endParaRPr lang="en-GB" sz="3200" b="1" dirty="0">
+              <a:solidFill>
+                <a:schemeClr val="tx1"/>
+              </a:solidFill>
+              <a:latin typeface="Ink Free" panose="03080402000500000000" pitchFamily="66" charset="0"/>
+            </a:endParaRPr>
+          </a:p>
+          <a:p>
+            <a:pPr algn="ctr"/>
+            <a:r>
+              <a:rPr lang="en-GB" sz="3200" b="1" dirty="0">
+                <a:solidFill>
+                  <a:schemeClr val="tx1"/>
+                </a:solidFill>
+                <a:latin typeface="Ink Free" panose="03080402000500000000" pitchFamily="66" charset="0"/>
+              </a:rPr>
+              <a:t>A to G</a:t>
+            </a:r>
+          </a:p>
+        </p:txBody>
+      </p:sp>
+      <p:sp>
+        <p:nvSpPr>
+          <p:cNvPr id="5" name="Rectangle 4">
+            <a:extLst>
+              <a:ext uri="{FF2B5EF4-FFF2-40B4-BE49-F238E27FC236}">
+                <a16:creationId xmlns:a16="http://schemas.microsoft.com/office/drawing/2014/main" id="{B2B5AB23-B448-DCD5-F814-E14DDDC39E92}"/>
+              </a:ext>
+            </a:extLst>
+          </p:cNvPr>
+          <p:cNvSpPr/>
+          <p:nvPr/>
+        </p:nvSpPr>
+        <p:spPr>
+          <a:xfrm>
+            <a:off x="6407701" y="0"/>
+            <a:ext cx="1814400" cy="2890800"/>
+          </a:xfrm>
+          <a:prstGeom prst="rect">
+            <a:avLst/>
+          </a:prstGeom>
+          <a:solidFill>
+            <a:schemeClr val="bg1"/>
+          </a:solidFill>
+          <a:ln>
+            <a:solidFill>
+              <a:schemeClr val="tx1"/>
+            </a:solidFill>
+          </a:ln>
+        </p:spPr>
+        <p:style>
+          <a:lnRef idx="2">
+            <a:schemeClr val="accent1">
+              <a:shade val="15000"/>
+            </a:schemeClr>
+          </a:lnRef>
+          <a:fillRef idx="1">
+            <a:schemeClr val="accent1"/>
+          </a:fillRef>
+          <a:effectRef idx="0">
+            <a:schemeClr val="accent1"/>
+          </a:effectRef>
+          <a:fontRef idx="minor">
+            <a:schemeClr val="lt1"/>
+          </a:fontRef>
+        </p:style>
+        <p:txBody>
+          <a:bodyPr rtlCol="0" anchor="t"/>
+          <a:lstStyle/>
+          <a:p>
+            <a:pPr algn="ctr"/>
+            <a:r>
+              <a:rPr lang="en-GB" sz="3200" b="1" dirty="0">
+                <a:solidFill>
+                  <a:schemeClr val="tx1"/>
+                </a:solidFill>
+                <a:latin typeface="Ink Free" panose="03080402000500000000" pitchFamily="66" charset="0"/>
+              </a:rPr>
+              <a:t>Prisoner Property Log</a:t>
+            </a:r>
+          </a:p>
+          <a:p>
+            <a:pPr algn="ctr"/>
+            <a:endParaRPr lang="en-GB" sz="3200" b="1" dirty="0">
+              <a:solidFill>
+                <a:schemeClr val="tx1"/>
+              </a:solidFill>
+              <a:latin typeface="Ink Free" panose="03080402000500000000" pitchFamily="66" charset="0"/>
+            </a:endParaRPr>
+          </a:p>
+          <a:p>
+            <a:pPr algn="ctr"/>
+            <a:r>
+              <a:rPr lang="en-GB" sz="3200" b="1" dirty="0">
+                <a:solidFill>
+                  <a:schemeClr val="tx1"/>
+                </a:solidFill>
+                <a:latin typeface="Ink Free" panose="03080402000500000000" pitchFamily="66" charset="0"/>
+              </a:rPr>
+              <a:t>H to M</a:t>
+            </a:r>
+          </a:p>
+        </p:txBody>
+      </p:sp>
+      <p:sp>
+        <p:nvSpPr>
+          <p:cNvPr id="6" name="Rectangle 5">
+            <a:extLst>
+              <a:ext uri="{FF2B5EF4-FFF2-40B4-BE49-F238E27FC236}">
+                <a16:creationId xmlns:a16="http://schemas.microsoft.com/office/drawing/2014/main" id="{0AA5D6CD-244B-1AF2-F9CC-13590DDFB58B}"/>
+              </a:ext>
+            </a:extLst>
+          </p:cNvPr>
+          <p:cNvSpPr/>
+          <p:nvPr/>
+        </p:nvSpPr>
+        <p:spPr>
+          <a:xfrm>
+            <a:off x="8328820" y="0"/>
+            <a:ext cx="1814400" cy="2890800"/>
+          </a:xfrm>
+          <a:prstGeom prst="rect">
+            <a:avLst/>
+          </a:prstGeom>
+          <a:solidFill>
+            <a:schemeClr val="bg1"/>
+          </a:solidFill>
+          <a:ln>
+            <a:solidFill>
+              <a:schemeClr val="tx1"/>
+            </a:solidFill>
+          </a:ln>
+        </p:spPr>
+        <p:style>
+          <a:lnRef idx="2">
+            <a:schemeClr val="accent1">
+              <a:shade val="15000"/>
+            </a:schemeClr>
+          </a:lnRef>
+          <a:fillRef idx="1">
+            <a:schemeClr val="accent1"/>
+          </a:fillRef>
+          <a:effectRef idx="0">
+            <a:schemeClr val="accent1"/>
+          </a:effectRef>
+          <a:fontRef idx="minor">
+            <a:schemeClr val="lt1"/>
+          </a:fontRef>
+        </p:style>
+        <p:txBody>
+          <a:bodyPr rtlCol="0" anchor="t"/>
+          <a:lstStyle/>
+          <a:p>
+            <a:pPr algn="ctr"/>
+            <a:r>
+              <a:rPr lang="en-GB" sz="3200" b="1" dirty="0">
+                <a:solidFill>
+                  <a:schemeClr val="tx1"/>
+                </a:solidFill>
+                <a:latin typeface="Ink Free" panose="03080402000500000000" pitchFamily="66" charset="0"/>
+              </a:rPr>
+              <a:t>Prisoner Property Log</a:t>
+            </a:r>
+          </a:p>
+          <a:p>
+            <a:pPr algn="ctr"/>
+            <a:endParaRPr lang="en-GB" sz="3200" b="1" dirty="0">
+              <a:solidFill>
+                <a:schemeClr val="tx1"/>
+              </a:solidFill>
+              <a:latin typeface="Ink Free" panose="03080402000500000000" pitchFamily="66" charset="0"/>
+            </a:endParaRPr>
+          </a:p>
+          <a:p>
+            <a:pPr algn="ctr"/>
+            <a:r>
+              <a:rPr lang="en-GB" sz="3200" b="1" dirty="0">
+                <a:solidFill>
+                  <a:schemeClr val="tx1"/>
+                </a:solidFill>
+                <a:latin typeface="Ink Free" panose="03080402000500000000" pitchFamily="66" charset="0"/>
+              </a:rPr>
+              <a:t>N to S</a:t>
+            </a:r>
+          </a:p>
+        </p:txBody>
+      </p:sp>
+      <p:sp>
+        <p:nvSpPr>
+          <p:cNvPr id="7" name="Rectangle 6">
+            <a:extLst>
+              <a:ext uri="{FF2B5EF4-FFF2-40B4-BE49-F238E27FC236}">
+                <a16:creationId xmlns:a16="http://schemas.microsoft.com/office/drawing/2014/main" id="{42900016-3906-3F54-B656-71124F0F5C9C}"/>
+              </a:ext>
+            </a:extLst>
+          </p:cNvPr>
+          <p:cNvSpPr/>
+          <p:nvPr/>
+        </p:nvSpPr>
+        <p:spPr>
+          <a:xfrm>
+            <a:off x="10189339" y="0"/>
+            <a:ext cx="1814400" cy="2890800"/>
+          </a:xfrm>
+          <a:prstGeom prst="rect">
+            <a:avLst/>
+          </a:prstGeom>
+          <a:solidFill>
+            <a:schemeClr val="bg1"/>
+          </a:solidFill>
+          <a:ln>
+            <a:solidFill>
+              <a:schemeClr val="tx1"/>
+            </a:solidFill>
+          </a:ln>
+        </p:spPr>
+        <p:style>
+          <a:lnRef idx="2">
+            <a:schemeClr val="accent1">
+              <a:shade val="15000"/>
+            </a:schemeClr>
+          </a:lnRef>
+          <a:fillRef idx="1">
+            <a:schemeClr val="accent1"/>
+          </a:fillRef>
+          <a:effectRef idx="0">
+            <a:schemeClr val="accent1"/>
+          </a:effectRef>
+          <a:fontRef idx="minor">
+            <a:schemeClr val="lt1"/>
+          </a:fontRef>
+        </p:style>
+        <p:txBody>
+          <a:bodyPr rtlCol="0" anchor="t"/>
+          <a:lstStyle/>
+          <a:p>
+            <a:pPr algn="ctr"/>
+            <a:r>
+              <a:rPr lang="en-GB" sz="3200" b="1" dirty="0">
+                <a:solidFill>
+                  <a:schemeClr val="tx1"/>
+                </a:solidFill>
+                <a:latin typeface="Ink Free" panose="03080402000500000000" pitchFamily="66" charset="0"/>
+              </a:rPr>
+              <a:t>Prisoner Property Log</a:t>
+            </a:r>
+          </a:p>
+          <a:p>
+            <a:pPr algn="ctr"/>
+            <a:endParaRPr lang="en-GB" sz="3200" b="1" dirty="0">
+              <a:solidFill>
+                <a:schemeClr val="tx1"/>
+              </a:solidFill>
+              <a:latin typeface="Ink Free" panose="03080402000500000000" pitchFamily="66" charset="0"/>
+            </a:endParaRPr>
+          </a:p>
+          <a:p>
+            <a:pPr algn="ctr"/>
+            <a:r>
+              <a:rPr lang="en-GB" sz="3200" b="1" dirty="0">
+                <a:solidFill>
+                  <a:schemeClr val="tx1"/>
+                </a:solidFill>
+                <a:latin typeface="Ink Free" panose="03080402000500000000" pitchFamily="66" charset="0"/>
+              </a:rPr>
+              <a:t>T to Z</a:t>
+            </a:r>
+          </a:p>
+        </p:txBody>
+      </p:sp>
+    </p:spTree>
+    <p:extLst>
+      <p:ext uri="{BB962C8B-B14F-4D97-AF65-F5344CB8AC3E}">
+        <p14:creationId xmlns:p14="http://schemas.microsoft.com/office/powerpoint/2010/main" val="753657027"/>
+      </p:ext>
+    </p:extLst>
+  </p:cSld>
+  <p:clrMapOvr>
+    <a:masterClrMapping/>
+  </p:clrMapOvr>
+</p:sld>
+</file>
+
 <file path=ppt/slides/slide2.xml><?xml version="1.0" encoding="utf-8"?>
 <p:sld xmlns:a="http://schemas.openxmlformats.org/drawingml/2006/main" xmlns:r="http://schemas.openxmlformats.org/officeDocument/2006/relationships" xmlns:p="http://schemas.openxmlformats.org/presentationml/2006/main">
   <p:cSld>

</xml_diff>

<commit_message>
Got PDA UI working
Need to use SVG for top nav icons
</commit_message>
<xml_diff>
--- a/Assets/Materials + Textures/Personal/Roomnames/Roomnames.pptx
+++ b/Assets/Materials + Textures/Personal/Roomnames/Roomnames.pptx
@@ -271,7 +271,7 @@
           <a:p>
             <a:fld id="{14389514-1D2E-45F5-8DC5-A75A64E20C29}" type="datetimeFigureOut">
               <a:rPr lang="en-GB" smtClean="0"/>
-              <a:t>03/09/2025</a:t>
+              <a:t>05/09/2025</a:t>
             </a:fld>
             <a:endParaRPr lang="en-GB"/>
           </a:p>
@@ -471,7 +471,7 @@
           <a:p>
             <a:fld id="{14389514-1D2E-45F5-8DC5-A75A64E20C29}" type="datetimeFigureOut">
               <a:rPr lang="en-GB" smtClean="0"/>
-              <a:t>03/09/2025</a:t>
+              <a:t>05/09/2025</a:t>
             </a:fld>
             <a:endParaRPr lang="en-GB"/>
           </a:p>
@@ -681,7 +681,7 @@
           <a:p>
             <a:fld id="{14389514-1D2E-45F5-8DC5-A75A64E20C29}" type="datetimeFigureOut">
               <a:rPr lang="en-GB" smtClean="0"/>
-              <a:t>03/09/2025</a:t>
+              <a:t>05/09/2025</a:t>
             </a:fld>
             <a:endParaRPr lang="en-GB"/>
           </a:p>
@@ -881,7 +881,7 @@
           <a:p>
             <a:fld id="{14389514-1D2E-45F5-8DC5-A75A64E20C29}" type="datetimeFigureOut">
               <a:rPr lang="en-GB" smtClean="0"/>
-              <a:t>03/09/2025</a:t>
+              <a:t>05/09/2025</a:t>
             </a:fld>
             <a:endParaRPr lang="en-GB"/>
           </a:p>
@@ -1157,7 +1157,7 @@
           <a:p>
             <a:fld id="{14389514-1D2E-45F5-8DC5-A75A64E20C29}" type="datetimeFigureOut">
               <a:rPr lang="en-GB" smtClean="0"/>
-              <a:t>03/09/2025</a:t>
+              <a:t>05/09/2025</a:t>
             </a:fld>
             <a:endParaRPr lang="en-GB"/>
           </a:p>
@@ -1425,7 +1425,7 @@
           <a:p>
             <a:fld id="{14389514-1D2E-45F5-8DC5-A75A64E20C29}" type="datetimeFigureOut">
               <a:rPr lang="en-GB" smtClean="0"/>
-              <a:t>03/09/2025</a:t>
+              <a:t>05/09/2025</a:t>
             </a:fld>
             <a:endParaRPr lang="en-GB"/>
           </a:p>
@@ -1840,7 +1840,7 @@
           <a:p>
             <a:fld id="{14389514-1D2E-45F5-8DC5-A75A64E20C29}" type="datetimeFigureOut">
               <a:rPr lang="en-GB" smtClean="0"/>
-              <a:t>03/09/2025</a:t>
+              <a:t>05/09/2025</a:t>
             </a:fld>
             <a:endParaRPr lang="en-GB"/>
           </a:p>
@@ -1982,7 +1982,7 @@
           <a:p>
             <a:fld id="{14389514-1D2E-45F5-8DC5-A75A64E20C29}" type="datetimeFigureOut">
               <a:rPr lang="en-GB" smtClean="0"/>
-              <a:t>03/09/2025</a:t>
+              <a:t>05/09/2025</a:t>
             </a:fld>
             <a:endParaRPr lang="en-GB"/>
           </a:p>
@@ -2095,7 +2095,7 @@
           <a:p>
             <a:fld id="{14389514-1D2E-45F5-8DC5-A75A64E20C29}" type="datetimeFigureOut">
               <a:rPr lang="en-GB" smtClean="0"/>
-              <a:t>03/09/2025</a:t>
+              <a:t>05/09/2025</a:t>
             </a:fld>
             <a:endParaRPr lang="en-GB"/>
           </a:p>
@@ -2408,7 +2408,7 @@
           <a:p>
             <a:fld id="{14389514-1D2E-45F5-8DC5-A75A64E20C29}" type="datetimeFigureOut">
               <a:rPr lang="en-GB" smtClean="0"/>
-              <a:t>03/09/2025</a:t>
+              <a:t>05/09/2025</a:t>
             </a:fld>
             <a:endParaRPr lang="en-GB"/>
           </a:p>
@@ -2697,7 +2697,7 @@
           <a:p>
             <a:fld id="{14389514-1D2E-45F5-8DC5-A75A64E20C29}" type="datetimeFigureOut">
               <a:rPr lang="en-GB" smtClean="0"/>
-              <a:t>03/09/2025</a:t>
+              <a:t>05/09/2025</a:t>
             </a:fld>
             <a:endParaRPr lang="en-GB"/>
           </a:p>
@@ -2940,7 +2940,7 @@
           <a:p>
             <a:fld id="{14389514-1D2E-45F5-8DC5-A75A64E20C29}" type="datetimeFigureOut">
               <a:rPr lang="en-GB" smtClean="0"/>
-              <a:t>03/09/2025</a:t>
+              <a:t>05/09/2025</a:t>
             </a:fld>
             <a:endParaRPr lang="en-GB"/>
           </a:p>
@@ -3456,7 +3456,7 @@
         </p:blipFill>
         <p:spPr>
           <a:xfrm>
-            <a:off x="5638800" y="2971800"/>
+            <a:off x="5463989" y="2095500"/>
             <a:ext cx="914400" cy="914400"/>
           </a:xfrm>
           <a:prstGeom prst="rect">
@@ -3797,6 +3797,294 @@
           </p:txBody>
         </p:sp>
       </p:grpSp>
+      <p:pic>
+        <p:nvPicPr>
+          <p:cNvPr id="8" name="Graphic 7" descr="Document with solid fill">
+            <a:extLst>
+              <a:ext uri="{FF2B5EF4-FFF2-40B4-BE49-F238E27FC236}">
+                <a16:creationId xmlns:a16="http://schemas.microsoft.com/office/drawing/2014/main" id="{8A7DEE67-5540-4879-6276-D048BC42828D}"/>
+              </a:ext>
+            </a:extLst>
+          </p:cNvPr>
+          <p:cNvPicPr>
+            <a:picLocks noChangeAspect="1"/>
+          </p:cNvPicPr>
+          <p:nvPr/>
+        </p:nvPicPr>
+        <p:blipFill>
+          <a:blip r:embed="rId10">
+            <a:extLst>
+              <a:ext uri="{96DAC541-7B7A-43D3-8B79-37D633B846F1}">
+                <asvg:svgBlip xmlns:asvg="http://schemas.microsoft.com/office/drawing/2016/SVG/main" r:embed="rId11"/>
+              </a:ext>
+            </a:extLst>
+          </a:blip>
+          <a:stretch>
+            <a:fillRect/>
+          </a:stretch>
+        </p:blipFill>
+        <p:spPr>
+          <a:xfrm>
+            <a:off x="3751730" y="3294530"/>
+            <a:ext cx="914400" cy="914400"/>
+          </a:xfrm>
+          <a:prstGeom prst="rect">
+            <a:avLst/>
+          </a:prstGeom>
+        </p:spPr>
+      </p:pic>
+      <p:pic>
+        <p:nvPicPr>
+          <p:cNvPr id="15" name="Graphic 14" descr="Clipboard Partially Checked with solid fill">
+            <a:extLst>
+              <a:ext uri="{FF2B5EF4-FFF2-40B4-BE49-F238E27FC236}">
+                <a16:creationId xmlns:a16="http://schemas.microsoft.com/office/drawing/2014/main" id="{165C47EA-B3A0-28A7-2496-AE0172A12BFB}"/>
+              </a:ext>
+            </a:extLst>
+          </p:cNvPr>
+          <p:cNvPicPr>
+            <a:picLocks noChangeAspect="1"/>
+          </p:cNvPicPr>
+          <p:nvPr/>
+        </p:nvPicPr>
+        <p:blipFill>
+          <a:blip r:embed="rId12">
+            <a:extLst>
+              <a:ext uri="{96DAC541-7B7A-43D3-8B79-37D633B846F1}">
+                <asvg:svgBlip xmlns:asvg="http://schemas.microsoft.com/office/drawing/2016/SVG/main" r:embed="rId13"/>
+              </a:ext>
+            </a:extLst>
+          </a:blip>
+          <a:stretch>
+            <a:fillRect/>
+          </a:stretch>
+        </p:blipFill>
+        <p:spPr>
+          <a:xfrm>
+            <a:off x="416858" y="345142"/>
+            <a:ext cx="914400" cy="914400"/>
+          </a:xfrm>
+          <a:prstGeom prst="rect">
+            <a:avLst/>
+          </a:prstGeom>
+        </p:spPr>
+      </p:pic>
+      <p:pic>
+        <p:nvPicPr>
+          <p:cNvPr id="17" name="Graphic 16" descr="Books with solid fill">
+            <a:extLst>
+              <a:ext uri="{FF2B5EF4-FFF2-40B4-BE49-F238E27FC236}">
+                <a16:creationId xmlns:a16="http://schemas.microsoft.com/office/drawing/2014/main" id="{A7CB5B3E-13C2-0ED3-F72E-6E67B3A91908}"/>
+              </a:ext>
+            </a:extLst>
+          </p:cNvPr>
+          <p:cNvPicPr>
+            <a:picLocks noChangeAspect="1"/>
+          </p:cNvPicPr>
+          <p:nvPr/>
+        </p:nvPicPr>
+        <p:blipFill>
+          <a:blip r:embed="rId14">
+            <a:extLst>
+              <a:ext uri="{96DAC541-7B7A-43D3-8B79-37D633B846F1}">
+                <asvg:svgBlip xmlns:asvg="http://schemas.microsoft.com/office/drawing/2016/SVG/main" r:embed="rId15"/>
+              </a:ext>
+            </a:extLst>
+          </a:blip>
+          <a:stretch>
+            <a:fillRect/>
+          </a:stretch>
+        </p:blipFill>
+        <p:spPr>
+          <a:xfrm>
+            <a:off x="1649507" y="345142"/>
+            <a:ext cx="914400" cy="914400"/>
+          </a:xfrm>
+          <a:prstGeom prst="rect">
+            <a:avLst/>
+          </a:prstGeom>
+        </p:spPr>
+      </p:pic>
+      <p:pic>
+        <p:nvPicPr>
+          <p:cNvPr id="19" name="Graphic 18" descr="Typewriter with solid fill">
+            <a:extLst>
+              <a:ext uri="{FF2B5EF4-FFF2-40B4-BE49-F238E27FC236}">
+                <a16:creationId xmlns:a16="http://schemas.microsoft.com/office/drawing/2014/main" id="{3138E870-3EAF-B73B-844C-D18D023476DD}"/>
+              </a:ext>
+            </a:extLst>
+          </p:cNvPr>
+          <p:cNvPicPr>
+            <a:picLocks noChangeAspect="1"/>
+          </p:cNvPicPr>
+          <p:nvPr/>
+        </p:nvPicPr>
+        <p:blipFill>
+          <a:blip r:embed="rId16">
+            <a:extLst>
+              <a:ext uri="{96DAC541-7B7A-43D3-8B79-37D633B846F1}">
+                <asvg:svgBlip xmlns:asvg="http://schemas.microsoft.com/office/drawing/2016/SVG/main" r:embed="rId17"/>
+              </a:ext>
+            </a:extLst>
+          </a:blip>
+          <a:stretch>
+            <a:fillRect/>
+          </a:stretch>
+        </p:blipFill>
+        <p:spPr>
+          <a:xfrm>
+            <a:off x="2837330" y="327212"/>
+            <a:ext cx="914400" cy="914400"/>
+          </a:xfrm>
+          <a:prstGeom prst="rect">
+            <a:avLst/>
+          </a:prstGeom>
+        </p:spPr>
+      </p:pic>
+      <p:pic>
+        <p:nvPicPr>
+          <p:cNvPr id="21" name="Graphic 20" descr="Treasure Map with solid fill">
+            <a:extLst>
+              <a:ext uri="{FF2B5EF4-FFF2-40B4-BE49-F238E27FC236}">
+                <a16:creationId xmlns:a16="http://schemas.microsoft.com/office/drawing/2014/main" id="{9342CF4D-54EF-20A6-1DC3-9447C4C88CED}"/>
+              </a:ext>
+            </a:extLst>
+          </p:cNvPr>
+          <p:cNvPicPr>
+            <a:picLocks noChangeAspect="1"/>
+          </p:cNvPicPr>
+          <p:nvPr/>
+        </p:nvPicPr>
+        <p:blipFill>
+          <a:blip r:embed="rId18">
+            <a:extLst>
+              <a:ext uri="{96DAC541-7B7A-43D3-8B79-37D633B846F1}">
+                <asvg:svgBlip xmlns:asvg="http://schemas.microsoft.com/office/drawing/2016/SVG/main" r:embed="rId19"/>
+              </a:ext>
+            </a:extLst>
+          </a:blip>
+          <a:stretch>
+            <a:fillRect/>
+          </a:stretch>
+        </p:blipFill>
+        <p:spPr>
+          <a:xfrm>
+            <a:off x="4069979" y="327212"/>
+            <a:ext cx="914400" cy="914400"/>
+          </a:xfrm>
+          <a:prstGeom prst="rect">
+            <a:avLst/>
+          </a:prstGeom>
+        </p:spPr>
+      </p:pic>
+      <p:pic>
+        <p:nvPicPr>
+          <p:cNvPr id="23" name="Graphic 22" descr="Exit with solid fill">
+            <a:extLst>
+              <a:ext uri="{FF2B5EF4-FFF2-40B4-BE49-F238E27FC236}">
+                <a16:creationId xmlns:a16="http://schemas.microsoft.com/office/drawing/2014/main" id="{60C55AC9-E66C-6428-AD6F-546106EADCDD}"/>
+              </a:ext>
+            </a:extLst>
+          </p:cNvPr>
+          <p:cNvPicPr>
+            <a:picLocks noChangeAspect="1"/>
+          </p:cNvPicPr>
+          <p:nvPr/>
+        </p:nvPicPr>
+        <p:blipFill>
+          <a:blip r:embed="rId20">
+            <a:extLst>
+              <a:ext uri="{96DAC541-7B7A-43D3-8B79-37D633B846F1}">
+                <asvg:svgBlip xmlns:asvg="http://schemas.microsoft.com/office/drawing/2016/SVG/main" r:embed="rId21"/>
+              </a:ext>
+            </a:extLst>
+          </a:blip>
+          <a:stretch>
+            <a:fillRect/>
+          </a:stretch>
+        </p:blipFill>
+        <p:spPr>
+          <a:xfrm>
+            <a:off x="5374435" y="277906"/>
+            <a:ext cx="914400" cy="914400"/>
+          </a:xfrm>
+          <a:prstGeom prst="rect">
+            <a:avLst/>
+          </a:prstGeom>
+        </p:spPr>
+      </p:pic>
+      <p:pic>
+        <p:nvPicPr>
+          <p:cNvPr id="25" name="Graphic 24" descr="Settings with solid fill">
+            <a:extLst>
+              <a:ext uri="{FF2B5EF4-FFF2-40B4-BE49-F238E27FC236}">
+                <a16:creationId xmlns:a16="http://schemas.microsoft.com/office/drawing/2014/main" id="{F5ACE1AE-3843-7C6B-69DC-EA6646BB9674}"/>
+              </a:ext>
+            </a:extLst>
+          </p:cNvPr>
+          <p:cNvPicPr>
+            <a:picLocks noChangeAspect="1"/>
+          </p:cNvPicPr>
+          <p:nvPr/>
+        </p:nvPicPr>
+        <p:blipFill>
+          <a:blip r:embed="rId22">
+            <a:extLst>
+              <a:ext uri="{96DAC541-7B7A-43D3-8B79-37D633B846F1}">
+                <asvg:svgBlip xmlns:asvg="http://schemas.microsoft.com/office/drawing/2016/SVG/main" r:embed="rId23"/>
+              </a:ext>
+            </a:extLst>
+          </a:blip>
+          <a:stretch>
+            <a:fillRect/>
+          </a:stretch>
+        </p:blipFill>
+        <p:spPr>
+          <a:xfrm>
+            <a:off x="6517530" y="327212"/>
+            <a:ext cx="914400" cy="914400"/>
+          </a:xfrm>
+          <a:prstGeom prst="rect">
+            <a:avLst/>
+          </a:prstGeom>
+        </p:spPr>
+      </p:pic>
+      <p:pic>
+        <p:nvPicPr>
+          <p:cNvPr id="27" name="Graphic 26" descr="Disk with solid fill">
+            <a:extLst>
+              <a:ext uri="{FF2B5EF4-FFF2-40B4-BE49-F238E27FC236}">
+                <a16:creationId xmlns:a16="http://schemas.microsoft.com/office/drawing/2014/main" id="{533970EB-B4B2-EAA6-AB35-23C4CDAD3178}"/>
+              </a:ext>
+            </a:extLst>
+          </p:cNvPr>
+          <p:cNvPicPr>
+            <a:picLocks noChangeAspect="1"/>
+          </p:cNvPicPr>
+          <p:nvPr/>
+        </p:nvPicPr>
+        <p:blipFill>
+          <a:blip r:embed="rId24">
+            <a:extLst>
+              <a:ext uri="{96DAC541-7B7A-43D3-8B79-37D633B846F1}">
+                <asvg:svgBlip xmlns:asvg="http://schemas.microsoft.com/office/drawing/2016/SVG/main" r:embed="rId25"/>
+              </a:ext>
+            </a:extLst>
+          </a:blip>
+          <a:stretch>
+            <a:fillRect/>
+          </a:stretch>
+        </p:blipFill>
+        <p:spPr>
+          <a:xfrm>
+            <a:off x="7691158" y="277906"/>
+            <a:ext cx="914400" cy="914400"/>
+          </a:xfrm>
+          <a:prstGeom prst="rect">
+            <a:avLst/>
+          </a:prstGeom>
+        </p:spPr>
+      </p:pic>
     </p:spTree>
     <p:extLst>
       <p:ext uri="{BB962C8B-B14F-4D97-AF65-F5344CB8AC3E}">

</xml_diff>

<commit_message>
Got tasks rendering in multicolum treeview
Need to clean up the formatting - make text bigger and add in viewing long description
</commit_message>
<xml_diff>
--- a/Assets/Materials + Textures/Personal/Roomnames/Roomnames.pptx
+++ b/Assets/Materials + Textures/Personal/Roomnames/Roomnames.pptx
@@ -271,7 +271,7 @@
           <a:p>
             <a:fld id="{14389514-1D2E-45F5-8DC5-A75A64E20C29}" type="datetimeFigureOut">
               <a:rPr lang="en-GB" smtClean="0"/>
-              <a:t>05/09/2025</a:t>
+              <a:t>06/09/2025</a:t>
             </a:fld>
             <a:endParaRPr lang="en-GB"/>
           </a:p>
@@ -471,7 +471,7 @@
           <a:p>
             <a:fld id="{14389514-1D2E-45F5-8DC5-A75A64E20C29}" type="datetimeFigureOut">
               <a:rPr lang="en-GB" smtClean="0"/>
-              <a:t>05/09/2025</a:t>
+              <a:t>06/09/2025</a:t>
             </a:fld>
             <a:endParaRPr lang="en-GB"/>
           </a:p>
@@ -681,7 +681,7 @@
           <a:p>
             <a:fld id="{14389514-1D2E-45F5-8DC5-A75A64E20C29}" type="datetimeFigureOut">
               <a:rPr lang="en-GB" smtClean="0"/>
-              <a:t>05/09/2025</a:t>
+              <a:t>06/09/2025</a:t>
             </a:fld>
             <a:endParaRPr lang="en-GB"/>
           </a:p>
@@ -881,7 +881,7 @@
           <a:p>
             <a:fld id="{14389514-1D2E-45F5-8DC5-A75A64E20C29}" type="datetimeFigureOut">
               <a:rPr lang="en-GB" smtClean="0"/>
-              <a:t>05/09/2025</a:t>
+              <a:t>06/09/2025</a:t>
             </a:fld>
             <a:endParaRPr lang="en-GB"/>
           </a:p>
@@ -1157,7 +1157,7 @@
           <a:p>
             <a:fld id="{14389514-1D2E-45F5-8DC5-A75A64E20C29}" type="datetimeFigureOut">
               <a:rPr lang="en-GB" smtClean="0"/>
-              <a:t>05/09/2025</a:t>
+              <a:t>06/09/2025</a:t>
             </a:fld>
             <a:endParaRPr lang="en-GB"/>
           </a:p>
@@ -1425,7 +1425,7 @@
           <a:p>
             <a:fld id="{14389514-1D2E-45F5-8DC5-A75A64E20C29}" type="datetimeFigureOut">
               <a:rPr lang="en-GB" smtClean="0"/>
-              <a:t>05/09/2025</a:t>
+              <a:t>06/09/2025</a:t>
             </a:fld>
             <a:endParaRPr lang="en-GB"/>
           </a:p>
@@ -1840,7 +1840,7 @@
           <a:p>
             <a:fld id="{14389514-1D2E-45F5-8DC5-A75A64E20C29}" type="datetimeFigureOut">
               <a:rPr lang="en-GB" smtClean="0"/>
-              <a:t>05/09/2025</a:t>
+              <a:t>06/09/2025</a:t>
             </a:fld>
             <a:endParaRPr lang="en-GB"/>
           </a:p>
@@ -1982,7 +1982,7 @@
           <a:p>
             <a:fld id="{14389514-1D2E-45F5-8DC5-A75A64E20C29}" type="datetimeFigureOut">
               <a:rPr lang="en-GB" smtClean="0"/>
-              <a:t>05/09/2025</a:t>
+              <a:t>06/09/2025</a:t>
             </a:fld>
             <a:endParaRPr lang="en-GB"/>
           </a:p>
@@ -2095,7 +2095,7 @@
           <a:p>
             <a:fld id="{14389514-1D2E-45F5-8DC5-A75A64E20C29}" type="datetimeFigureOut">
               <a:rPr lang="en-GB" smtClean="0"/>
-              <a:t>05/09/2025</a:t>
+              <a:t>06/09/2025</a:t>
             </a:fld>
             <a:endParaRPr lang="en-GB"/>
           </a:p>
@@ -2408,7 +2408,7 @@
           <a:p>
             <a:fld id="{14389514-1D2E-45F5-8DC5-A75A64E20C29}" type="datetimeFigureOut">
               <a:rPr lang="en-GB" smtClean="0"/>
-              <a:t>05/09/2025</a:t>
+              <a:t>06/09/2025</a:t>
             </a:fld>
             <a:endParaRPr lang="en-GB"/>
           </a:p>
@@ -2697,7 +2697,7 @@
           <a:p>
             <a:fld id="{14389514-1D2E-45F5-8DC5-A75A64E20C29}" type="datetimeFigureOut">
               <a:rPr lang="en-GB" smtClean="0"/>
-              <a:t>05/09/2025</a:t>
+              <a:t>06/09/2025</a:t>
             </a:fld>
             <a:endParaRPr lang="en-GB"/>
           </a:p>
@@ -2940,7 +2940,7 @@
           <a:p>
             <a:fld id="{14389514-1D2E-45F5-8DC5-A75A64E20C29}" type="datetimeFigureOut">
               <a:rPr lang="en-GB" smtClean="0"/>
-              <a:t>05/09/2025</a:t>
+              <a:t>06/09/2025</a:t>
             </a:fld>
             <a:endParaRPr lang="en-GB"/>
           </a:p>
@@ -3456,7 +3456,7 @@
         </p:blipFill>
         <p:spPr>
           <a:xfrm>
-            <a:off x="5463989" y="2095500"/>
+            <a:off x="3020047" y="1353671"/>
             <a:ext cx="914400" cy="914400"/>
           </a:xfrm>
           <a:prstGeom prst="rect">
@@ -3492,7 +3492,7 @@
         </p:blipFill>
         <p:spPr>
           <a:xfrm>
-            <a:off x="2837330" y="1353671"/>
+            <a:off x="1835647" y="1353671"/>
             <a:ext cx="914400" cy="914400"/>
           </a:xfrm>
           <a:prstGeom prst="rect">
@@ -3528,7 +3528,7 @@
         </p:blipFill>
         <p:spPr>
           <a:xfrm>
-            <a:off x="1578033" y="3079865"/>
+            <a:off x="493222" y="1353671"/>
             <a:ext cx="914400" cy="914400"/>
           </a:xfrm>
           <a:prstGeom prst="rect">
@@ -3550,7 +3550,7 @@
         </p:nvGrpSpPr>
         <p:grpSpPr>
           <a:xfrm>
-            <a:off x="7911540" y="1158875"/>
+            <a:off x="8921537" y="255681"/>
             <a:ext cx="1873250" cy="1873250"/>
             <a:chOff x="7911540" y="1158875"/>
             <a:chExt cx="1873250" cy="1873250"/>
@@ -3825,7 +3825,7 @@
         </p:blipFill>
         <p:spPr>
           <a:xfrm>
-            <a:off x="3751730" y="3294530"/>
+            <a:off x="4069979" y="1353671"/>
             <a:ext cx="914400" cy="914400"/>
           </a:xfrm>
           <a:prstGeom prst="rect">
@@ -4078,6 +4078,150 @@
         <p:spPr>
           <a:xfrm>
             <a:off x="7691158" y="277906"/>
+            <a:ext cx="914400" cy="914400"/>
+          </a:xfrm>
+          <a:prstGeom prst="rect">
+            <a:avLst/>
+          </a:prstGeom>
+        </p:spPr>
+      </p:pic>
+      <p:pic>
+        <p:nvPicPr>
+          <p:cNvPr id="9" name="Graphic 8" descr="Home with solid fill">
+            <a:extLst>
+              <a:ext uri="{FF2B5EF4-FFF2-40B4-BE49-F238E27FC236}">
+                <a16:creationId xmlns:a16="http://schemas.microsoft.com/office/drawing/2014/main" id="{ED7F56F1-D8E3-835A-3715-AA73C9403670}"/>
+              </a:ext>
+            </a:extLst>
+          </p:cNvPr>
+          <p:cNvPicPr>
+            <a:picLocks noChangeAspect="1"/>
+          </p:cNvPicPr>
+          <p:nvPr/>
+        </p:nvPicPr>
+        <p:blipFill>
+          <a:blip r:embed="rId26">
+            <a:extLst>
+              <a:ext uri="{96DAC541-7B7A-43D3-8B79-37D633B846F1}">
+                <asvg:svgBlip xmlns:asvg="http://schemas.microsoft.com/office/drawing/2016/SVG/main" r:embed="rId27"/>
+              </a:ext>
+            </a:extLst>
+          </a:blip>
+          <a:stretch>
+            <a:fillRect/>
+          </a:stretch>
+        </p:blipFill>
+        <p:spPr>
+          <a:xfrm>
+            <a:off x="416858" y="2468880"/>
+            <a:ext cx="914400" cy="914400"/>
+          </a:xfrm>
+          <a:prstGeom prst="rect">
+            <a:avLst/>
+          </a:prstGeom>
+        </p:spPr>
+      </p:pic>
+      <p:pic>
+        <p:nvPicPr>
+          <p:cNvPr id="18" name="Graphic 17" descr="Wi-Fi with solid fill">
+            <a:extLst>
+              <a:ext uri="{FF2B5EF4-FFF2-40B4-BE49-F238E27FC236}">
+                <a16:creationId xmlns:a16="http://schemas.microsoft.com/office/drawing/2014/main" id="{EC889939-09B7-C167-3168-6EB9EFD7EC85}"/>
+              </a:ext>
+            </a:extLst>
+          </p:cNvPr>
+          <p:cNvPicPr>
+            <a:picLocks noChangeAspect="1"/>
+          </p:cNvPicPr>
+          <p:nvPr/>
+        </p:nvPicPr>
+        <p:blipFill>
+          <a:blip r:embed="rId28">
+            <a:extLst>
+              <a:ext uri="{96DAC541-7B7A-43D3-8B79-37D633B846F1}">
+                <asvg:svgBlip xmlns:asvg="http://schemas.microsoft.com/office/drawing/2016/SVG/main" r:embed="rId29"/>
+              </a:ext>
+            </a:extLst>
+          </a:blip>
+          <a:stretch>
+            <a:fillRect/>
+          </a:stretch>
+        </p:blipFill>
+        <p:spPr>
+          <a:xfrm>
+            <a:off x="1752600" y="2452255"/>
+            <a:ext cx="914400" cy="914400"/>
+          </a:xfrm>
+          <a:prstGeom prst="rect">
+            <a:avLst/>
+          </a:prstGeom>
+        </p:spPr>
+      </p:pic>
+      <p:pic>
+        <p:nvPicPr>
+          <p:cNvPr id="22" name="Graphic 21" descr="Full battery with solid fill">
+            <a:extLst>
+              <a:ext uri="{FF2B5EF4-FFF2-40B4-BE49-F238E27FC236}">
+                <a16:creationId xmlns:a16="http://schemas.microsoft.com/office/drawing/2014/main" id="{56493FC3-BFB0-E076-0ADE-18C77C744DBF}"/>
+              </a:ext>
+            </a:extLst>
+          </p:cNvPr>
+          <p:cNvPicPr>
+            <a:picLocks noChangeAspect="1"/>
+          </p:cNvPicPr>
+          <p:nvPr/>
+        </p:nvPicPr>
+        <p:blipFill>
+          <a:blip r:embed="rId30">
+            <a:extLst>
+              <a:ext uri="{96DAC541-7B7A-43D3-8B79-37D633B846F1}">
+                <asvg:svgBlip xmlns:asvg="http://schemas.microsoft.com/office/drawing/2016/SVG/main" r:embed="rId31"/>
+              </a:ext>
+            </a:extLst>
+          </a:blip>
+          <a:stretch>
+            <a:fillRect/>
+          </a:stretch>
+        </p:blipFill>
+        <p:spPr>
+          <a:xfrm>
+            <a:off x="3088342" y="2452255"/>
+            <a:ext cx="914400" cy="914400"/>
+          </a:xfrm>
+          <a:prstGeom prst="rect">
+            <a:avLst/>
+          </a:prstGeom>
+        </p:spPr>
+      </p:pic>
+      <p:pic>
+        <p:nvPicPr>
+          <p:cNvPr id="26" name="Graphic 25" descr="Power with solid fill">
+            <a:extLst>
+              <a:ext uri="{FF2B5EF4-FFF2-40B4-BE49-F238E27FC236}">
+                <a16:creationId xmlns:a16="http://schemas.microsoft.com/office/drawing/2014/main" id="{3E96B83A-25E2-D40A-78F6-FCA25DC5B4D5}"/>
+              </a:ext>
+            </a:extLst>
+          </p:cNvPr>
+          <p:cNvPicPr>
+            <a:picLocks noChangeAspect="1"/>
+          </p:cNvPicPr>
+          <p:nvPr/>
+        </p:nvPicPr>
+        <p:blipFill>
+          <a:blip r:embed="rId32">
+            <a:extLst>
+              <a:ext uri="{96DAC541-7B7A-43D3-8B79-37D633B846F1}">
+                <asvg:svgBlip xmlns:asvg="http://schemas.microsoft.com/office/drawing/2016/SVG/main" r:embed="rId33"/>
+              </a:ext>
+            </a:extLst>
+          </a:blip>
+          <a:stretch>
+            <a:fillRect/>
+          </a:stretch>
+        </p:blipFill>
+        <p:spPr>
+          <a:xfrm>
+            <a:off x="4460035" y="2380130"/>
             <a:ext cx="914400" cy="914400"/>
           </a:xfrm>
           <a:prstGeom prst="rect">

</xml_diff>

<commit_message>
Included background image for action hint
</commit_message>
<xml_diff>
--- a/Assets/Materials + Textures/Personal/Roomnames/Roomnames.pptx
+++ b/Assets/Materials + Textures/Personal/Roomnames/Roomnames.pptx
@@ -16,6 +16,7 @@
     <p:sldId id="259" r:id="rId10"/>
     <p:sldId id="266" r:id="rId11"/>
     <p:sldId id="267" r:id="rId12"/>
+    <p:sldId id="268" r:id="rId13"/>
   </p:sldIdLst>
   <p:sldSz cx="12192000" cy="6858000"/>
   <p:notesSz cx="6858000" cy="9144000"/>
@@ -271,7 +272,7 @@
           <a:p>
             <a:fld id="{14389514-1D2E-45F5-8DC5-A75A64E20C29}" type="datetimeFigureOut">
               <a:rPr lang="en-GB" smtClean="0"/>
-              <a:t>06/09/2025</a:t>
+              <a:t>21/09/2025</a:t>
             </a:fld>
             <a:endParaRPr lang="en-GB"/>
           </a:p>
@@ -471,7 +472,7 @@
           <a:p>
             <a:fld id="{14389514-1D2E-45F5-8DC5-A75A64E20C29}" type="datetimeFigureOut">
               <a:rPr lang="en-GB" smtClean="0"/>
-              <a:t>06/09/2025</a:t>
+              <a:t>21/09/2025</a:t>
             </a:fld>
             <a:endParaRPr lang="en-GB"/>
           </a:p>
@@ -681,7 +682,7 @@
           <a:p>
             <a:fld id="{14389514-1D2E-45F5-8DC5-A75A64E20C29}" type="datetimeFigureOut">
               <a:rPr lang="en-GB" smtClean="0"/>
-              <a:t>06/09/2025</a:t>
+              <a:t>21/09/2025</a:t>
             </a:fld>
             <a:endParaRPr lang="en-GB"/>
           </a:p>
@@ -881,7 +882,7 @@
           <a:p>
             <a:fld id="{14389514-1D2E-45F5-8DC5-A75A64E20C29}" type="datetimeFigureOut">
               <a:rPr lang="en-GB" smtClean="0"/>
-              <a:t>06/09/2025</a:t>
+              <a:t>21/09/2025</a:t>
             </a:fld>
             <a:endParaRPr lang="en-GB"/>
           </a:p>
@@ -1157,7 +1158,7 @@
           <a:p>
             <a:fld id="{14389514-1D2E-45F5-8DC5-A75A64E20C29}" type="datetimeFigureOut">
               <a:rPr lang="en-GB" smtClean="0"/>
-              <a:t>06/09/2025</a:t>
+              <a:t>21/09/2025</a:t>
             </a:fld>
             <a:endParaRPr lang="en-GB"/>
           </a:p>
@@ -1425,7 +1426,7 @@
           <a:p>
             <a:fld id="{14389514-1D2E-45F5-8DC5-A75A64E20C29}" type="datetimeFigureOut">
               <a:rPr lang="en-GB" smtClean="0"/>
-              <a:t>06/09/2025</a:t>
+              <a:t>21/09/2025</a:t>
             </a:fld>
             <a:endParaRPr lang="en-GB"/>
           </a:p>
@@ -1840,7 +1841,7 @@
           <a:p>
             <a:fld id="{14389514-1D2E-45F5-8DC5-A75A64E20C29}" type="datetimeFigureOut">
               <a:rPr lang="en-GB" smtClean="0"/>
-              <a:t>06/09/2025</a:t>
+              <a:t>21/09/2025</a:t>
             </a:fld>
             <a:endParaRPr lang="en-GB"/>
           </a:p>
@@ -1982,7 +1983,7 @@
           <a:p>
             <a:fld id="{14389514-1D2E-45F5-8DC5-A75A64E20C29}" type="datetimeFigureOut">
               <a:rPr lang="en-GB" smtClean="0"/>
-              <a:t>06/09/2025</a:t>
+              <a:t>21/09/2025</a:t>
             </a:fld>
             <a:endParaRPr lang="en-GB"/>
           </a:p>
@@ -2095,7 +2096,7 @@
           <a:p>
             <a:fld id="{14389514-1D2E-45F5-8DC5-A75A64E20C29}" type="datetimeFigureOut">
               <a:rPr lang="en-GB" smtClean="0"/>
-              <a:t>06/09/2025</a:t>
+              <a:t>21/09/2025</a:t>
             </a:fld>
             <a:endParaRPr lang="en-GB"/>
           </a:p>
@@ -2408,7 +2409,7 @@
           <a:p>
             <a:fld id="{14389514-1D2E-45F5-8DC5-A75A64E20C29}" type="datetimeFigureOut">
               <a:rPr lang="en-GB" smtClean="0"/>
-              <a:t>06/09/2025</a:t>
+              <a:t>21/09/2025</a:t>
             </a:fld>
             <a:endParaRPr lang="en-GB"/>
           </a:p>
@@ -2697,7 +2698,7 @@
           <a:p>
             <a:fld id="{14389514-1D2E-45F5-8DC5-A75A64E20C29}" type="datetimeFigureOut">
               <a:rPr lang="en-GB" smtClean="0"/>
-              <a:t>06/09/2025</a:t>
+              <a:t>21/09/2025</a:t>
             </a:fld>
             <a:endParaRPr lang="en-GB"/>
           </a:p>
@@ -2940,7 +2941,7 @@
           <a:p>
             <a:fld id="{14389514-1D2E-45F5-8DC5-A75A64E20C29}" type="datetimeFigureOut">
               <a:rPr lang="en-GB" smtClean="0"/>
-              <a:t>06/09/2025</a:t>
+              <a:t>21/09/2025</a:t>
             </a:fld>
             <a:endParaRPr lang="en-GB"/>
           </a:p>
@@ -4711,6 +4712,141 @@
 </p:sld>
 </file>
 
+<file path=ppt/slides/slide12.xml><?xml version="1.0" encoding="utf-8"?>
+<p:sld xmlns:a="http://schemas.openxmlformats.org/drawingml/2006/main" xmlns:r="http://schemas.openxmlformats.org/officeDocument/2006/relationships" xmlns:p="http://schemas.openxmlformats.org/presentationml/2006/main">
+  <p:cSld>
+    <p:spTree>
+      <p:nvGrpSpPr>
+        <p:cNvPr id="1" name=""/>
+        <p:cNvGrpSpPr/>
+        <p:nvPr/>
+      </p:nvGrpSpPr>
+      <p:grpSpPr>
+        <a:xfrm>
+          <a:off x="0" y="0"/>
+          <a:ext cx="0" cy="0"/>
+          <a:chOff x="0" y="0"/>
+          <a:chExt cx="0" cy="0"/>
+        </a:xfrm>
+      </p:grpSpPr>
+      <p:sp>
+        <p:nvSpPr>
+          <p:cNvPr id="2" name="Rectangle: Rounded Corners 1">
+            <a:extLst>
+              <a:ext uri="{FF2B5EF4-FFF2-40B4-BE49-F238E27FC236}">
+                <a16:creationId xmlns:a16="http://schemas.microsoft.com/office/drawing/2014/main" id="{D98BA793-FBF8-A9A8-7FB8-F2DBCF93EC89}"/>
+              </a:ext>
+            </a:extLst>
+          </p:cNvPr>
+          <p:cNvSpPr/>
+          <p:nvPr/>
+        </p:nvSpPr>
+        <p:spPr>
+          <a:xfrm>
+            <a:off x="2647604" y="2173778"/>
+            <a:ext cx="6032500" cy="476250"/>
+          </a:xfrm>
+          <a:prstGeom prst="roundRect">
+            <a:avLst>
+              <a:gd name="adj" fmla="val 31898"/>
+            </a:avLst>
+          </a:prstGeom>
+          <a:gradFill flip="none" rotWithShape="0">
+            <a:gsLst>
+              <a:gs pos="51000">
+                <a:schemeClr val="tx1"/>
+              </a:gs>
+              <a:gs pos="83000">
+                <a:schemeClr val="bg1">
+                  <a:lumMod val="75000"/>
+                </a:schemeClr>
+              </a:gs>
+              <a:gs pos="100000">
+                <a:srgbClr val="FFFFFF">
+                  <a:alpha val="0"/>
+                </a:srgbClr>
+              </a:gs>
+            </a:gsLst>
+            <a:lin ang="0" scaled="1"/>
+            <a:tileRect/>
+          </a:gradFill>
+          <a:ln>
+            <a:noFill/>
+          </a:ln>
+        </p:spPr>
+        <p:style>
+          <a:lnRef idx="2">
+            <a:schemeClr val="accent1">
+              <a:shade val="15000"/>
+            </a:schemeClr>
+          </a:lnRef>
+          <a:fillRef idx="1">
+            <a:schemeClr val="accent1"/>
+          </a:fillRef>
+          <a:effectRef idx="0">
+            <a:schemeClr val="accent1"/>
+          </a:effectRef>
+          <a:fontRef idx="minor">
+            <a:schemeClr val="lt1"/>
+          </a:fontRef>
+        </p:style>
+        <p:txBody>
+          <a:bodyPr rtlCol="0" anchor="ctr"/>
+          <a:lstStyle/>
+          <a:p>
+            <a:pPr algn="ctr"/>
+            <a:endParaRPr lang="en-GB"/>
+          </a:p>
+        </p:txBody>
+      </p:sp>
+      <p:sp>
+        <p:nvSpPr>
+          <p:cNvPr id="6" name="TextBox 5">
+            <a:extLst>
+              <a:ext uri="{FF2B5EF4-FFF2-40B4-BE49-F238E27FC236}">
+                <a16:creationId xmlns:a16="http://schemas.microsoft.com/office/drawing/2014/main" id="{3A24F4CF-04AF-E10A-3BD5-25F1BDED1CDE}"/>
+              </a:ext>
+            </a:extLst>
+          </p:cNvPr>
+          <p:cNvSpPr txBox="1"/>
+          <p:nvPr/>
+        </p:nvSpPr>
+        <p:spPr>
+          <a:xfrm>
+            <a:off x="2647604" y="1732085"/>
+            <a:ext cx="2398990" cy="369332"/>
+          </a:xfrm>
+          <a:prstGeom prst="rect">
+            <a:avLst/>
+          </a:prstGeom>
+          <a:noFill/>
+        </p:spPr>
+        <p:txBody>
+          <a:bodyPr wrap="none" rtlCol="0">
+            <a:spAutoFit/>
+          </a:bodyPr>
+          <a:lstStyle/>
+          <a:p>
+            <a:r>
+              <a:rPr lang="en-GB" dirty="0"/>
+              <a:t>Action Hint Background</a:t>
+            </a:r>
+          </a:p>
+        </p:txBody>
+      </p:sp>
+    </p:spTree>
+    <p:extLst>
+      <p:ext uri="{BB962C8B-B14F-4D97-AF65-F5344CB8AC3E}">
+        <p14:creationId xmlns:p14="http://schemas.microsoft.com/office/powerpoint/2010/main" val="3514224419"/>
+      </p:ext>
+    </p:extLst>
+  </p:cSld>
+  <p:clrMapOvr>
+    <a:masterClrMapping/>
+  </p:clrMapOvr>
+</p:sld>
+</file>
+
 <file path=ppt/slides/slide2.xml><?xml version="1.0" encoding="utf-8"?>
 <p:sld xmlns:a="http://schemas.openxmlformats.org/drawingml/2006/main" xmlns:r="http://schemas.openxmlformats.org/officeDocument/2006/relationships" xmlns:p="http://schemas.openxmlformats.org/presentationml/2006/main">
   <p:cSld>

</xml_diff>

<commit_message>
AnimationTrigger: Display of optional message is now after animation plays
Also: Update game messages and added a few pictures
</commit_message>
<xml_diff>
--- a/Assets/Materials + Textures/Personal/Roomnames/Roomnames.pptx
+++ b/Assets/Materials + Textures/Personal/Roomnames/Roomnames.pptx
@@ -272,7 +272,7 @@
           <a:p>
             <a:fld id="{14389514-1D2E-45F5-8DC5-A75A64E20C29}" type="datetimeFigureOut">
               <a:rPr lang="en-GB" smtClean="0"/>
-              <a:t>04/10/2025</a:t>
+              <a:t>09/10/2025</a:t>
             </a:fld>
             <a:endParaRPr lang="en-GB"/>
           </a:p>
@@ -472,7 +472,7 @@
           <a:p>
             <a:fld id="{14389514-1D2E-45F5-8DC5-A75A64E20C29}" type="datetimeFigureOut">
               <a:rPr lang="en-GB" smtClean="0"/>
-              <a:t>04/10/2025</a:t>
+              <a:t>09/10/2025</a:t>
             </a:fld>
             <a:endParaRPr lang="en-GB"/>
           </a:p>
@@ -682,7 +682,7 @@
           <a:p>
             <a:fld id="{14389514-1D2E-45F5-8DC5-A75A64E20C29}" type="datetimeFigureOut">
               <a:rPr lang="en-GB" smtClean="0"/>
-              <a:t>04/10/2025</a:t>
+              <a:t>09/10/2025</a:t>
             </a:fld>
             <a:endParaRPr lang="en-GB"/>
           </a:p>
@@ -882,7 +882,7 @@
           <a:p>
             <a:fld id="{14389514-1D2E-45F5-8DC5-A75A64E20C29}" type="datetimeFigureOut">
               <a:rPr lang="en-GB" smtClean="0"/>
-              <a:t>04/10/2025</a:t>
+              <a:t>09/10/2025</a:t>
             </a:fld>
             <a:endParaRPr lang="en-GB"/>
           </a:p>
@@ -1158,7 +1158,7 @@
           <a:p>
             <a:fld id="{14389514-1D2E-45F5-8DC5-A75A64E20C29}" type="datetimeFigureOut">
               <a:rPr lang="en-GB" smtClean="0"/>
-              <a:t>04/10/2025</a:t>
+              <a:t>09/10/2025</a:t>
             </a:fld>
             <a:endParaRPr lang="en-GB"/>
           </a:p>
@@ -1426,7 +1426,7 @@
           <a:p>
             <a:fld id="{14389514-1D2E-45F5-8DC5-A75A64E20C29}" type="datetimeFigureOut">
               <a:rPr lang="en-GB" smtClean="0"/>
-              <a:t>04/10/2025</a:t>
+              <a:t>09/10/2025</a:t>
             </a:fld>
             <a:endParaRPr lang="en-GB"/>
           </a:p>
@@ -1841,7 +1841,7 @@
           <a:p>
             <a:fld id="{14389514-1D2E-45F5-8DC5-A75A64E20C29}" type="datetimeFigureOut">
               <a:rPr lang="en-GB" smtClean="0"/>
-              <a:t>04/10/2025</a:t>
+              <a:t>09/10/2025</a:t>
             </a:fld>
             <a:endParaRPr lang="en-GB"/>
           </a:p>
@@ -1983,7 +1983,7 @@
           <a:p>
             <a:fld id="{14389514-1D2E-45F5-8DC5-A75A64E20C29}" type="datetimeFigureOut">
               <a:rPr lang="en-GB" smtClean="0"/>
-              <a:t>04/10/2025</a:t>
+              <a:t>09/10/2025</a:t>
             </a:fld>
             <a:endParaRPr lang="en-GB"/>
           </a:p>
@@ -2096,7 +2096,7 @@
           <a:p>
             <a:fld id="{14389514-1D2E-45F5-8DC5-A75A64E20C29}" type="datetimeFigureOut">
               <a:rPr lang="en-GB" smtClean="0"/>
-              <a:t>04/10/2025</a:t>
+              <a:t>09/10/2025</a:t>
             </a:fld>
             <a:endParaRPr lang="en-GB"/>
           </a:p>
@@ -2409,7 +2409,7 @@
           <a:p>
             <a:fld id="{14389514-1D2E-45F5-8DC5-A75A64E20C29}" type="datetimeFigureOut">
               <a:rPr lang="en-GB" smtClean="0"/>
-              <a:t>04/10/2025</a:t>
+              <a:t>09/10/2025</a:t>
             </a:fld>
             <a:endParaRPr lang="en-GB"/>
           </a:p>
@@ -2698,7 +2698,7 @@
           <a:p>
             <a:fld id="{14389514-1D2E-45F5-8DC5-A75A64E20C29}" type="datetimeFigureOut">
               <a:rPr lang="en-GB" smtClean="0"/>
-              <a:t>04/10/2025</a:t>
+              <a:t>09/10/2025</a:t>
             </a:fld>
             <a:endParaRPr lang="en-GB"/>
           </a:p>
@@ -2941,7 +2941,7 @@
           <a:p>
             <a:fld id="{14389514-1D2E-45F5-8DC5-A75A64E20C29}" type="datetimeFigureOut">
               <a:rPr lang="en-GB" smtClean="0"/>
-              <a:t>04/10/2025</a:t>
+              <a:t>09/10/2025</a:t>
             </a:fld>
             <a:endParaRPr lang="en-GB"/>
           </a:p>
@@ -4751,20 +4751,16 @@
               <a:gd name="adj" fmla="val 31898"/>
             </a:avLst>
           </a:prstGeom>
-          <a:gradFill flip="none" rotWithShape="0">
+          <a:gradFill flip="none" rotWithShape="1">
             <a:gsLst>
-              <a:gs pos="51000">
+              <a:gs pos="0">
                 <a:schemeClr val="tx1"/>
               </a:gs>
-              <a:gs pos="83000">
-                <a:schemeClr val="bg1">
-                  <a:lumMod val="75000"/>
-                </a:schemeClr>
+              <a:gs pos="69000">
+                <a:schemeClr val="tx1"/>
               </a:gs>
-              <a:gs pos="100000">
-                <a:srgbClr val="FFFFFF">
-                  <a:alpha val="0"/>
-                </a:srgbClr>
+              <a:gs pos="97000">
+                <a:schemeClr val="bg1"/>
               </a:gs>
             </a:gsLst>
             <a:lin ang="0" scaled="1"/>

</xml_diff>

<commit_message>
Continue to style PDA
</commit_message>
<xml_diff>
--- a/Assets/Materials + Textures/Personal/Roomnames/Roomnames.pptx
+++ b/Assets/Materials + Textures/Personal/Roomnames/Roomnames.pptx
@@ -5,18 +5,19 @@
     <p:sldMasterId id="2147483648" r:id="rId1"/>
   </p:sldMasterIdLst>
   <p:sldIdLst>
-    <p:sldId id="257" r:id="rId2"/>
-    <p:sldId id="256" r:id="rId3"/>
-    <p:sldId id="261" r:id="rId4"/>
-    <p:sldId id="260" r:id="rId5"/>
-    <p:sldId id="263" r:id="rId6"/>
-    <p:sldId id="264" r:id="rId7"/>
-    <p:sldId id="265" r:id="rId8"/>
-    <p:sldId id="258" r:id="rId9"/>
-    <p:sldId id="259" r:id="rId10"/>
-    <p:sldId id="266" r:id="rId11"/>
-    <p:sldId id="267" r:id="rId12"/>
-    <p:sldId id="268" r:id="rId13"/>
+    <p:sldId id="269" r:id="rId2"/>
+    <p:sldId id="257" r:id="rId3"/>
+    <p:sldId id="256" r:id="rId4"/>
+    <p:sldId id="261" r:id="rId5"/>
+    <p:sldId id="260" r:id="rId6"/>
+    <p:sldId id="263" r:id="rId7"/>
+    <p:sldId id="264" r:id="rId8"/>
+    <p:sldId id="265" r:id="rId9"/>
+    <p:sldId id="258" r:id="rId10"/>
+    <p:sldId id="259" r:id="rId11"/>
+    <p:sldId id="266" r:id="rId12"/>
+    <p:sldId id="267" r:id="rId13"/>
+    <p:sldId id="268" r:id="rId14"/>
   </p:sldIdLst>
   <p:sldSz cx="12192000" cy="6858000"/>
   <p:notesSz cx="6858000" cy="9144000"/>
@@ -272,7 +273,7 @@
           <a:p>
             <a:fld id="{14389514-1D2E-45F5-8DC5-A75A64E20C29}" type="datetimeFigureOut">
               <a:rPr lang="en-GB" smtClean="0"/>
-              <a:t>09/10/2025</a:t>
+              <a:t>18/10/2025</a:t>
             </a:fld>
             <a:endParaRPr lang="en-GB"/>
           </a:p>
@@ -472,7 +473,7 @@
           <a:p>
             <a:fld id="{14389514-1D2E-45F5-8DC5-A75A64E20C29}" type="datetimeFigureOut">
               <a:rPr lang="en-GB" smtClean="0"/>
-              <a:t>09/10/2025</a:t>
+              <a:t>18/10/2025</a:t>
             </a:fld>
             <a:endParaRPr lang="en-GB"/>
           </a:p>
@@ -682,7 +683,7 @@
           <a:p>
             <a:fld id="{14389514-1D2E-45F5-8DC5-A75A64E20C29}" type="datetimeFigureOut">
               <a:rPr lang="en-GB" smtClean="0"/>
-              <a:t>09/10/2025</a:t>
+              <a:t>18/10/2025</a:t>
             </a:fld>
             <a:endParaRPr lang="en-GB"/>
           </a:p>
@@ -882,7 +883,7 @@
           <a:p>
             <a:fld id="{14389514-1D2E-45F5-8DC5-A75A64E20C29}" type="datetimeFigureOut">
               <a:rPr lang="en-GB" smtClean="0"/>
-              <a:t>09/10/2025</a:t>
+              <a:t>18/10/2025</a:t>
             </a:fld>
             <a:endParaRPr lang="en-GB"/>
           </a:p>
@@ -1158,7 +1159,7 @@
           <a:p>
             <a:fld id="{14389514-1D2E-45F5-8DC5-A75A64E20C29}" type="datetimeFigureOut">
               <a:rPr lang="en-GB" smtClean="0"/>
-              <a:t>09/10/2025</a:t>
+              <a:t>18/10/2025</a:t>
             </a:fld>
             <a:endParaRPr lang="en-GB"/>
           </a:p>
@@ -1426,7 +1427,7 @@
           <a:p>
             <a:fld id="{14389514-1D2E-45F5-8DC5-A75A64E20C29}" type="datetimeFigureOut">
               <a:rPr lang="en-GB" smtClean="0"/>
-              <a:t>09/10/2025</a:t>
+              <a:t>18/10/2025</a:t>
             </a:fld>
             <a:endParaRPr lang="en-GB"/>
           </a:p>
@@ -1841,7 +1842,7 @@
           <a:p>
             <a:fld id="{14389514-1D2E-45F5-8DC5-A75A64E20C29}" type="datetimeFigureOut">
               <a:rPr lang="en-GB" smtClean="0"/>
-              <a:t>09/10/2025</a:t>
+              <a:t>18/10/2025</a:t>
             </a:fld>
             <a:endParaRPr lang="en-GB"/>
           </a:p>
@@ -1983,7 +1984,7 @@
           <a:p>
             <a:fld id="{14389514-1D2E-45F5-8DC5-A75A64E20C29}" type="datetimeFigureOut">
               <a:rPr lang="en-GB" smtClean="0"/>
-              <a:t>09/10/2025</a:t>
+              <a:t>18/10/2025</a:t>
             </a:fld>
             <a:endParaRPr lang="en-GB"/>
           </a:p>
@@ -2096,7 +2097,7 @@
           <a:p>
             <a:fld id="{14389514-1D2E-45F5-8DC5-A75A64E20C29}" type="datetimeFigureOut">
               <a:rPr lang="en-GB" smtClean="0"/>
-              <a:t>09/10/2025</a:t>
+              <a:t>18/10/2025</a:t>
             </a:fld>
             <a:endParaRPr lang="en-GB"/>
           </a:p>
@@ -2409,7 +2410,7 @@
           <a:p>
             <a:fld id="{14389514-1D2E-45F5-8DC5-A75A64E20C29}" type="datetimeFigureOut">
               <a:rPr lang="en-GB" smtClean="0"/>
-              <a:t>09/10/2025</a:t>
+              <a:t>18/10/2025</a:t>
             </a:fld>
             <a:endParaRPr lang="en-GB"/>
           </a:p>
@@ -2698,7 +2699,7 @@
           <a:p>
             <a:fld id="{14389514-1D2E-45F5-8DC5-A75A64E20C29}" type="datetimeFigureOut">
               <a:rPr lang="en-GB" smtClean="0"/>
-              <a:t>09/10/2025</a:t>
+              <a:t>18/10/2025</a:t>
             </a:fld>
             <a:endParaRPr lang="en-GB"/>
           </a:p>
@@ -2941,7 +2942,7 @@
           <a:p>
             <a:fld id="{14389514-1D2E-45F5-8DC5-A75A64E20C29}" type="datetimeFigureOut">
               <a:rPr lang="en-GB" smtClean="0"/>
-              <a:t>09/10/2025</a:t>
+              <a:t>18/10/2025</a:t>
             </a:fld>
             <a:endParaRPr lang="en-GB"/>
           </a:p>
@@ -3360,49 +3361,2150 @@
       </p:grpSpPr>
       <p:sp>
         <p:nvSpPr>
-          <p:cNvPr id="7" name="TextBox 6">
-            <a:extLst>
-              <a:ext uri="{FF2B5EF4-FFF2-40B4-BE49-F238E27FC236}">
-                <a16:creationId xmlns:a16="http://schemas.microsoft.com/office/drawing/2014/main" id="{AFFC7EE0-CF02-60F2-E895-D54CD3B327EC}"/>
-              </a:ext>
-            </a:extLst>
-          </p:cNvPr>
-          <p:cNvSpPr txBox="1"/>
-          <p:nvPr/>
-        </p:nvSpPr>
-        <p:spPr>
-          <a:xfrm>
-            <a:off x="3576000" y="2709000"/>
-            <a:ext cx="5040000" cy="1440000"/>
+          <p:cNvPr id="4" name="Title 3">
+            <a:extLst>
+              <a:ext uri="{FF2B5EF4-FFF2-40B4-BE49-F238E27FC236}">
+                <a16:creationId xmlns:a16="http://schemas.microsoft.com/office/drawing/2014/main" id="{4344193D-FB1E-310D-1859-B4A825D14CFC}"/>
+              </a:ext>
+            </a:extLst>
+          </p:cNvPr>
+          <p:cNvSpPr>
+            <a:spLocks noGrp="1"/>
+          </p:cNvSpPr>
+          <p:nvPr>
+            <p:ph type="title"/>
+          </p:nvPr>
+        </p:nvSpPr>
+        <p:spPr/>
+        <p:txBody>
+          <a:bodyPr/>
+          <a:lstStyle/>
+          <a:p>
+            <a:r>
+              <a:rPr lang="en-GB" dirty="0"/>
+              <a:t>PDA Palette</a:t>
+            </a:r>
+          </a:p>
+        </p:txBody>
+      </p:sp>
+      <p:sp>
+        <p:nvSpPr>
+          <p:cNvPr id="5" name="Rectangle 4">
+            <a:extLst>
+              <a:ext uri="{FF2B5EF4-FFF2-40B4-BE49-F238E27FC236}">
+                <a16:creationId xmlns:a16="http://schemas.microsoft.com/office/drawing/2014/main" id="{09BB8913-297C-8738-B249-FBAA7669B508}"/>
+              </a:ext>
+            </a:extLst>
+          </p:cNvPr>
+          <p:cNvSpPr/>
+          <p:nvPr/>
+        </p:nvSpPr>
+        <p:spPr>
+          <a:xfrm>
+            <a:off x="838200" y="1504603"/>
+            <a:ext cx="2960716" cy="286789"/>
           </a:xfrm>
           <a:prstGeom prst="rect">
             <a:avLst/>
           </a:prstGeom>
           <a:noFill/>
-        </p:spPr>
-        <p:txBody>
-          <a:bodyPr wrap="none" rtlCol="0" anchor="ctr">
-            <a:noAutofit/>
-          </a:bodyPr>
+          <a:ln>
+            <a:solidFill>
+              <a:schemeClr val="tx1"/>
+            </a:solidFill>
+          </a:ln>
+        </p:spPr>
+        <p:style>
+          <a:lnRef idx="2">
+            <a:schemeClr val="dk1">
+              <a:shade val="15000"/>
+            </a:schemeClr>
+          </a:lnRef>
+          <a:fillRef idx="1">
+            <a:schemeClr val="dk1"/>
+          </a:fillRef>
+          <a:effectRef idx="0">
+            <a:schemeClr val="dk1"/>
+          </a:effectRef>
+          <a:fontRef idx="minor">
+            <a:schemeClr val="lt1"/>
+          </a:fontRef>
+        </p:style>
+        <p:txBody>
+          <a:bodyPr rtlCol="0" anchor="ctr"/>
           <a:lstStyle/>
           <a:p>
             <a:pPr algn="ctr"/>
             <a:r>
-              <a:rPr lang="en-GB" sz="8800" b="1" dirty="0">
-                <a:ln w="0"/>
+              <a:rPr lang="en-GB" dirty="0">
                 <a:solidFill>
-                  <a:srgbClr val="FF0000"/>
+                  <a:schemeClr val="tx1"/>
                 </a:solidFill>
               </a:rPr>
-              <a:t>Save as JPG, not PNG</a:t>
-            </a:r>
-          </a:p>
-        </p:txBody>
-      </p:sp>
+              <a:t>screen </a:t>
+            </a:r>
+          </a:p>
+        </p:txBody>
+      </p:sp>
+      <p:sp>
+        <p:nvSpPr>
+          <p:cNvPr id="6" name="Rectangle 5">
+            <a:extLst>
+              <a:ext uri="{FF2B5EF4-FFF2-40B4-BE49-F238E27FC236}">
+                <a16:creationId xmlns:a16="http://schemas.microsoft.com/office/drawing/2014/main" id="{E9AC65BB-A72C-04B5-50C2-BB088313BE6E}"/>
+              </a:ext>
+            </a:extLst>
+          </p:cNvPr>
+          <p:cNvSpPr/>
+          <p:nvPr/>
+        </p:nvSpPr>
+        <p:spPr>
+          <a:xfrm>
+            <a:off x="3798916" y="1504603"/>
+            <a:ext cx="2960716" cy="286789"/>
+          </a:xfrm>
+          <a:prstGeom prst="rect">
+            <a:avLst/>
+          </a:prstGeom>
+          <a:noFill/>
+          <a:ln>
+            <a:solidFill>
+              <a:schemeClr val="tx1"/>
+            </a:solidFill>
+          </a:ln>
+        </p:spPr>
+        <p:style>
+          <a:lnRef idx="2">
+            <a:schemeClr val="dk1">
+              <a:shade val="15000"/>
+            </a:schemeClr>
+          </a:lnRef>
+          <a:fillRef idx="1">
+            <a:schemeClr val="dk1"/>
+          </a:fillRef>
+          <a:effectRef idx="0">
+            <a:schemeClr val="dk1"/>
+          </a:effectRef>
+          <a:fontRef idx="minor">
+            <a:schemeClr val="lt1"/>
+          </a:fontRef>
+        </p:style>
+        <p:txBody>
+          <a:bodyPr rtlCol="0" anchor="ctr"/>
+          <a:lstStyle/>
+          <a:p>
+            <a:pPr algn="ctr"/>
+            <a:r>
+              <a:rPr lang="en-GB" dirty="0">
+                <a:solidFill>
+                  <a:schemeClr val="tx1"/>
+                </a:solidFill>
+              </a:rPr>
+              <a:t>f8f2de</a:t>
+            </a:r>
+          </a:p>
+        </p:txBody>
+      </p:sp>
+      <p:sp>
+        <p:nvSpPr>
+          <p:cNvPr id="7" name="Rectangle 6">
+            <a:extLst>
+              <a:ext uri="{FF2B5EF4-FFF2-40B4-BE49-F238E27FC236}">
+                <a16:creationId xmlns:a16="http://schemas.microsoft.com/office/drawing/2014/main" id="{7B84BD7F-F2F7-6772-96E9-3CCD7E32387A}"/>
+              </a:ext>
+            </a:extLst>
+          </p:cNvPr>
+          <p:cNvSpPr/>
+          <p:nvPr/>
+        </p:nvSpPr>
+        <p:spPr>
+          <a:xfrm>
+            <a:off x="6759632" y="1504603"/>
+            <a:ext cx="2288772" cy="286789"/>
+          </a:xfrm>
+          <a:prstGeom prst="rect">
+            <a:avLst/>
+          </a:prstGeom>
+          <a:solidFill>
+            <a:srgbClr val="F8F2DE"/>
+          </a:solidFill>
+          <a:ln>
+            <a:solidFill>
+              <a:schemeClr val="tx1"/>
+            </a:solidFill>
+          </a:ln>
+        </p:spPr>
+        <p:style>
+          <a:lnRef idx="2">
+            <a:schemeClr val="dk1">
+              <a:shade val="15000"/>
+            </a:schemeClr>
+          </a:lnRef>
+          <a:fillRef idx="1">
+            <a:schemeClr val="dk1"/>
+          </a:fillRef>
+          <a:effectRef idx="0">
+            <a:schemeClr val="dk1"/>
+          </a:effectRef>
+          <a:fontRef idx="minor">
+            <a:schemeClr val="lt1"/>
+          </a:fontRef>
+        </p:style>
+        <p:txBody>
+          <a:bodyPr rtlCol="0" anchor="ctr"/>
+          <a:lstStyle/>
+          <a:p>
+            <a:pPr algn="ctr"/>
+            <a:endParaRPr lang="en-GB"/>
+          </a:p>
+        </p:txBody>
+      </p:sp>
+      <p:sp>
+        <p:nvSpPr>
+          <p:cNvPr id="8" name="Rectangle 7">
+            <a:extLst>
+              <a:ext uri="{FF2B5EF4-FFF2-40B4-BE49-F238E27FC236}">
+                <a16:creationId xmlns:a16="http://schemas.microsoft.com/office/drawing/2014/main" id="{5E63C73A-1EEB-2C99-380F-FEBF6A9C54B6}"/>
+              </a:ext>
+            </a:extLst>
+          </p:cNvPr>
+          <p:cNvSpPr/>
+          <p:nvPr/>
+        </p:nvSpPr>
+        <p:spPr>
+          <a:xfrm>
+            <a:off x="838200" y="1791392"/>
+            <a:ext cx="2960716" cy="286789"/>
+          </a:xfrm>
+          <a:prstGeom prst="rect">
+            <a:avLst/>
+          </a:prstGeom>
+          <a:noFill/>
+          <a:ln>
+            <a:solidFill>
+              <a:schemeClr val="tx1"/>
+            </a:solidFill>
+          </a:ln>
+        </p:spPr>
+        <p:style>
+          <a:lnRef idx="2">
+            <a:schemeClr val="dk1">
+              <a:shade val="15000"/>
+            </a:schemeClr>
+          </a:lnRef>
+          <a:fillRef idx="1">
+            <a:schemeClr val="dk1"/>
+          </a:fillRef>
+          <a:effectRef idx="0">
+            <a:schemeClr val="dk1"/>
+          </a:effectRef>
+          <a:fontRef idx="minor">
+            <a:schemeClr val="lt1"/>
+          </a:fontRef>
+        </p:style>
+        <p:txBody>
+          <a:bodyPr rtlCol="0" anchor="ctr"/>
+          <a:lstStyle/>
+          <a:p>
+            <a:pPr algn="ctr"/>
+            <a:r>
+              <a:rPr lang="en-GB" dirty="0">
+                <a:solidFill>
+                  <a:schemeClr val="tx1"/>
+                </a:solidFill>
+              </a:rPr>
+              <a:t>text </a:t>
+            </a:r>
+          </a:p>
+        </p:txBody>
+      </p:sp>
+      <p:sp>
+        <p:nvSpPr>
+          <p:cNvPr id="9" name="Rectangle 8">
+            <a:extLst>
+              <a:ext uri="{FF2B5EF4-FFF2-40B4-BE49-F238E27FC236}">
+                <a16:creationId xmlns:a16="http://schemas.microsoft.com/office/drawing/2014/main" id="{61F3E983-E45B-AE82-14A3-10C555C0B958}"/>
+              </a:ext>
+            </a:extLst>
+          </p:cNvPr>
+          <p:cNvSpPr/>
+          <p:nvPr/>
+        </p:nvSpPr>
+        <p:spPr>
+          <a:xfrm>
+            <a:off x="3798916" y="1791392"/>
+            <a:ext cx="2960716" cy="286789"/>
+          </a:xfrm>
+          <a:prstGeom prst="rect">
+            <a:avLst/>
+          </a:prstGeom>
+          <a:noFill/>
+          <a:ln>
+            <a:solidFill>
+              <a:schemeClr val="tx1"/>
+            </a:solidFill>
+          </a:ln>
+        </p:spPr>
+        <p:style>
+          <a:lnRef idx="2">
+            <a:schemeClr val="dk1">
+              <a:shade val="15000"/>
+            </a:schemeClr>
+          </a:lnRef>
+          <a:fillRef idx="1">
+            <a:schemeClr val="dk1"/>
+          </a:fillRef>
+          <a:effectRef idx="0">
+            <a:schemeClr val="dk1"/>
+          </a:effectRef>
+          <a:fontRef idx="minor">
+            <a:schemeClr val="lt1"/>
+          </a:fontRef>
+        </p:style>
+        <p:txBody>
+          <a:bodyPr rtlCol="0" anchor="ctr"/>
+          <a:lstStyle/>
+          <a:p>
+            <a:pPr algn="ctr"/>
+            <a:r>
+              <a:rPr lang="en-GB" dirty="0">
+                <a:solidFill>
+                  <a:schemeClr val="tx1"/>
+                </a:solidFill>
+              </a:rPr>
+              <a:t>5ba9a9</a:t>
+            </a:r>
+          </a:p>
+        </p:txBody>
+      </p:sp>
+      <p:sp>
+        <p:nvSpPr>
+          <p:cNvPr id="10" name="Rectangle 9">
+            <a:extLst>
+              <a:ext uri="{FF2B5EF4-FFF2-40B4-BE49-F238E27FC236}">
+                <a16:creationId xmlns:a16="http://schemas.microsoft.com/office/drawing/2014/main" id="{596CB89A-0AAF-5A04-08EF-FD8B5A84208C}"/>
+              </a:ext>
+            </a:extLst>
+          </p:cNvPr>
+          <p:cNvSpPr/>
+          <p:nvPr/>
+        </p:nvSpPr>
+        <p:spPr>
+          <a:xfrm>
+            <a:off x="6759632" y="1791392"/>
+            <a:ext cx="2288772" cy="286789"/>
+          </a:xfrm>
+          <a:prstGeom prst="rect">
+            <a:avLst/>
+          </a:prstGeom>
+          <a:solidFill>
+            <a:srgbClr val="5BA9A9"/>
+          </a:solidFill>
+          <a:ln>
+            <a:solidFill>
+              <a:schemeClr val="tx1"/>
+            </a:solidFill>
+          </a:ln>
+        </p:spPr>
+        <p:style>
+          <a:lnRef idx="2">
+            <a:schemeClr val="dk1">
+              <a:shade val="15000"/>
+            </a:schemeClr>
+          </a:lnRef>
+          <a:fillRef idx="1">
+            <a:schemeClr val="dk1"/>
+          </a:fillRef>
+          <a:effectRef idx="0">
+            <a:schemeClr val="dk1"/>
+          </a:effectRef>
+          <a:fontRef idx="minor">
+            <a:schemeClr val="lt1"/>
+          </a:fontRef>
+        </p:style>
+        <p:txBody>
+          <a:bodyPr rtlCol="0" anchor="ctr"/>
+          <a:lstStyle/>
+          <a:p>
+            <a:pPr algn="ctr"/>
+            <a:endParaRPr lang="en-GB"/>
+          </a:p>
+        </p:txBody>
+      </p:sp>
+      <p:sp>
+        <p:nvSpPr>
+          <p:cNvPr id="19" name="Rectangle 18">
+            <a:extLst>
+              <a:ext uri="{FF2B5EF4-FFF2-40B4-BE49-F238E27FC236}">
+                <a16:creationId xmlns:a16="http://schemas.microsoft.com/office/drawing/2014/main" id="{F9478346-C447-D036-DA90-425F7FC85B5D}"/>
+              </a:ext>
+            </a:extLst>
+          </p:cNvPr>
+          <p:cNvSpPr/>
+          <p:nvPr/>
+        </p:nvSpPr>
+        <p:spPr>
+          <a:xfrm>
+            <a:off x="838200" y="2078181"/>
+            <a:ext cx="2960716" cy="286789"/>
+          </a:xfrm>
+          <a:prstGeom prst="rect">
+            <a:avLst/>
+          </a:prstGeom>
+          <a:noFill/>
+          <a:ln>
+            <a:solidFill>
+              <a:schemeClr val="tx1"/>
+            </a:solidFill>
+          </a:ln>
+        </p:spPr>
+        <p:style>
+          <a:lnRef idx="2">
+            <a:schemeClr val="dk1">
+              <a:shade val="15000"/>
+            </a:schemeClr>
+          </a:lnRef>
+          <a:fillRef idx="1">
+            <a:schemeClr val="dk1"/>
+          </a:fillRef>
+          <a:effectRef idx="0">
+            <a:schemeClr val="dk1"/>
+          </a:effectRef>
+          <a:fontRef idx="minor">
+            <a:schemeClr val="lt1"/>
+          </a:fontRef>
+        </p:style>
+        <p:txBody>
+          <a:bodyPr rtlCol="0" anchor="ctr"/>
+          <a:lstStyle/>
+          <a:p>
+            <a:pPr algn="ctr"/>
+            <a:r>
+              <a:rPr lang="en-GB" dirty="0">
+                <a:solidFill>
+                  <a:schemeClr val="tx1"/>
+                </a:solidFill>
+              </a:rPr>
+              <a:t>highlight </a:t>
+            </a:r>
+          </a:p>
+        </p:txBody>
+      </p:sp>
+      <p:sp>
+        <p:nvSpPr>
+          <p:cNvPr id="20" name="Rectangle 19">
+            <a:extLst>
+              <a:ext uri="{FF2B5EF4-FFF2-40B4-BE49-F238E27FC236}">
+                <a16:creationId xmlns:a16="http://schemas.microsoft.com/office/drawing/2014/main" id="{621CB792-36DD-81D9-F2B6-86C44B160661}"/>
+              </a:ext>
+            </a:extLst>
+          </p:cNvPr>
+          <p:cNvSpPr/>
+          <p:nvPr/>
+        </p:nvSpPr>
+        <p:spPr>
+          <a:xfrm>
+            <a:off x="3798916" y="2078181"/>
+            <a:ext cx="2960716" cy="286789"/>
+          </a:xfrm>
+          <a:prstGeom prst="rect">
+            <a:avLst/>
+          </a:prstGeom>
+          <a:noFill/>
+          <a:ln>
+            <a:solidFill>
+              <a:schemeClr val="tx1"/>
+            </a:solidFill>
+          </a:ln>
+        </p:spPr>
+        <p:style>
+          <a:lnRef idx="2">
+            <a:schemeClr val="dk1">
+              <a:shade val="15000"/>
+            </a:schemeClr>
+          </a:lnRef>
+          <a:fillRef idx="1">
+            <a:schemeClr val="dk1"/>
+          </a:fillRef>
+          <a:effectRef idx="0">
+            <a:schemeClr val="dk1"/>
+          </a:effectRef>
+          <a:fontRef idx="minor">
+            <a:schemeClr val="lt1"/>
+          </a:fontRef>
+        </p:style>
+        <p:txBody>
+          <a:bodyPr rtlCol="0" anchor="ctr"/>
+          <a:lstStyle/>
+          <a:p>
+            <a:pPr algn="ctr"/>
+            <a:r>
+              <a:rPr lang="en-GB" dirty="0">
+                <a:solidFill>
+                  <a:schemeClr val="tx1"/>
+                </a:solidFill>
+              </a:rPr>
+              <a:t>f1693c</a:t>
+            </a:r>
+          </a:p>
+        </p:txBody>
+      </p:sp>
+      <p:sp>
+        <p:nvSpPr>
+          <p:cNvPr id="21" name="Rectangle 20">
+            <a:extLst>
+              <a:ext uri="{FF2B5EF4-FFF2-40B4-BE49-F238E27FC236}">
+                <a16:creationId xmlns:a16="http://schemas.microsoft.com/office/drawing/2014/main" id="{B5FD81A9-278D-9A23-52B7-04DD38D3A3B8}"/>
+              </a:ext>
+            </a:extLst>
+          </p:cNvPr>
+          <p:cNvSpPr/>
+          <p:nvPr/>
+        </p:nvSpPr>
+        <p:spPr>
+          <a:xfrm>
+            <a:off x="6759632" y="2078181"/>
+            <a:ext cx="2288772" cy="286789"/>
+          </a:xfrm>
+          <a:prstGeom prst="rect">
+            <a:avLst/>
+          </a:prstGeom>
+          <a:solidFill>
+            <a:srgbClr val="F1693C"/>
+          </a:solidFill>
+          <a:ln>
+            <a:solidFill>
+              <a:schemeClr val="tx1"/>
+            </a:solidFill>
+          </a:ln>
+        </p:spPr>
+        <p:style>
+          <a:lnRef idx="2">
+            <a:schemeClr val="dk1">
+              <a:shade val="15000"/>
+            </a:schemeClr>
+          </a:lnRef>
+          <a:fillRef idx="1">
+            <a:schemeClr val="dk1"/>
+          </a:fillRef>
+          <a:effectRef idx="0">
+            <a:schemeClr val="dk1"/>
+          </a:effectRef>
+          <a:fontRef idx="minor">
+            <a:schemeClr val="lt1"/>
+          </a:fontRef>
+        </p:style>
+        <p:txBody>
+          <a:bodyPr rtlCol="0" anchor="ctr"/>
+          <a:lstStyle/>
+          <a:p>
+            <a:pPr algn="ctr"/>
+            <a:endParaRPr lang="en-GB"/>
+          </a:p>
+        </p:txBody>
+      </p:sp>
+      <p:sp>
+        <p:nvSpPr>
+          <p:cNvPr id="22" name="Rectangle 21">
+            <a:extLst>
+              <a:ext uri="{FF2B5EF4-FFF2-40B4-BE49-F238E27FC236}">
+                <a16:creationId xmlns:a16="http://schemas.microsoft.com/office/drawing/2014/main" id="{12394D33-9D3C-72C8-ACAD-6E17CD992478}"/>
+              </a:ext>
+            </a:extLst>
+          </p:cNvPr>
+          <p:cNvSpPr/>
+          <p:nvPr/>
+        </p:nvSpPr>
+        <p:spPr>
+          <a:xfrm>
+            <a:off x="838200" y="2364970"/>
+            <a:ext cx="2960716" cy="286789"/>
+          </a:xfrm>
+          <a:prstGeom prst="rect">
+            <a:avLst/>
+          </a:prstGeom>
+          <a:noFill/>
+          <a:ln>
+            <a:solidFill>
+              <a:schemeClr val="tx1"/>
+            </a:solidFill>
+          </a:ln>
+        </p:spPr>
+        <p:style>
+          <a:lnRef idx="2">
+            <a:schemeClr val="dk1">
+              <a:shade val="15000"/>
+            </a:schemeClr>
+          </a:lnRef>
+          <a:fillRef idx="1">
+            <a:schemeClr val="dk1"/>
+          </a:fillRef>
+          <a:effectRef idx="0">
+            <a:schemeClr val="dk1"/>
+          </a:effectRef>
+          <a:fontRef idx="minor">
+            <a:schemeClr val="lt1"/>
+          </a:fontRef>
+        </p:style>
+        <p:txBody>
+          <a:bodyPr rtlCol="0" anchor="ctr"/>
+          <a:lstStyle/>
+          <a:p>
+            <a:pPr algn="ctr"/>
+            <a:r>
+              <a:rPr lang="en-GB" dirty="0">
+                <a:solidFill>
+                  <a:schemeClr val="tx1"/>
+                </a:solidFill>
+              </a:rPr>
+              <a:t>lines </a:t>
+            </a:r>
+          </a:p>
+        </p:txBody>
+      </p:sp>
+      <p:sp>
+        <p:nvSpPr>
+          <p:cNvPr id="23" name="Rectangle 22">
+            <a:extLst>
+              <a:ext uri="{FF2B5EF4-FFF2-40B4-BE49-F238E27FC236}">
+                <a16:creationId xmlns:a16="http://schemas.microsoft.com/office/drawing/2014/main" id="{37ED0D38-8313-2F24-4430-07137B24CE01}"/>
+              </a:ext>
+            </a:extLst>
+          </p:cNvPr>
+          <p:cNvSpPr/>
+          <p:nvPr/>
+        </p:nvSpPr>
+        <p:spPr>
+          <a:xfrm>
+            <a:off x="3798916" y="2364970"/>
+            <a:ext cx="2960716" cy="286789"/>
+          </a:xfrm>
+          <a:prstGeom prst="rect">
+            <a:avLst/>
+          </a:prstGeom>
+          <a:noFill/>
+          <a:ln>
+            <a:solidFill>
+              <a:schemeClr val="tx1"/>
+            </a:solidFill>
+          </a:ln>
+        </p:spPr>
+        <p:style>
+          <a:lnRef idx="2">
+            <a:schemeClr val="dk1">
+              <a:shade val="15000"/>
+            </a:schemeClr>
+          </a:lnRef>
+          <a:fillRef idx="1">
+            <a:schemeClr val="dk1"/>
+          </a:fillRef>
+          <a:effectRef idx="0">
+            <a:schemeClr val="dk1"/>
+          </a:effectRef>
+          <a:fontRef idx="minor">
+            <a:schemeClr val="lt1"/>
+          </a:fontRef>
+        </p:style>
+        <p:txBody>
+          <a:bodyPr rtlCol="0" anchor="ctr"/>
+          <a:lstStyle/>
+          <a:p>
+            <a:pPr algn="ctr"/>
+            <a:r>
+              <a:rPr lang="en-GB" dirty="0">
+                <a:solidFill>
+                  <a:schemeClr val="tx1"/>
+                </a:solidFill>
+              </a:rPr>
+              <a:t>30393e</a:t>
+            </a:r>
+          </a:p>
+        </p:txBody>
+      </p:sp>
+      <p:sp>
+        <p:nvSpPr>
+          <p:cNvPr id="24" name="Rectangle 23">
+            <a:extLst>
+              <a:ext uri="{FF2B5EF4-FFF2-40B4-BE49-F238E27FC236}">
+                <a16:creationId xmlns:a16="http://schemas.microsoft.com/office/drawing/2014/main" id="{6767BA1B-71CD-F713-22A9-BA1CB3A4F8A2}"/>
+              </a:ext>
+            </a:extLst>
+          </p:cNvPr>
+          <p:cNvSpPr/>
+          <p:nvPr/>
+        </p:nvSpPr>
+        <p:spPr>
+          <a:xfrm>
+            <a:off x="6759632" y="2364970"/>
+            <a:ext cx="2288772" cy="286789"/>
+          </a:xfrm>
+          <a:prstGeom prst="rect">
+            <a:avLst/>
+          </a:prstGeom>
+          <a:solidFill>
+            <a:srgbClr val="30393E"/>
+          </a:solidFill>
+          <a:ln>
+            <a:solidFill>
+              <a:schemeClr val="tx1"/>
+            </a:solidFill>
+          </a:ln>
+        </p:spPr>
+        <p:style>
+          <a:lnRef idx="2">
+            <a:schemeClr val="dk1">
+              <a:shade val="15000"/>
+            </a:schemeClr>
+          </a:lnRef>
+          <a:fillRef idx="1">
+            <a:schemeClr val="dk1"/>
+          </a:fillRef>
+          <a:effectRef idx="0">
+            <a:schemeClr val="dk1"/>
+          </a:effectRef>
+          <a:fontRef idx="minor">
+            <a:schemeClr val="lt1"/>
+          </a:fontRef>
+        </p:style>
+        <p:txBody>
+          <a:bodyPr rtlCol="0" anchor="ctr"/>
+          <a:lstStyle/>
+          <a:p>
+            <a:pPr algn="ctr"/>
+            <a:endParaRPr lang="en-GB"/>
+          </a:p>
+        </p:txBody>
+      </p:sp>
+      <p:sp>
+        <p:nvSpPr>
+          <p:cNvPr id="37" name="Rectangle 36">
+            <a:extLst>
+              <a:ext uri="{FF2B5EF4-FFF2-40B4-BE49-F238E27FC236}">
+                <a16:creationId xmlns:a16="http://schemas.microsoft.com/office/drawing/2014/main" id="{8C3E1A82-FDBD-B58D-FA93-8AB3E2108E3E}"/>
+              </a:ext>
+            </a:extLst>
+          </p:cNvPr>
+          <p:cNvSpPr/>
+          <p:nvPr/>
+        </p:nvSpPr>
+        <p:spPr>
+          <a:xfrm>
+            <a:off x="838200" y="2651759"/>
+            <a:ext cx="2960716" cy="286789"/>
+          </a:xfrm>
+          <a:prstGeom prst="rect">
+            <a:avLst/>
+          </a:prstGeom>
+          <a:noFill/>
+          <a:ln>
+            <a:solidFill>
+              <a:schemeClr val="tx1"/>
+            </a:solidFill>
+          </a:ln>
+        </p:spPr>
+        <p:style>
+          <a:lnRef idx="2">
+            <a:schemeClr val="dk1">
+              <a:shade val="15000"/>
+            </a:schemeClr>
+          </a:lnRef>
+          <a:fillRef idx="1">
+            <a:schemeClr val="dk1"/>
+          </a:fillRef>
+          <a:effectRef idx="0">
+            <a:schemeClr val="dk1"/>
+          </a:effectRef>
+          <a:fontRef idx="minor">
+            <a:schemeClr val="lt1"/>
+          </a:fontRef>
+        </p:style>
+        <p:txBody>
+          <a:bodyPr rtlCol="0" anchor="ctr"/>
+          <a:lstStyle/>
+          <a:p>
+            <a:pPr algn="ctr"/>
+            <a:r>
+              <a:rPr lang="en-GB" dirty="0">
+                <a:solidFill>
+                  <a:schemeClr val="tx1"/>
+                </a:solidFill>
+              </a:rPr>
+              <a:t>alternate highlight </a:t>
+            </a:r>
+          </a:p>
+        </p:txBody>
+      </p:sp>
+      <p:sp>
+        <p:nvSpPr>
+          <p:cNvPr id="38" name="Rectangle 37">
+            <a:extLst>
+              <a:ext uri="{FF2B5EF4-FFF2-40B4-BE49-F238E27FC236}">
+                <a16:creationId xmlns:a16="http://schemas.microsoft.com/office/drawing/2014/main" id="{1BF228AA-19B9-A97E-482F-0B9599C46226}"/>
+              </a:ext>
+            </a:extLst>
+          </p:cNvPr>
+          <p:cNvSpPr/>
+          <p:nvPr/>
+        </p:nvSpPr>
+        <p:spPr>
+          <a:xfrm>
+            <a:off x="3798916" y="2651759"/>
+            <a:ext cx="2960716" cy="286789"/>
+          </a:xfrm>
+          <a:prstGeom prst="rect">
+            <a:avLst/>
+          </a:prstGeom>
+          <a:noFill/>
+          <a:ln>
+            <a:solidFill>
+              <a:schemeClr val="tx1"/>
+            </a:solidFill>
+          </a:ln>
+        </p:spPr>
+        <p:style>
+          <a:lnRef idx="2">
+            <a:schemeClr val="dk1">
+              <a:shade val="15000"/>
+            </a:schemeClr>
+          </a:lnRef>
+          <a:fillRef idx="1">
+            <a:schemeClr val="dk1"/>
+          </a:fillRef>
+          <a:effectRef idx="0">
+            <a:schemeClr val="dk1"/>
+          </a:effectRef>
+          <a:fontRef idx="minor">
+            <a:schemeClr val="lt1"/>
+          </a:fontRef>
+        </p:style>
+        <p:txBody>
+          <a:bodyPr rtlCol="0" anchor="ctr"/>
+          <a:lstStyle/>
+          <a:p>
+            <a:pPr algn="ctr"/>
+            <a:r>
+              <a:rPr lang="en-GB" dirty="0">
+                <a:solidFill>
+                  <a:schemeClr val="tx1"/>
+                </a:solidFill>
+              </a:rPr>
+              <a:t>f99e2a</a:t>
+            </a:r>
+          </a:p>
+        </p:txBody>
+      </p:sp>
+      <p:sp>
+        <p:nvSpPr>
+          <p:cNvPr id="39" name="Rectangle 38">
+            <a:extLst>
+              <a:ext uri="{FF2B5EF4-FFF2-40B4-BE49-F238E27FC236}">
+                <a16:creationId xmlns:a16="http://schemas.microsoft.com/office/drawing/2014/main" id="{B6782B23-5C07-383C-697E-301FED640B43}"/>
+              </a:ext>
+            </a:extLst>
+          </p:cNvPr>
+          <p:cNvSpPr/>
+          <p:nvPr/>
+        </p:nvSpPr>
+        <p:spPr>
+          <a:xfrm>
+            <a:off x="6759632" y="2651759"/>
+            <a:ext cx="2288772" cy="286789"/>
+          </a:xfrm>
+          <a:prstGeom prst="rect">
+            <a:avLst/>
+          </a:prstGeom>
+          <a:solidFill>
+            <a:srgbClr val="F99E2A"/>
+          </a:solidFill>
+          <a:ln>
+            <a:solidFill>
+              <a:schemeClr val="tx1"/>
+            </a:solidFill>
+          </a:ln>
+        </p:spPr>
+        <p:style>
+          <a:lnRef idx="2">
+            <a:schemeClr val="dk1">
+              <a:shade val="15000"/>
+            </a:schemeClr>
+          </a:lnRef>
+          <a:fillRef idx="1">
+            <a:schemeClr val="dk1"/>
+          </a:fillRef>
+          <a:effectRef idx="0">
+            <a:schemeClr val="dk1"/>
+          </a:effectRef>
+          <a:fontRef idx="minor">
+            <a:schemeClr val="lt1"/>
+          </a:fontRef>
+        </p:style>
+        <p:txBody>
+          <a:bodyPr rtlCol="0" anchor="ctr"/>
+          <a:lstStyle/>
+          <a:p>
+            <a:pPr algn="ctr"/>
+            <a:endParaRPr lang="en-GB"/>
+          </a:p>
+        </p:txBody>
+      </p:sp>
+      <p:sp>
+        <p:nvSpPr>
+          <p:cNvPr id="40" name="Rectangle 39">
+            <a:extLst>
+              <a:ext uri="{FF2B5EF4-FFF2-40B4-BE49-F238E27FC236}">
+                <a16:creationId xmlns:a16="http://schemas.microsoft.com/office/drawing/2014/main" id="{693A3F02-4DF8-B0BC-7889-A9E246469CE9}"/>
+              </a:ext>
+            </a:extLst>
+          </p:cNvPr>
+          <p:cNvSpPr/>
+          <p:nvPr/>
+        </p:nvSpPr>
+        <p:spPr>
+          <a:xfrm>
+            <a:off x="838200" y="2938548"/>
+            <a:ext cx="2960716" cy="286789"/>
+          </a:xfrm>
+          <a:prstGeom prst="rect">
+            <a:avLst/>
+          </a:prstGeom>
+          <a:noFill/>
+          <a:ln>
+            <a:solidFill>
+              <a:schemeClr val="tx1"/>
+            </a:solidFill>
+          </a:ln>
+        </p:spPr>
+        <p:style>
+          <a:lnRef idx="2">
+            <a:schemeClr val="dk1">
+              <a:shade val="15000"/>
+            </a:schemeClr>
+          </a:lnRef>
+          <a:fillRef idx="1">
+            <a:schemeClr val="dk1"/>
+          </a:fillRef>
+          <a:effectRef idx="0">
+            <a:schemeClr val="dk1"/>
+          </a:effectRef>
+          <a:fontRef idx="minor">
+            <a:schemeClr val="lt1"/>
+          </a:fontRef>
+        </p:style>
+        <p:txBody>
+          <a:bodyPr rtlCol="0" anchor="ctr"/>
+          <a:lstStyle/>
+          <a:p>
+            <a:pPr algn="ctr"/>
+            <a:r>
+              <a:rPr lang="en-GB" dirty="0">
+                <a:solidFill>
+                  <a:schemeClr val="tx1"/>
+                </a:solidFill>
+              </a:rPr>
+              <a:t>error/alert </a:t>
+            </a:r>
+          </a:p>
+        </p:txBody>
+      </p:sp>
+      <p:sp>
+        <p:nvSpPr>
+          <p:cNvPr id="41" name="Rectangle 40">
+            <a:extLst>
+              <a:ext uri="{FF2B5EF4-FFF2-40B4-BE49-F238E27FC236}">
+                <a16:creationId xmlns:a16="http://schemas.microsoft.com/office/drawing/2014/main" id="{833D32F8-1E9F-41AA-BE9A-7F517873F2ED}"/>
+              </a:ext>
+            </a:extLst>
+          </p:cNvPr>
+          <p:cNvSpPr/>
+          <p:nvPr/>
+        </p:nvSpPr>
+        <p:spPr>
+          <a:xfrm>
+            <a:off x="3798916" y="2938548"/>
+            <a:ext cx="2960716" cy="286789"/>
+          </a:xfrm>
+          <a:prstGeom prst="rect">
+            <a:avLst/>
+          </a:prstGeom>
+          <a:noFill/>
+          <a:ln>
+            <a:solidFill>
+              <a:schemeClr val="tx1"/>
+            </a:solidFill>
+          </a:ln>
+        </p:spPr>
+        <p:style>
+          <a:lnRef idx="2">
+            <a:schemeClr val="dk1">
+              <a:shade val="15000"/>
+            </a:schemeClr>
+          </a:lnRef>
+          <a:fillRef idx="1">
+            <a:schemeClr val="dk1"/>
+          </a:fillRef>
+          <a:effectRef idx="0">
+            <a:schemeClr val="dk1"/>
+          </a:effectRef>
+          <a:fontRef idx="minor">
+            <a:schemeClr val="lt1"/>
+          </a:fontRef>
+        </p:style>
+        <p:txBody>
+          <a:bodyPr rtlCol="0" anchor="ctr"/>
+          <a:lstStyle/>
+          <a:p>
+            <a:pPr algn="ctr"/>
+            <a:r>
+              <a:rPr lang="en-GB" dirty="0">
+                <a:solidFill>
+                  <a:schemeClr val="tx1"/>
+                </a:solidFill>
+              </a:rPr>
+              <a:t>d94f4f</a:t>
+            </a:r>
+          </a:p>
+        </p:txBody>
+      </p:sp>
+      <p:sp>
+        <p:nvSpPr>
+          <p:cNvPr id="42" name="Rectangle 41">
+            <a:extLst>
+              <a:ext uri="{FF2B5EF4-FFF2-40B4-BE49-F238E27FC236}">
+                <a16:creationId xmlns:a16="http://schemas.microsoft.com/office/drawing/2014/main" id="{EF8F58C5-5EDC-D28D-F351-5DB54933143C}"/>
+              </a:ext>
+            </a:extLst>
+          </p:cNvPr>
+          <p:cNvSpPr/>
+          <p:nvPr/>
+        </p:nvSpPr>
+        <p:spPr>
+          <a:xfrm>
+            <a:off x="6759632" y="2938548"/>
+            <a:ext cx="2288772" cy="286789"/>
+          </a:xfrm>
+          <a:prstGeom prst="rect">
+            <a:avLst/>
+          </a:prstGeom>
+          <a:solidFill>
+            <a:srgbClr val="D94F4F"/>
+          </a:solidFill>
+          <a:ln>
+            <a:solidFill>
+              <a:schemeClr val="tx1"/>
+            </a:solidFill>
+          </a:ln>
+        </p:spPr>
+        <p:style>
+          <a:lnRef idx="2">
+            <a:schemeClr val="dk1">
+              <a:shade val="15000"/>
+            </a:schemeClr>
+          </a:lnRef>
+          <a:fillRef idx="1">
+            <a:schemeClr val="dk1"/>
+          </a:fillRef>
+          <a:effectRef idx="0">
+            <a:schemeClr val="dk1"/>
+          </a:effectRef>
+          <a:fontRef idx="minor">
+            <a:schemeClr val="lt1"/>
+          </a:fontRef>
+        </p:style>
+        <p:txBody>
+          <a:bodyPr rtlCol="0" anchor="ctr"/>
+          <a:lstStyle/>
+          <a:p>
+            <a:pPr algn="ctr"/>
+            <a:endParaRPr lang="en-GB"/>
+          </a:p>
+        </p:txBody>
+      </p:sp>
+      <p:sp>
+        <p:nvSpPr>
+          <p:cNvPr id="43" name="Rectangle 42">
+            <a:extLst>
+              <a:ext uri="{FF2B5EF4-FFF2-40B4-BE49-F238E27FC236}">
+                <a16:creationId xmlns:a16="http://schemas.microsoft.com/office/drawing/2014/main" id="{C18A15D7-711B-C76A-CAD5-5D2ACE36D006}"/>
+              </a:ext>
+            </a:extLst>
+          </p:cNvPr>
+          <p:cNvSpPr/>
+          <p:nvPr/>
+        </p:nvSpPr>
+        <p:spPr>
+          <a:xfrm>
+            <a:off x="838200" y="3225337"/>
+            <a:ext cx="2960716" cy="286789"/>
+          </a:xfrm>
+          <a:prstGeom prst="rect">
+            <a:avLst/>
+          </a:prstGeom>
+          <a:noFill/>
+          <a:ln>
+            <a:solidFill>
+              <a:schemeClr val="tx1"/>
+            </a:solidFill>
+          </a:ln>
+        </p:spPr>
+        <p:style>
+          <a:lnRef idx="2">
+            <a:schemeClr val="dk1">
+              <a:shade val="15000"/>
+            </a:schemeClr>
+          </a:lnRef>
+          <a:fillRef idx="1">
+            <a:schemeClr val="dk1"/>
+          </a:fillRef>
+          <a:effectRef idx="0">
+            <a:schemeClr val="dk1"/>
+          </a:effectRef>
+          <a:fontRef idx="minor">
+            <a:schemeClr val="lt1"/>
+          </a:fontRef>
+        </p:style>
+        <p:txBody>
+          <a:bodyPr rtlCol="0" anchor="ctr"/>
+          <a:lstStyle/>
+          <a:p>
+            <a:pPr algn="ctr"/>
+            <a:r>
+              <a:rPr lang="en-GB" dirty="0">
+                <a:solidFill>
+                  <a:schemeClr val="tx1"/>
+                </a:solidFill>
+              </a:rPr>
+              <a:t>disabled/inactive </a:t>
+            </a:r>
+          </a:p>
+        </p:txBody>
+      </p:sp>
+      <p:sp>
+        <p:nvSpPr>
+          <p:cNvPr id="44" name="Rectangle 43">
+            <a:extLst>
+              <a:ext uri="{FF2B5EF4-FFF2-40B4-BE49-F238E27FC236}">
+                <a16:creationId xmlns:a16="http://schemas.microsoft.com/office/drawing/2014/main" id="{6EAA5893-A408-434A-9B9E-F81ED7EE370E}"/>
+              </a:ext>
+            </a:extLst>
+          </p:cNvPr>
+          <p:cNvSpPr/>
+          <p:nvPr/>
+        </p:nvSpPr>
+        <p:spPr>
+          <a:xfrm>
+            <a:off x="3798916" y="3225337"/>
+            <a:ext cx="2960716" cy="286789"/>
+          </a:xfrm>
+          <a:prstGeom prst="rect">
+            <a:avLst/>
+          </a:prstGeom>
+          <a:noFill/>
+          <a:ln>
+            <a:solidFill>
+              <a:schemeClr val="tx1"/>
+            </a:solidFill>
+          </a:ln>
+        </p:spPr>
+        <p:style>
+          <a:lnRef idx="2">
+            <a:schemeClr val="dk1">
+              <a:shade val="15000"/>
+            </a:schemeClr>
+          </a:lnRef>
+          <a:fillRef idx="1">
+            <a:schemeClr val="dk1"/>
+          </a:fillRef>
+          <a:effectRef idx="0">
+            <a:schemeClr val="dk1"/>
+          </a:effectRef>
+          <a:fontRef idx="minor">
+            <a:schemeClr val="lt1"/>
+          </a:fontRef>
+        </p:style>
+        <p:txBody>
+          <a:bodyPr rtlCol="0" anchor="ctr"/>
+          <a:lstStyle/>
+          <a:p>
+            <a:pPr algn="ctr"/>
+            <a:r>
+              <a:rPr lang="en-GB" dirty="0">
+                <a:solidFill>
+                  <a:schemeClr val="tx1"/>
+                </a:solidFill>
+              </a:rPr>
+              <a:t>b8b8b8</a:t>
+            </a:r>
+          </a:p>
+        </p:txBody>
+      </p:sp>
+      <p:sp>
+        <p:nvSpPr>
+          <p:cNvPr id="45" name="Rectangle 44">
+            <a:extLst>
+              <a:ext uri="{FF2B5EF4-FFF2-40B4-BE49-F238E27FC236}">
+                <a16:creationId xmlns:a16="http://schemas.microsoft.com/office/drawing/2014/main" id="{2BA5E225-3CD5-D25B-11AD-B834B944B344}"/>
+              </a:ext>
+            </a:extLst>
+          </p:cNvPr>
+          <p:cNvSpPr/>
+          <p:nvPr/>
+        </p:nvSpPr>
+        <p:spPr>
+          <a:xfrm>
+            <a:off x="6759632" y="3225337"/>
+            <a:ext cx="2288772" cy="286789"/>
+          </a:xfrm>
+          <a:prstGeom prst="rect">
+            <a:avLst/>
+          </a:prstGeom>
+          <a:solidFill>
+            <a:srgbClr val="B8B8B8"/>
+          </a:solidFill>
+          <a:ln>
+            <a:solidFill>
+              <a:schemeClr val="tx1"/>
+            </a:solidFill>
+          </a:ln>
+        </p:spPr>
+        <p:style>
+          <a:lnRef idx="2">
+            <a:schemeClr val="dk1">
+              <a:shade val="15000"/>
+            </a:schemeClr>
+          </a:lnRef>
+          <a:fillRef idx="1">
+            <a:schemeClr val="dk1"/>
+          </a:fillRef>
+          <a:effectRef idx="0">
+            <a:schemeClr val="dk1"/>
+          </a:effectRef>
+          <a:fontRef idx="minor">
+            <a:schemeClr val="lt1"/>
+          </a:fontRef>
+        </p:style>
+        <p:txBody>
+          <a:bodyPr rtlCol="0" anchor="ctr"/>
+          <a:lstStyle/>
+          <a:p>
+            <a:pPr algn="ctr"/>
+            <a:endParaRPr lang="en-GB"/>
+          </a:p>
+        </p:txBody>
+      </p:sp>
+      <p:sp>
+        <p:nvSpPr>
+          <p:cNvPr id="46" name="Rectangle 45">
+            <a:extLst>
+              <a:ext uri="{FF2B5EF4-FFF2-40B4-BE49-F238E27FC236}">
+                <a16:creationId xmlns:a16="http://schemas.microsoft.com/office/drawing/2014/main" id="{F0D4FB31-C9DE-CCA3-B6E8-B37DEEE532FD}"/>
+              </a:ext>
+            </a:extLst>
+          </p:cNvPr>
+          <p:cNvSpPr/>
+          <p:nvPr/>
+        </p:nvSpPr>
+        <p:spPr>
+          <a:xfrm>
+            <a:off x="838200" y="3512126"/>
+            <a:ext cx="2960716" cy="286789"/>
+          </a:xfrm>
+          <a:prstGeom prst="rect">
+            <a:avLst/>
+          </a:prstGeom>
+          <a:noFill/>
+          <a:ln>
+            <a:solidFill>
+              <a:schemeClr val="tx1"/>
+            </a:solidFill>
+          </a:ln>
+        </p:spPr>
+        <p:style>
+          <a:lnRef idx="2">
+            <a:schemeClr val="dk1">
+              <a:shade val="15000"/>
+            </a:schemeClr>
+          </a:lnRef>
+          <a:fillRef idx="1">
+            <a:schemeClr val="dk1"/>
+          </a:fillRef>
+          <a:effectRef idx="0">
+            <a:schemeClr val="dk1"/>
+          </a:effectRef>
+          <a:fontRef idx="minor">
+            <a:schemeClr val="lt1"/>
+          </a:fontRef>
+        </p:style>
+        <p:txBody>
+          <a:bodyPr rtlCol="0" anchor="ctr"/>
+          <a:lstStyle/>
+          <a:p>
+            <a:pPr algn="ctr"/>
+            <a:r>
+              <a:rPr lang="en-GB" dirty="0">
+                <a:solidFill>
+                  <a:schemeClr val="tx1"/>
+                </a:solidFill>
+              </a:rPr>
+              <a:t>success/confirmation </a:t>
+            </a:r>
+          </a:p>
+        </p:txBody>
+      </p:sp>
+      <p:sp>
+        <p:nvSpPr>
+          <p:cNvPr id="47" name="Rectangle 46">
+            <a:extLst>
+              <a:ext uri="{FF2B5EF4-FFF2-40B4-BE49-F238E27FC236}">
+                <a16:creationId xmlns:a16="http://schemas.microsoft.com/office/drawing/2014/main" id="{F217A241-0B79-2E48-AE04-ECC1850D5D0F}"/>
+              </a:ext>
+            </a:extLst>
+          </p:cNvPr>
+          <p:cNvSpPr/>
+          <p:nvPr/>
+        </p:nvSpPr>
+        <p:spPr>
+          <a:xfrm>
+            <a:off x="3798916" y="3512126"/>
+            <a:ext cx="2960716" cy="286789"/>
+          </a:xfrm>
+          <a:prstGeom prst="rect">
+            <a:avLst/>
+          </a:prstGeom>
+          <a:noFill/>
+          <a:ln>
+            <a:solidFill>
+              <a:schemeClr val="tx1"/>
+            </a:solidFill>
+          </a:ln>
+        </p:spPr>
+        <p:style>
+          <a:lnRef idx="2">
+            <a:schemeClr val="dk1">
+              <a:shade val="15000"/>
+            </a:schemeClr>
+          </a:lnRef>
+          <a:fillRef idx="1">
+            <a:schemeClr val="dk1"/>
+          </a:fillRef>
+          <a:effectRef idx="0">
+            <a:schemeClr val="dk1"/>
+          </a:effectRef>
+          <a:fontRef idx="minor">
+            <a:schemeClr val="lt1"/>
+          </a:fontRef>
+        </p:style>
+        <p:txBody>
+          <a:bodyPr rtlCol="0" anchor="ctr"/>
+          <a:lstStyle/>
+          <a:p>
+            <a:pPr algn="ctr"/>
+            <a:r>
+              <a:rPr lang="en-GB" dirty="0">
+                <a:solidFill>
+                  <a:schemeClr val="tx1"/>
+                </a:solidFill>
+              </a:rPr>
+              <a:t>4caf50</a:t>
+            </a:r>
+          </a:p>
+        </p:txBody>
+      </p:sp>
+      <p:sp>
+        <p:nvSpPr>
+          <p:cNvPr id="48" name="Rectangle 47">
+            <a:extLst>
+              <a:ext uri="{FF2B5EF4-FFF2-40B4-BE49-F238E27FC236}">
+                <a16:creationId xmlns:a16="http://schemas.microsoft.com/office/drawing/2014/main" id="{FE12A4B1-9AF0-E5C0-CA72-176B886E4CC2}"/>
+              </a:ext>
+            </a:extLst>
+          </p:cNvPr>
+          <p:cNvSpPr/>
+          <p:nvPr/>
+        </p:nvSpPr>
+        <p:spPr>
+          <a:xfrm>
+            <a:off x="6759632" y="3512126"/>
+            <a:ext cx="2288772" cy="286789"/>
+          </a:xfrm>
+          <a:prstGeom prst="rect">
+            <a:avLst/>
+          </a:prstGeom>
+          <a:solidFill>
+            <a:srgbClr val="4CAF50"/>
+          </a:solidFill>
+          <a:ln>
+            <a:solidFill>
+              <a:schemeClr val="tx1"/>
+            </a:solidFill>
+          </a:ln>
+        </p:spPr>
+        <p:style>
+          <a:lnRef idx="2">
+            <a:schemeClr val="dk1">
+              <a:shade val="15000"/>
+            </a:schemeClr>
+          </a:lnRef>
+          <a:fillRef idx="1">
+            <a:schemeClr val="dk1"/>
+          </a:fillRef>
+          <a:effectRef idx="0">
+            <a:schemeClr val="dk1"/>
+          </a:effectRef>
+          <a:fontRef idx="minor">
+            <a:schemeClr val="lt1"/>
+          </a:fontRef>
+        </p:style>
+        <p:txBody>
+          <a:bodyPr rtlCol="0" anchor="ctr"/>
+          <a:lstStyle/>
+          <a:p>
+            <a:pPr algn="ctr"/>
+            <a:endParaRPr lang="en-GB"/>
+          </a:p>
+        </p:txBody>
+      </p:sp>
+      <p:sp>
+        <p:nvSpPr>
+          <p:cNvPr id="49" name="Rectangle 48">
+            <a:extLst>
+              <a:ext uri="{FF2B5EF4-FFF2-40B4-BE49-F238E27FC236}">
+                <a16:creationId xmlns:a16="http://schemas.microsoft.com/office/drawing/2014/main" id="{9775519F-5FED-CC84-8BB8-548C33A3081F}"/>
+              </a:ext>
+            </a:extLst>
+          </p:cNvPr>
+          <p:cNvSpPr/>
+          <p:nvPr/>
+        </p:nvSpPr>
+        <p:spPr>
+          <a:xfrm>
+            <a:off x="838200" y="3798915"/>
+            <a:ext cx="2960716" cy="286789"/>
+          </a:xfrm>
+          <a:prstGeom prst="rect">
+            <a:avLst/>
+          </a:prstGeom>
+          <a:noFill/>
+          <a:ln>
+            <a:solidFill>
+              <a:schemeClr val="tx1"/>
+            </a:solidFill>
+          </a:ln>
+        </p:spPr>
+        <p:style>
+          <a:lnRef idx="2">
+            <a:schemeClr val="dk1">
+              <a:shade val="15000"/>
+            </a:schemeClr>
+          </a:lnRef>
+          <a:fillRef idx="1">
+            <a:schemeClr val="dk1"/>
+          </a:fillRef>
+          <a:effectRef idx="0">
+            <a:schemeClr val="dk1"/>
+          </a:effectRef>
+          <a:fontRef idx="minor">
+            <a:schemeClr val="lt1"/>
+          </a:fontRef>
+        </p:style>
+        <p:txBody>
+          <a:bodyPr rtlCol="0" anchor="ctr"/>
+          <a:lstStyle/>
+          <a:p>
+            <a:pPr algn="ctr"/>
+            <a:r>
+              <a:rPr lang="en-GB" dirty="0">
+                <a:solidFill>
+                  <a:schemeClr val="tx1"/>
+                </a:solidFill>
+              </a:rPr>
+              <a:t>selected</a:t>
+            </a:r>
+          </a:p>
+        </p:txBody>
+      </p:sp>
+      <p:sp>
+        <p:nvSpPr>
+          <p:cNvPr id="50" name="Rectangle 49">
+            <a:extLst>
+              <a:ext uri="{FF2B5EF4-FFF2-40B4-BE49-F238E27FC236}">
+                <a16:creationId xmlns:a16="http://schemas.microsoft.com/office/drawing/2014/main" id="{1E35915E-54CD-B425-F19A-490F730CC023}"/>
+              </a:ext>
+            </a:extLst>
+          </p:cNvPr>
+          <p:cNvSpPr/>
+          <p:nvPr/>
+        </p:nvSpPr>
+        <p:spPr>
+          <a:xfrm>
+            <a:off x="3798916" y="3798915"/>
+            <a:ext cx="2960716" cy="286789"/>
+          </a:xfrm>
+          <a:prstGeom prst="rect">
+            <a:avLst/>
+          </a:prstGeom>
+          <a:noFill/>
+          <a:ln>
+            <a:solidFill>
+              <a:schemeClr val="tx1"/>
+            </a:solidFill>
+          </a:ln>
+        </p:spPr>
+        <p:style>
+          <a:lnRef idx="2">
+            <a:schemeClr val="dk1">
+              <a:shade val="15000"/>
+            </a:schemeClr>
+          </a:lnRef>
+          <a:fillRef idx="1">
+            <a:schemeClr val="dk1"/>
+          </a:fillRef>
+          <a:effectRef idx="0">
+            <a:schemeClr val="dk1"/>
+          </a:effectRef>
+          <a:fontRef idx="minor">
+            <a:schemeClr val="lt1"/>
+          </a:fontRef>
+        </p:style>
+        <p:txBody>
+          <a:bodyPr rtlCol="0" anchor="ctr"/>
+          <a:lstStyle/>
+          <a:p>
+            <a:pPr algn="ctr"/>
+            <a:r>
+              <a:rPr lang="en-GB" dirty="0">
+                <a:solidFill>
+                  <a:schemeClr val="tx1"/>
+                </a:solidFill>
+              </a:rPr>
+              <a:t>e6d8b8</a:t>
+            </a:r>
+          </a:p>
+        </p:txBody>
+      </p:sp>
+      <p:sp>
+        <p:nvSpPr>
+          <p:cNvPr id="51" name="Rectangle 50">
+            <a:extLst>
+              <a:ext uri="{FF2B5EF4-FFF2-40B4-BE49-F238E27FC236}">
+                <a16:creationId xmlns:a16="http://schemas.microsoft.com/office/drawing/2014/main" id="{4ECFAAD7-FBF3-8C3B-3896-59C78FA31367}"/>
+              </a:ext>
+            </a:extLst>
+          </p:cNvPr>
+          <p:cNvSpPr/>
+          <p:nvPr/>
+        </p:nvSpPr>
+        <p:spPr>
+          <a:xfrm>
+            <a:off x="6759632" y="3798915"/>
+            <a:ext cx="2288772" cy="286789"/>
+          </a:xfrm>
+          <a:prstGeom prst="rect">
+            <a:avLst/>
+          </a:prstGeom>
+          <a:solidFill>
+            <a:srgbClr val="E6D8B8"/>
+          </a:solidFill>
+          <a:ln>
+            <a:solidFill>
+              <a:schemeClr val="tx1"/>
+            </a:solidFill>
+          </a:ln>
+        </p:spPr>
+        <p:style>
+          <a:lnRef idx="2">
+            <a:schemeClr val="dk1">
+              <a:shade val="15000"/>
+            </a:schemeClr>
+          </a:lnRef>
+          <a:fillRef idx="1">
+            <a:schemeClr val="dk1"/>
+          </a:fillRef>
+          <a:effectRef idx="0">
+            <a:schemeClr val="dk1"/>
+          </a:effectRef>
+          <a:fontRef idx="minor">
+            <a:schemeClr val="lt1"/>
+          </a:fontRef>
+        </p:style>
+        <p:txBody>
+          <a:bodyPr rtlCol="0" anchor="ctr"/>
+          <a:lstStyle/>
+          <a:p>
+            <a:pPr algn="ctr"/>
+            <a:endParaRPr lang="en-GB"/>
+          </a:p>
+        </p:txBody>
+      </p:sp>
+      <p:sp>
+        <p:nvSpPr>
+          <p:cNvPr id="52" name="Rectangle 51">
+            <a:extLst>
+              <a:ext uri="{FF2B5EF4-FFF2-40B4-BE49-F238E27FC236}">
+                <a16:creationId xmlns:a16="http://schemas.microsoft.com/office/drawing/2014/main" id="{9E4E683E-BD92-D536-B71D-A72320F73FD7}"/>
+              </a:ext>
+            </a:extLst>
+          </p:cNvPr>
+          <p:cNvSpPr/>
+          <p:nvPr/>
+        </p:nvSpPr>
+        <p:spPr>
+          <a:xfrm>
+            <a:off x="838200" y="4085704"/>
+            <a:ext cx="2960716" cy="286789"/>
+          </a:xfrm>
+          <a:prstGeom prst="rect">
+            <a:avLst/>
+          </a:prstGeom>
+          <a:noFill/>
+          <a:ln>
+            <a:solidFill>
+              <a:schemeClr val="tx1"/>
+            </a:solidFill>
+          </a:ln>
+        </p:spPr>
+        <p:style>
+          <a:lnRef idx="2">
+            <a:schemeClr val="dk1">
+              <a:shade val="15000"/>
+            </a:schemeClr>
+          </a:lnRef>
+          <a:fillRef idx="1">
+            <a:schemeClr val="dk1"/>
+          </a:fillRef>
+          <a:effectRef idx="0">
+            <a:schemeClr val="dk1"/>
+          </a:effectRef>
+          <a:fontRef idx="minor">
+            <a:schemeClr val="lt1"/>
+          </a:fontRef>
+        </p:style>
+        <p:txBody>
+          <a:bodyPr rtlCol="0" anchor="ctr"/>
+          <a:lstStyle/>
+          <a:p>
+            <a:pPr algn="ctr"/>
+            <a:r>
+              <a:rPr lang="en-GB" dirty="0">
+                <a:solidFill>
+                  <a:schemeClr val="tx1"/>
+                </a:solidFill>
+              </a:rPr>
+              <a:t>tooltip</a:t>
+            </a:r>
+          </a:p>
+        </p:txBody>
+      </p:sp>
+      <p:sp>
+        <p:nvSpPr>
+          <p:cNvPr id="53" name="Rectangle 52">
+            <a:extLst>
+              <a:ext uri="{FF2B5EF4-FFF2-40B4-BE49-F238E27FC236}">
+                <a16:creationId xmlns:a16="http://schemas.microsoft.com/office/drawing/2014/main" id="{6943F9F8-BE74-3509-1FA9-028230E53CCB}"/>
+              </a:ext>
+            </a:extLst>
+          </p:cNvPr>
+          <p:cNvSpPr/>
+          <p:nvPr/>
+        </p:nvSpPr>
+        <p:spPr>
+          <a:xfrm>
+            <a:off x="3798916" y="4085704"/>
+            <a:ext cx="2960716" cy="286789"/>
+          </a:xfrm>
+          <a:prstGeom prst="rect">
+            <a:avLst/>
+          </a:prstGeom>
+          <a:noFill/>
+          <a:ln>
+            <a:solidFill>
+              <a:schemeClr val="tx1"/>
+            </a:solidFill>
+          </a:ln>
+        </p:spPr>
+        <p:style>
+          <a:lnRef idx="2">
+            <a:schemeClr val="dk1">
+              <a:shade val="15000"/>
+            </a:schemeClr>
+          </a:lnRef>
+          <a:fillRef idx="1">
+            <a:schemeClr val="dk1"/>
+          </a:fillRef>
+          <a:effectRef idx="0">
+            <a:schemeClr val="dk1"/>
+          </a:effectRef>
+          <a:fontRef idx="minor">
+            <a:schemeClr val="lt1"/>
+          </a:fontRef>
+        </p:style>
+        <p:txBody>
+          <a:bodyPr rtlCol="0" anchor="ctr"/>
+          <a:lstStyle/>
+          <a:p>
+            <a:pPr algn="ctr"/>
+            <a:r>
+              <a:rPr lang="en-GB" dirty="0" err="1">
+                <a:solidFill>
+                  <a:schemeClr val="tx1"/>
+                </a:solidFill>
+              </a:rPr>
+              <a:t>ffffff</a:t>
+            </a:r>
+            <a:r>
+              <a:rPr lang="en-GB" dirty="0">
+                <a:solidFill>
+                  <a:schemeClr val="tx1"/>
+                </a:solidFill>
+              </a:rPr>
+              <a:t> (with 85% opacity)</a:t>
+            </a:r>
+          </a:p>
+        </p:txBody>
+      </p:sp>
+      <p:sp>
+        <p:nvSpPr>
+          <p:cNvPr id="54" name="Rectangle 53">
+            <a:extLst>
+              <a:ext uri="{FF2B5EF4-FFF2-40B4-BE49-F238E27FC236}">
+                <a16:creationId xmlns:a16="http://schemas.microsoft.com/office/drawing/2014/main" id="{99F545A0-FD99-5D86-7E39-1A1F9E9E094F}"/>
+              </a:ext>
+            </a:extLst>
+          </p:cNvPr>
+          <p:cNvSpPr/>
+          <p:nvPr/>
+        </p:nvSpPr>
+        <p:spPr>
+          <a:xfrm>
+            <a:off x="6759632" y="4085704"/>
+            <a:ext cx="2288772" cy="286789"/>
+          </a:xfrm>
+          <a:prstGeom prst="rect">
+            <a:avLst/>
+          </a:prstGeom>
+          <a:solidFill>
+            <a:srgbClr val="FFFFFF">
+              <a:alpha val="14902"/>
+            </a:srgbClr>
+          </a:solidFill>
+          <a:ln>
+            <a:solidFill>
+              <a:schemeClr val="tx1"/>
+            </a:solidFill>
+          </a:ln>
+        </p:spPr>
+        <p:style>
+          <a:lnRef idx="2">
+            <a:schemeClr val="dk1">
+              <a:shade val="15000"/>
+            </a:schemeClr>
+          </a:lnRef>
+          <a:fillRef idx="1">
+            <a:schemeClr val="dk1"/>
+          </a:fillRef>
+          <a:effectRef idx="0">
+            <a:schemeClr val="dk1"/>
+          </a:effectRef>
+          <a:fontRef idx="minor">
+            <a:schemeClr val="lt1"/>
+          </a:fontRef>
+        </p:style>
+        <p:txBody>
+          <a:bodyPr rtlCol="0" anchor="ctr"/>
+          <a:lstStyle/>
+          <a:p>
+            <a:pPr algn="ctr"/>
+            <a:endParaRPr lang="en-GB"/>
+          </a:p>
+        </p:txBody>
+      </p:sp>
+      <p:sp>
+        <p:nvSpPr>
+          <p:cNvPr id="55" name="Rectangle 54">
+            <a:extLst>
+              <a:ext uri="{FF2B5EF4-FFF2-40B4-BE49-F238E27FC236}">
+                <a16:creationId xmlns:a16="http://schemas.microsoft.com/office/drawing/2014/main" id="{0D8A09FB-32BA-6B3B-EA12-35BCF37F1EF3}"/>
+              </a:ext>
+            </a:extLst>
+          </p:cNvPr>
+          <p:cNvSpPr/>
+          <p:nvPr/>
+        </p:nvSpPr>
+        <p:spPr>
+          <a:xfrm>
+            <a:off x="838200" y="4372493"/>
+            <a:ext cx="2960716" cy="286789"/>
+          </a:xfrm>
+          <a:prstGeom prst="rect">
+            <a:avLst/>
+          </a:prstGeom>
+          <a:noFill/>
+          <a:ln>
+            <a:solidFill>
+              <a:schemeClr val="tx1"/>
+            </a:solidFill>
+          </a:ln>
+        </p:spPr>
+        <p:style>
+          <a:lnRef idx="2">
+            <a:schemeClr val="dk1">
+              <a:shade val="15000"/>
+            </a:schemeClr>
+          </a:lnRef>
+          <a:fillRef idx="1">
+            <a:schemeClr val="dk1"/>
+          </a:fillRef>
+          <a:effectRef idx="0">
+            <a:schemeClr val="dk1"/>
+          </a:effectRef>
+          <a:fontRef idx="minor">
+            <a:schemeClr val="lt1"/>
+          </a:fontRef>
+        </p:style>
+        <p:txBody>
+          <a:bodyPr rtlCol="0" anchor="ctr"/>
+          <a:lstStyle/>
+          <a:p>
+            <a:pPr algn="ctr"/>
+            <a:r>
+              <a:rPr lang="en-GB" dirty="0">
+                <a:solidFill>
+                  <a:schemeClr val="tx1"/>
+                </a:solidFill>
+              </a:rPr>
+              <a:t>shadow</a:t>
+            </a:r>
+          </a:p>
+        </p:txBody>
+      </p:sp>
+      <p:sp>
+        <p:nvSpPr>
+          <p:cNvPr id="56" name="Rectangle 55">
+            <a:extLst>
+              <a:ext uri="{FF2B5EF4-FFF2-40B4-BE49-F238E27FC236}">
+                <a16:creationId xmlns:a16="http://schemas.microsoft.com/office/drawing/2014/main" id="{3FDBA4FE-2CB3-FB6A-A385-2E108784E7DB}"/>
+              </a:ext>
+            </a:extLst>
+          </p:cNvPr>
+          <p:cNvSpPr/>
+          <p:nvPr/>
+        </p:nvSpPr>
+        <p:spPr>
+          <a:xfrm>
+            <a:off x="3798916" y="4372493"/>
+            <a:ext cx="2960716" cy="286789"/>
+          </a:xfrm>
+          <a:prstGeom prst="rect">
+            <a:avLst/>
+          </a:prstGeom>
+          <a:noFill/>
+          <a:ln>
+            <a:solidFill>
+              <a:schemeClr val="tx1"/>
+            </a:solidFill>
+          </a:ln>
+        </p:spPr>
+        <p:style>
+          <a:lnRef idx="2">
+            <a:schemeClr val="dk1">
+              <a:shade val="15000"/>
+            </a:schemeClr>
+          </a:lnRef>
+          <a:fillRef idx="1">
+            <a:schemeClr val="dk1"/>
+          </a:fillRef>
+          <a:effectRef idx="0">
+            <a:schemeClr val="dk1"/>
+          </a:effectRef>
+          <a:fontRef idx="minor">
+            <a:schemeClr val="lt1"/>
+          </a:fontRef>
+        </p:style>
+        <p:txBody>
+          <a:bodyPr rtlCol="0" anchor="ctr"/>
+          <a:lstStyle/>
+          <a:p>
+            <a:pPr algn="ctr"/>
+            <a:r>
+              <a:rPr lang="en-GB" dirty="0">
+                <a:solidFill>
+                  <a:schemeClr val="tx1"/>
+                </a:solidFill>
+              </a:rPr>
+              <a:t>1e1e1e (with 85% opacity)</a:t>
+            </a:r>
+          </a:p>
+        </p:txBody>
+      </p:sp>
+      <p:sp>
+        <p:nvSpPr>
+          <p:cNvPr id="57" name="Rectangle 56">
+            <a:extLst>
+              <a:ext uri="{FF2B5EF4-FFF2-40B4-BE49-F238E27FC236}">
+                <a16:creationId xmlns:a16="http://schemas.microsoft.com/office/drawing/2014/main" id="{48632DA4-7CCF-76F6-FF44-37606EA41A24}"/>
+              </a:ext>
+            </a:extLst>
+          </p:cNvPr>
+          <p:cNvSpPr/>
+          <p:nvPr/>
+        </p:nvSpPr>
+        <p:spPr>
+          <a:xfrm>
+            <a:off x="6759632" y="4372493"/>
+            <a:ext cx="2288772" cy="286789"/>
+          </a:xfrm>
+          <a:prstGeom prst="rect">
+            <a:avLst/>
+          </a:prstGeom>
+          <a:solidFill>
+            <a:srgbClr val="1E1E1E">
+              <a:alpha val="14902"/>
+            </a:srgbClr>
+          </a:solidFill>
+          <a:ln>
+            <a:solidFill>
+              <a:schemeClr val="tx1"/>
+            </a:solidFill>
+          </a:ln>
+        </p:spPr>
+        <p:style>
+          <a:lnRef idx="2">
+            <a:schemeClr val="dk1">
+              <a:shade val="15000"/>
+            </a:schemeClr>
+          </a:lnRef>
+          <a:fillRef idx="1">
+            <a:schemeClr val="dk1"/>
+          </a:fillRef>
+          <a:effectRef idx="0">
+            <a:schemeClr val="dk1"/>
+          </a:effectRef>
+          <a:fontRef idx="minor">
+            <a:schemeClr val="lt1"/>
+          </a:fontRef>
+        </p:style>
+        <p:txBody>
+          <a:bodyPr rtlCol="0" anchor="ctr"/>
+          <a:lstStyle/>
+          <a:p>
+            <a:pPr algn="ctr"/>
+            <a:endParaRPr lang="en-GB"/>
+          </a:p>
+        </p:txBody>
+      </p:sp>
+      <p:sp>
+        <p:nvSpPr>
+          <p:cNvPr id="58" name="Rectangle 57">
+            <a:extLst>
+              <a:ext uri="{FF2B5EF4-FFF2-40B4-BE49-F238E27FC236}">
+                <a16:creationId xmlns:a16="http://schemas.microsoft.com/office/drawing/2014/main" id="{3B07820B-2FB4-A89B-134A-4C7D748385CE}"/>
+              </a:ext>
+            </a:extLst>
+          </p:cNvPr>
+          <p:cNvSpPr/>
+          <p:nvPr/>
+        </p:nvSpPr>
+        <p:spPr>
+          <a:xfrm>
+            <a:off x="838200" y="4659282"/>
+            <a:ext cx="2960716" cy="286789"/>
+          </a:xfrm>
+          <a:prstGeom prst="rect">
+            <a:avLst/>
+          </a:prstGeom>
+          <a:noFill/>
+          <a:ln>
+            <a:solidFill>
+              <a:schemeClr val="tx1"/>
+            </a:solidFill>
+          </a:ln>
+        </p:spPr>
+        <p:style>
+          <a:lnRef idx="2">
+            <a:schemeClr val="dk1">
+              <a:shade val="15000"/>
+            </a:schemeClr>
+          </a:lnRef>
+          <a:fillRef idx="1">
+            <a:schemeClr val="dk1"/>
+          </a:fillRef>
+          <a:effectRef idx="0">
+            <a:schemeClr val="dk1"/>
+          </a:effectRef>
+          <a:fontRef idx="minor">
+            <a:schemeClr val="lt1"/>
+          </a:fontRef>
+        </p:style>
+        <p:txBody>
+          <a:bodyPr rtlCol="0" anchor="ctr"/>
+          <a:lstStyle/>
+          <a:p>
+            <a:pPr algn="ctr"/>
+            <a:r>
+              <a:rPr lang="en-GB" dirty="0">
+                <a:solidFill>
+                  <a:schemeClr val="tx1"/>
+                </a:solidFill>
+              </a:rPr>
+              <a:t>glow/focus</a:t>
+            </a:r>
+          </a:p>
+        </p:txBody>
+      </p:sp>
+      <p:sp>
+        <p:nvSpPr>
+          <p:cNvPr id="59" name="Rectangle 58">
+            <a:extLst>
+              <a:ext uri="{FF2B5EF4-FFF2-40B4-BE49-F238E27FC236}">
+                <a16:creationId xmlns:a16="http://schemas.microsoft.com/office/drawing/2014/main" id="{F2D7BE2C-251F-27D3-09B9-ACBBA642F4D1}"/>
+              </a:ext>
+            </a:extLst>
+          </p:cNvPr>
+          <p:cNvSpPr/>
+          <p:nvPr/>
+        </p:nvSpPr>
+        <p:spPr>
+          <a:xfrm>
+            <a:off x="3798916" y="4659282"/>
+            <a:ext cx="2960716" cy="286789"/>
+          </a:xfrm>
+          <a:prstGeom prst="rect">
+            <a:avLst/>
+          </a:prstGeom>
+          <a:noFill/>
+          <a:ln>
+            <a:solidFill>
+              <a:schemeClr val="tx1"/>
+            </a:solidFill>
+          </a:ln>
+        </p:spPr>
+        <p:style>
+          <a:lnRef idx="2">
+            <a:schemeClr val="dk1">
+              <a:shade val="15000"/>
+            </a:schemeClr>
+          </a:lnRef>
+          <a:fillRef idx="1">
+            <a:schemeClr val="dk1"/>
+          </a:fillRef>
+          <a:effectRef idx="0">
+            <a:schemeClr val="dk1"/>
+          </a:effectRef>
+          <a:fontRef idx="minor">
+            <a:schemeClr val="lt1"/>
+          </a:fontRef>
+        </p:style>
+        <p:txBody>
+          <a:bodyPr rtlCol="0" anchor="ctr"/>
+          <a:lstStyle/>
+          <a:p>
+            <a:pPr algn="ctr"/>
+            <a:r>
+              <a:rPr lang="en-GB" dirty="0">
+                <a:solidFill>
+                  <a:schemeClr val="tx1"/>
+                </a:solidFill>
+              </a:rPr>
+              <a:t>f1693c (60% opacity)</a:t>
+            </a:r>
+          </a:p>
+        </p:txBody>
+      </p:sp>
+      <p:sp>
+        <p:nvSpPr>
+          <p:cNvPr id="60" name="Rectangle 59">
+            <a:extLst>
+              <a:ext uri="{FF2B5EF4-FFF2-40B4-BE49-F238E27FC236}">
+                <a16:creationId xmlns:a16="http://schemas.microsoft.com/office/drawing/2014/main" id="{CD124E51-7AA0-1699-0772-976881D496E2}"/>
+              </a:ext>
+            </a:extLst>
+          </p:cNvPr>
+          <p:cNvSpPr/>
+          <p:nvPr/>
+        </p:nvSpPr>
+        <p:spPr>
+          <a:xfrm>
+            <a:off x="6759632" y="4659282"/>
+            <a:ext cx="2288772" cy="286789"/>
+          </a:xfrm>
+          <a:prstGeom prst="rect">
+            <a:avLst/>
+          </a:prstGeom>
+          <a:solidFill>
+            <a:srgbClr val="F1693C">
+              <a:alpha val="40000"/>
+            </a:srgbClr>
+          </a:solidFill>
+          <a:ln>
+            <a:solidFill>
+              <a:schemeClr val="tx1"/>
+            </a:solidFill>
+          </a:ln>
+        </p:spPr>
+        <p:style>
+          <a:lnRef idx="2">
+            <a:schemeClr val="dk1">
+              <a:shade val="15000"/>
+            </a:schemeClr>
+          </a:lnRef>
+          <a:fillRef idx="1">
+            <a:schemeClr val="dk1"/>
+          </a:fillRef>
+          <a:effectRef idx="0">
+            <a:schemeClr val="dk1"/>
+          </a:effectRef>
+          <a:fontRef idx="minor">
+            <a:schemeClr val="lt1"/>
+          </a:fontRef>
+        </p:style>
+        <p:txBody>
+          <a:bodyPr rtlCol="0" anchor="ctr"/>
+          <a:lstStyle/>
+          <a:p>
+            <a:pPr algn="ctr"/>
+            <a:endParaRPr lang="en-GB"/>
+          </a:p>
+        </p:txBody>
+      </p:sp>
+      <p:pic>
+        <p:nvPicPr>
+          <p:cNvPr id="62" name="Picture 61" descr="A screenshot of a computer&#10;&#10;AI-generated content may be incorrect.">
+            <a:extLst>
+              <a:ext uri="{FF2B5EF4-FFF2-40B4-BE49-F238E27FC236}">
+                <a16:creationId xmlns:a16="http://schemas.microsoft.com/office/drawing/2014/main" id="{43CEE42B-05F9-072E-F0AB-75867FD2177D}"/>
+              </a:ext>
+            </a:extLst>
+          </p:cNvPr>
+          <p:cNvPicPr>
+            <a:picLocks noChangeAspect="1"/>
+          </p:cNvPicPr>
+          <p:nvPr/>
+        </p:nvPicPr>
+        <p:blipFill>
+          <a:blip r:embed="rId2">
+            <a:extLst>
+              <a:ext uri="{28A0092B-C50C-407E-A947-70E740481C1C}">
+                <a14:useLocalDpi xmlns:a14="http://schemas.microsoft.com/office/drawing/2010/main" val="0"/>
+              </a:ext>
+            </a:extLst>
+          </a:blip>
+          <a:stretch>
+            <a:fillRect/>
+          </a:stretch>
+        </p:blipFill>
+        <p:spPr>
+          <a:xfrm>
+            <a:off x="9281160" y="1504603"/>
+            <a:ext cx="2640676" cy="3961014"/>
+          </a:xfrm>
+          <a:prstGeom prst="rect">
+            <a:avLst/>
+          </a:prstGeom>
+        </p:spPr>
+      </p:pic>
     </p:spTree>
     <p:extLst>
       <p:ext uri="{BB962C8B-B14F-4D97-AF65-F5344CB8AC3E}">
-        <p14:creationId xmlns:p14="http://schemas.microsoft.com/office/powerpoint/2010/main" val="3342968671"/>
+        <p14:creationId xmlns:p14="http://schemas.microsoft.com/office/powerpoint/2010/main" val="1713108305"/>
       </p:ext>
     </p:extLst>
   </p:cSld>
@@ -3413,6 +5515,965 @@
 </file>
 
 <file path=ppt/slides/slide10.xml><?xml version="1.0" encoding="utf-8"?>
+<p:sld xmlns:a="http://schemas.openxmlformats.org/drawingml/2006/main" xmlns:r="http://schemas.openxmlformats.org/officeDocument/2006/relationships" xmlns:p="http://schemas.openxmlformats.org/presentationml/2006/main">
+  <p:cSld>
+    <p:spTree>
+      <p:nvGrpSpPr>
+        <p:cNvPr id="1" name=""/>
+        <p:cNvGrpSpPr/>
+        <p:nvPr/>
+      </p:nvGrpSpPr>
+      <p:grpSpPr>
+        <a:xfrm>
+          <a:off x="0" y="0"/>
+          <a:ext cx="0" cy="0"/>
+          <a:chOff x="0" y="0"/>
+          <a:chExt cx="0" cy="0"/>
+        </a:xfrm>
+      </p:grpSpPr>
+      <p:sp>
+        <p:nvSpPr>
+          <p:cNvPr id="12" name="Rectangle 11">
+            <a:extLst>
+              <a:ext uri="{FF2B5EF4-FFF2-40B4-BE49-F238E27FC236}">
+                <a16:creationId xmlns:a16="http://schemas.microsoft.com/office/drawing/2014/main" id="{B7B07077-A5CD-B898-08FF-F759CC3CAEFB}"/>
+              </a:ext>
+            </a:extLst>
+          </p:cNvPr>
+          <p:cNvSpPr/>
+          <p:nvPr/>
+        </p:nvSpPr>
+        <p:spPr>
+          <a:xfrm>
+            <a:off x="0" y="0"/>
+            <a:ext cx="12192000" cy="6858000"/>
+          </a:xfrm>
+          <a:prstGeom prst="rect">
+            <a:avLst/>
+          </a:prstGeom>
+          <a:solidFill>
+            <a:schemeClr val="bg1"/>
+          </a:solidFill>
+          <a:ln w="76200">
+            <a:solidFill>
+              <a:srgbClr val="4B0082"/>
+            </a:solidFill>
+          </a:ln>
+        </p:spPr>
+        <p:style>
+          <a:lnRef idx="2">
+            <a:schemeClr val="accent1">
+              <a:shade val="15000"/>
+            </a:schemeClr>
+          </a:lnRef>
+          <a:fillRef idx="1">
+            <a:schemeClr val="accent1"/>
+          </a:fillRef>
+          <a:effectRef idx="0">
+            <a:schemeClr val="accent1"/>
+          </a:effectRef>
+          <a:fontRef idx="minor">
+            <a:schemeClr val="lt1"/>
+          </a:fontRef>
+        </p:style>
+        <p:txBody>
+          <a:bodyPr rtlCol="0" anchor="ctr"/>
+          <a:lstStyle/>
+          <a:p>
+            <a:pPr algn="ctr"/>
+            <a:endParaRPr lang="en-GB"/>
+          </a:p>
+        </p:txBody>
+      </p:sp>
+      <p:sp>
+        <p:nvSpPr>
+          <p:cNvPr id="2" name="Rectangle: Rounded Corners 1">
+            <a:extLst>
+              <a:ext uri="{FF2B5EF4-FFF2-40B4-BE49-F238E27FC236}">
+                <a16:creationId xmlns:a16="http://schemas.microsoft.com/office/drawing/2014/main" id="{96B7F6F7-6C36-A423-552C-F05E8CD441AE}"/>
+              </a:ext>
+            </a:extLst>
+          </p:cNvPr>
+          <p:cNvSpPr/>
+          <p:nvPr/>
+        </p:nvSpPr>
+        <p:spPr>
+          <a:xfrm>
+            <a:off x="10280985" y="5696952"/>
+            <a:ext cx="1672389" cy="914400"/>
+          </a:xfrm>
+          <a:prstGeom prst="roundRect">
+            <a:avLst/>
+          </a:prstGeom>
+          <a:solidFill>
+            <a:srgbClr val="4B0082"/>
+          </a:solidFill>
+          <a:ln w="76200">
+            <a:solidFill>
+              <a:srgbClr val="4B0082"/>
+            </a:solidFill>
+          </a:ln>
+        </p:spPr>
+        <p:style>
+          <a:lnRef idx="2">
+            <a:schemeClr val="accent1">
+              <a:shade val="15000"/>
+            </a:schemeClr>
+          </a:lnRef>
+          <a:fillRef idx="1">
+            <a:schemeClr val="accent1"/>
+          </a:fillRef>
+          <a:effectRef idx="0">
+            <a:schemeClr val="accent1"/>
+          </a:effectRef>
+          <a:fontRef idx="minor">
+            <a:schemeClr val="lt1"/>
+          </a:fontRef>
+        </p:style>
+        <p:txBody>
+          <a:bodyPr rtlCol="0" anchor="ctr"/>
+          <a:lstStyle/>
+          <a:p>
+            <a:pPr algn="ctr"/>
+            <a:r>
+              <a:rPr lang="en-GB" sz="3600" dirty="0">
+                <a:solidFill>
+                  <a:schemeClr val="bg1"/>
+                </a:solidFill>
+              </a:rPr>
+              <a:t>SCAN</a:t>
+            </a:r>
+          </a:p>
+        </p:txBody>
+      </p:sp>
+      <p:sp>
+        <p:nvSpPr>
+          <p:cNvPr id="3" name="Rectangle: Rounded Corners 2">
+            <a:extLst>
+              <a:ext uri="{FF2B5EF4-FFF2-40B4-BE49-F238E27FC236}">
+                <a16:creationId xmlns:a16="http://schemas.microsoft.com/office/drawing/2014/main" id="{CBFA1F0B-AA43-15BF-A01F-2C9B9101A932}"/>
+              </a:ext>
+            </a:extLst>
+          </p:cNvPr>
+          <p:cNvSpPr/>
+          <p:nvPr/>
+        </p:nvSpPr>
+        <p:spPr>
+          <a:xfrm>
+            <a:off x="3483142" y="2195763"/>
+            <a:ext cx="6466973" cy="914400"/>
+          </a:xfrm>
+          <a:prstGeom prst="roundRect">
+            <a:avLst>
+              <a:gd name="adj" fmla="val 0"/>
+            </a:avLst>
+          </a:prstGeom>
+          <a:solidFill>
+            <a:schemeClr val="bg1"/>
+          </a:solidFill>
+          <a:ln w="38100">
+            <a:solidFill>
+              <a:srgbClr val="4B0082"/>
+            </a:solidFill>
+          </a:ln>
+        </p:spPr>
+        <p:style>
+          <a:lnRef idx="2">
+            <a:schemeClr val="accent1">
+              <a:shade val="15000"/>
+            </a:schemeClr>
+          </a:lnRef>
+          <a:fillRef idx="1">
+            <a:schemeClr val="accent1"/>
+          </a:fillRef>
+          <a:effectRef idx="0">
+            <a:schemeClr val="accent1"/>
+          </a:effectRef>
+          <a:fontRef idx="minor">
+            <a:schemeClr val="lt1"/>
+          </a:fontRef>
+        </p:style>
+        <p:txBody>
+          <a:bodyPr rtlCol="0" anchor="ctr"/>
+          <a:lstStyle/>
+          <a:p>
+            <a:r>
+              <a:rPr lang="en-GB" sz="3600" dirty="0">
+                <a:solidFill>
+                  <a:srgbClr val="008000"/>
+                </a:solidFill>
+              </a:rPr>
+              <a:t>H4095696</a:t>
+            </a:r>
+          </a:p>
+        </p:txBody>
+      </p:sp>
+      <p:sp>
+        <p:nvSpPr>
+          <p:cNvPr id="4" name="Rectangle: Rounded Corners 3">
+            <a:extLst>
+              <a:ext uri="{FF2B5EF4-FFF2-40B4-BE49-F238E27FC236}">
+                <a16:creationId xmlns:a16="http://schemas.microsoft.com/office/drawing/2014/main" id="{6B044FC1-E8B6-0734-0A04-20F100703A9C}"/>
+              </a:ext>
+            </a:extLst>
+          </p:cNvPr>
+          <p:cNvSpPr/>
+          <p:nvPr/>
+        </p:nvSpPr>
+        <p:spPr>
+          <a:xfrm>
+            <a:off x="872290" y="2195763"/>
+            <a:ext cx="2514600" cy="914400"/>
+          </a:xfrm>
+          <a:prstGeom prst="roundRect">
+            <a:avLst>
+              <a:gd name="adj" fmla="val 0"/>
+            </a:avLst>
+          </a:prstGeom>
+          <a:solidFill>
+            <a:schemeClr val="bg1"/>
+          </a:solidFill>
+          <a:ln>
+            <a:solidFill>
+              <a:schemeClr val="bg1"/>
+            </a:solidFill>
+          </a:ln>
+        </p:spPr>
+        <p:style>
+          <a:lnRef idx="2">
+            <a:schemeClr val="accent1">
+              <a:shade val="15000"/>
+            </a:schemeClr>
+          </a:lnRef>
+          <a:fillRef idx="1">
+            <a:schemeClr val="accent1"/>
+          </a:fillRef>
+          <a:effectRef idx="0">
+            <a:schemeClr val="accent1"/>
+          </a:effectRef>
+          <a:fontRef idx="minor">
+            <a:schemeClr val="lt1"/>
+          </a:fontRef>
+        </p:style>
+        <p:txBody>
+          <a:bodyPr rtlCol="0" anchor="ctr"/>
+          <a:lstStyle/>
+          <a:p>
+            <a:pPr algn="r"/>
+            <a:r>
+              <a:rPr lang="en-GB" sz="3600" dirty="0">
+                <a:solidFill>
+                  <a:srgbClr val="008000"/>
+                </a:solidFill>
+              </a:rPr>
+              <a:t>Prisoner ID:</a:t>
+            </a:r>
+          </a:p>
+        </p:txBody>
+      </p:sp>
+      <p:sp>
+        <p:nvSpPr>
+          <p:cNvPr id="5" name="Rectangle: Rounded Corners 4">
+            <a:extLst>
+              <a:ext uri="{FF2B5EF4-FFF2-40B4-BE49-F238E27FC236}">
+                <a16:creationId xmlns:a16="http://schemas.microsoft.com/office/drawing/2014/main" id="{BCE0A71C-F94E-C9D6-A7F8-194538B6B357}"/>
+              </a:ext>
+            </a:extLst>
+          </p:cNvPr>
+          <p:cNvSpPr/>
+          <p:nvPr/>
+        </p:nvSpPr>
+        <p:spPr>
+          <a:xfrm>
+            <a:off x="10280984" y="4646250"/>
+            <a:ext cx="1672389" cy="914400"/>
+          </a:xfrm>
+          <a:prstGeom prst="roundRect">
+            <a:avLst/>
+          </a:prstGeom>
+          <a:solidFill>
+            <a:schemeClr val="bg1"/>
+          </a:solidFill>
+          <a:ln w="76200">
+            <a:solidFill>
+              <a:srgbClr val="4B0082"/>
+            </a:solidFill>
+          </a:ln>
+        </p:spPr>
+        <p:style>
+          <a:lnRef idx="2">
+            <a:schemeClr val="accent1">
+              <a:shade val="15000"/>
+            </a:schemeClr>
+          </a:lnRef>
+          <a:fillRef idx="1">
+            <a:schemeClr val="accent1"/>
+          </a:fillRef>
+          <a:effectRef idx="0">
+            <a:schemeClr val="accent1"/>
+          </a:effectRef>
+          <a:fontRef idx="minor">
+            <a:schemeClr val="lt1"/>
+          </a:fontRef>
+        </p:style>
+        <p:txBody>
+          <a:bodyPr rtlCol="0" anchor="ctr"/>
+          <a:lstStyle/>
+          <a:p>
+            <a:pPr algn="ctr"/>
+            <a:r>
+              <a:rPr lang="en-GB" sz="3600" dirty="0">
+                <a:solidFill>
+                  <a:srgbClr val="4B0082"/>
+                </a:solidFill>
+              </a:rPr>
+              <a:t>Cancel</a:t>
+            </a:r>
+          </a:p>
+        </p:txBody>
+      </p:sp>
+      <p:sp>
+        <p:nvSpPr>
+          <p:cNvPr id="6" name="Rectangle: Rounded Corners 5">
+            <a:extLst>
+              <a:ext uri="{FF2B5EF4-FFF2-40B4-BE49-F238E27FC236}">
+                <a16:creationId xmlns:a16="http://schemas.microsoft.com/office/drawing/2014/main" id="{7DC07184-0DAD-6EA4-9BA3-BBDCEC534658}"/>
+              </a:ext>
+            </a:extLst>
+          </p:cNvPr>
+          <p:cNvSpPr/>
+          <p:nvPr/>
+        </p:nvSpPr>
+        <p:spPr>
+          <a:xfrm>
+            <a:off x="3483142" y="3230478"/>
+            <a:ext cx="6466973" cy="3380874"/>
+          </a:xfrm>
+          <a:prstGeom prst="roundRect">
+            <a:avLst>
+              <a:gd name="adj" fmla="val 0"/>
+            </a:avLst>
+          </a:prstGeom>
+          <a:solidFill>
+            <a:schemeClr val="bg1"/>
+          </a:solidFill>
+          <a:ln w="38100">
+            <a:solidFill>
+              <a:srgbClr val="4B0082"/>
+            </a:solidFill>
+          </a:ln>
+        </p:spPr>
+        <p:style>
+          <a:lnRef idx="2">
+            <a:schemeClr val="accent1">
+              <a:shade val="15000"/>
+            </a:schemeClr>
+          </a:lnRef>
+          <a:fillRef idx="1">
+            <a:schemeClr val="accent1"/>
+          </a:fillRef>
+          <a:effectRef idx="0">
+            <a:schemeClr val="accent1"/>
+          </a:effectRef>
+          <a:fontRef idx="minor">
+            <a:schemeClr val="lt1"/>
+          </a:fontRef>
+        </p:style>
+        <p:txBody>
+          <a:bodyPr rtlCol="0" anchor="t"/>
+          <a:lstStyle/>
+          <a:p>
+            <a:endParaRPr lang="en-GB" sz="3600" dirty="0">
+              <a:solidFill>
+                <a:sysClr val="windowText" lastClr="000000"/>
+              </a:solidFill>
+            </a:endParaRPr>
+          </a:p>
+        </p:txBody>
+      </p:sp>
+      <p:sp>
+        <p:nvSpPr>
+          <p:cNvPr id="7" name="Rectangle: Rounded Corners 6">
+            <a:extLst>
+              <a:ext uri="{FF2B5EF4-FFF2-40B4-BE49-F238E27FC236}">
+                <a16:creationId xmlns:a16="http://schemas.microsoft.com/office/drawing/2014/main" id="{E5EC01C6-BF45-122C-9463-D60EE81C8418}"/>
+              </a:ext>
+            </a:extLst>
+          </p:cNvPr>
+          <p:cNvSpPr/>
+          <p:nvPr/>
+        </p:nvSpPr>
+        <p:spPr>
+          <a:xfrm>
+            <a:off x="872290" y="3230479"/>
+            <a:ext cx="2514600" cy="914400"/>
+          </a:xfrm>
+          <a:prstGeom prst="roundRect">
+            <a:avLst>
+              <a:gd name="adj" fmla="val 0"/>
+            </a:avLst>
+          </a:prstGeom>
+          <a:solidFill>
+            <a:schemeClr val="bg1"/>
+          </a:solidFill>
+          <a:ln>
+            <a:solidFill>
+              <a:schemeClr val="bg1"/>
+            </a:solidFill>
+          </a:ln>
+        </p:spPr>
+        <p:style>
+          <a:lnRef idx="2">
+            <a:schemeClr val="accent1">
+              <a:shade val="15000"/>
+            </a:schemeClr>
+          </a:lnRef>
+          <a:fillRef idx="1">
+            <a:schemeClr val="accent1"/>
+          </a:fillRef>
+          <a:effectRef idx="0">
+            <a:schemeClr val="accent1"/>
+          </a:effectRef>
+          <a:fontRef idx="minor">
+            <a:schemeClr val="lt1"/>
+          </a:fontRef>
+        </p:style>
+        <p:txBody>
+          <a:bodyPr rtlCol="0" anchor="ctr"/>
+          <a:lstStyle/>
+          <a:p>
+            <a:pPr algn="r"/>
+            <a:r>
+              <a:rPr lang="en-GB" sz="3600" dirty="0">
+                <a:solidFill>
+                  <a:srgbClr val="008000"/>
+                </a:solidFill>
+              </a:rPr>
+              <a:t>Scan Type:</a:t>
+            </a:r>
+          </a:p>
+        </p:txBody>
+      </p:sp>
+      <p:sp>
+        <p:nvSpPr>
+          <p:cNvPr id="8" name="Oval 7">
+            <a:extLst>
+              <a:ext uri="{FF2B5EF4-FFF2-40B4-BE49-F238E27FC236}">
+                <a16:creationId xmlns:a16="http://schemas.microsoft.com/office/drawing/2014/main" id="{8ABEAE2C-BB48-9AB0-AA80-6A59CB8A058A}"/>
+              </a:ext>
+            </a:extLst>
+          </p:cNvPr>
+          <p:cNvSpPr/>
+          <p:nvPr/>
+        </p:nvSpPr>
+        <p:spPr>
+          <a:xfrm>
+            <a:off x="3612482" y="3397932"/>
+            <a:ext cx="372979" cy="372979"/>
+          </a:xfrm>
+          <a:prstGeom prst="ellipse">
+            <a:avLst/>
+          </a:prstGeom>
+          <a:solidFill>
+            <a:srgbClr val="4B0082"/>
+          </a:solidFill>
+          <a:ln>
+            <a:solidFill>
+              <a:srgbClr val="4B0082"/>
+            </a:solidFill>
+          </a:ln>
+        </p:spPr>
+        <p:style>
+          <a:lnRef idx="2">
+            <a:schemeClr val="accent1">
+              <a:shade val="15000"/>
+            </a:schemeClr>
+          </a:lnRef>
+          <a:fillRef idx="1">
+            <a:schemeClr val="accent1"/>
+          </a:fillRef>
+          <a:effectRef idx="0">
+            <a:schemeClr val="accent1"/>
+          </a:effectRef>
+          <a:fontRef idx="minor">
+            <a:schemeClr val="lt1"/>
+          </a:fontRef>
+        </p:style>
+        <p:txBody>
+          <a:bodyPr rtlCol="0" anchor="ctr"/>
+          <a:lstStyle/>
+          <a:p>
+            <a:pPr algn="ctr"/>
+            <a:endParaRPr lang="en-GB"/>
+          </a:p>
+        </p:txBody>
+      </p:sp>
+      <p:sp>
+        <p:nvSpPr>
+          <p:cNvPr id="11" name="Rectangle: Rounded Corners 10">
+            <a:extLst>
+              <a:ext uri="{FF2B5EF4-FFF2-40B4-BE49-F238E27FC236}">
+                <a16:creationId xmlns:a16="http://schemas.microsoft.com/office/drawing/2014/main" id="{69203E8E-3899-7DEF-B5B9-AFE6FAFB78A0}"/>
+              </a:ext>
+            </a:extLst>
+          </p:cNvPr>
+          <p:cNvSpPr/>
+          <p:nvPr/>
+        </p:nvSpPr>
+        <p:spPr>
+          <a:xfrm>
+            <a:off x="50132" y="48127"/>
+            <a:ext cx="12141868" cy="914400"/>
+          </a:xfrm>
+          <a:prstGeom prst="roundRect">
+            <a:avLst>
+              <a:gd name="adj" fmla="val 0"/>
+            </a:avLst>
+          </a:prstGeom>
+          <a:solidFill>
+            <a:schemeClr val="bg1"/>
+          </a:solidFill>
+          <a:ln w="28575">
+            <a:solidFill>
+              <a:srgbClr val="4B0082"/>
+            </a:solidFill>
+          </a:ln>
+        </p:spPr>
+        <p:style>
+          <a:lnRef idx="2">
+            <a:schemeClr val="accent3">
+              <a:shade val="15000"/>
+            </a:schemeClr>
+          </a:lnRef>
+          <a:fillRef idx="1">
+            <a:schemeClr val="accent3"/>
+          </a:fillRef>
+          <a:effectRef idx="0">
+            <a:schemeClr val="accent3"/>
+          </a:effectRef>
+          <a:fontRef idx="minor">
+            <a:schemeClr val="lt1"/>
+          </a:fontRef>
+        </p:style>
+        <p:txBody>
+          <a:bodyPr rtlCol="0" anchor="ctr"/>
+          <a:lstStyle/>
+          <a:p>
+            <a:r>
+              <a:rPr lang="en-GB" sz="3600" b="1" dirty="0">
+                <a:solidFill>
+                  <a:srgbClr val="008000"/>
+                </a:solidFill>
+              </a:rPr>
+              <a:t>World Orbital Prison: MEDICAL SCANNER</a:t>
+            </a:r>
+          </a:p>
+        </p:txBody>
+      </p:sp>
+      <p:sp>
+        <p:nvSpPr>
+          <p:cNvPr id="13" name="Rectangle: Rounded Corners 12">
+            <a:extLst>
+              <a:ext uri="{FF2B5EF4-FFF2-40B4-BE49-F238E27FC236}">
+                <a16:creationId xmlns:a16="http://schemas.microsoft.com/office/drawing/2014/main" id="{C7F7EFA2-A335-FC91-4BC2-49406381FBF5}"/>
+              </a:ext>
+            </a:extLst>
+          </p:cNvPr>
+          <p:cNvSpPr/>
+          <p:nvPr/>
+        </p:nvSpPr>
+        <p:spPr>
+          <a:xfrm>
+            <a:off x="50132" y="962527"/>
+            <a:ext cx="12141868" cy="914400"/>
+          </a:xfrm>
+          <a:prstGeom prst="roundRect">
+            <a:avLst>
+              <a:gd name="adj" fmla="val 0"/>
+            </a:avLst>
+          </a:prstGeom>
+          <a:solidFill>
+            <a:schemeClr val="bg1"/>
+          </a:solidFill>
+          <a:ln w="28575">
+            <a:solidFill>
+              <a:srgbClr val="4B0082"/>
+            </a:solidFill>
+          </a:ln>
+        </p:spPr>
+        <p:style>
+          <a:lnRef idx="2">
+            <a:schemeClr val="accent3">
+              <a:shade val="15000"/>
+            </a:schemeClr>
+          </a:lnRef>
+          <a:fillRef idx="1">
+            <a:schemeClr val="accent3"/>
+          </a:fillRef>
+          <a:effectRef idx="0">
+            <a:schemeClr val="accent3"/>
+          </a:effectRef>
+          <a:fontRef idx="minor">
+            <a:schemeClr val="lt1"/>
+          </a:fontRef>
+        </p:style>
+        <p:txBody>
+          <a:bodyPr rtlCol="0" anchor="ctr"/>
+          <a:lstStyle/>
+          <a:p>
+            <a:r>
+              <a:rPr lang="en-GB" sz="2400" dirty="0">
+                <a:solidFill>
+                  <a:srgbClr val="008000"/>
+                </a:solidFill>
+              </a:rPr>
+              <a:t>File   Home   </a:t>
+            </a:r>
+            <a:r>
+              <a:rPr lang="en-GB" sz="2400" u="sng" dirty="0">
+                <a:solidFill>
+                  <a:srgbClr val="008000"/>
+                </a:solidFill>
+              </a:rPr>
+              <a:t>Scan</a:t>
+            </a:r>
+            <a:r>
+              <a:rPr lang="en-GB" sz="2400" dirty="0">
+                <a:solidFill>
+                  <a:srgbClr val="008000"/>
+                </a:solidFill>
+              </a:rPr>
+              <a:t>   Help</a:t>
+            </a:r>
+          </a:p>
+        </p:txBody>
+      </p:sp>
+      <p:sp>
+        <p:nvSpPr>
+          <p:cNvPr id="14" name="TextBox 13">
+            <a:extLst>
+              <a:ext uri="{FF2B5EF4-FFF2-40B4-BE49-F238E27FC236}">
+                <a16:creationId xmlns:a16="http://schemas.microsoft.com/office/drawing/2014/main" id="{893694E0-B460-29FA-859C-6F619630ECAD}"/>
+              </a:ext>
+            </a:extLst>
+          </p:cNvPr>
+          <p:cNvSpPr txBox="1"/>
+          <p:nvPr/>
+        </p:nvSpPr>
+        <p:spPr>
+          <a:xfrm>
+            <a:off x="4033587" y="3230478"/>
+            <a:ext cx="5871410" cy="707886"/>
+          </a:xfrm>
+          <a:prstGeom prst="rect">
+            <a:avLst/>
+          </a:prstGeom>
+          <a:noFill/>
+        </p:spPr>
+        <p:txBody>
+          <a:bodyPr wrap="square" rtlCol="0">
+            <a:spAutoFit/>
+          </a:bodyPr>
+          <a:lstStyle/>
+          <a:p>
+            <a:r>
+              <a:rPr lang="en-GB" sz="4000" dirty="0">
+                <a:solidFill>
+                  <a:srgbClr val="008000"/>
+                </a:solidFill>
+              </a:rPr>
+              <a:t>Prisoner Induction</a:t>
+            </a:r>
+          </a:p>
+        </p:txBody>
+      </p:sp>
+      <p:sp>
+        <p:nvSpPr>
+          <p:cNvPr id="15" name="Oval 14">
+            <a:extLst>
+              <a:ext uri="{FF2B5EF4-FFF2-40B4-BE49-F238E27FC236}">
+                <a16:creationId xmlns:a16="http://schemas.microsoft.com/office/drawing/2014/main" id="{4B4783B0-6505-9F2C-3FF4-20AAD97201FA}"/>
+              </a:ext>
+            </a:extLst>
+          </p:cNvPr>
+          <p:cNvSpPr/>
+          <p:nvPr/>
+        </p:nvSpPr>
+        <p:spPr>
+          <a:xfrm>
+            <a:off x="3612482" y="4105818"/>
+            <a:ext cx="372979" cy="372979"/>
+          </a:xfrm>
+          <a:prstGeom prst="ellipse">
+            <a:avLst/>
+          </a:prstGeom>
+          <a:noFill/>
+          <a:ln>
+            <a:solidFill>
+              <a:srgbClr val="4B0082"/>
+            </a:solidFill>
+          </a:ln>
+        </p:spPr>
+        <p:style>
+          <a:lnRef idx="2">
+            <a:schemeClr val="accent1">
+              <a:shade val="15000"/>
+            </a:schemeClr>
+          </a:lnRef>
+          <a:fillRef idx="1">
+            <a:schemeClr val="accent1"/>
+          </a:fillRef>
+          <a:effectRef idx="0">
+            <a:schemeClr val="accent1"/>
+          </a:effectRef>
+          <a:fontRef idx="minor">
+            <a:schemeClr val="lt1"/>
+          </a:fontRef>
+        </p:style>
+        <p:txBody>
+          <a:bodyPr rtlCol="0" anchor="ctr"/>
+          <a:lstStyle/>
+          <a:p>
+            <a:pPr algn="ctr"/>
+            <a:endParaRPr lang="en-GB"/>
+          </a:p>
+        </p:txBody>
+      </p:sp>
+      <p:sp>
+        <p:nvSpPr>
+          <p:cNvPr id="16" name="TextBox 15">
+            <a:extLst>
+              <a:ext uri="{FF2B5EF4-FFF2-40B4-BE49-F238E27FC236}">
+                <a16:creationId xmlns:a16="http://schemas.microsoft.com/office/drawing/2014/main" id="{87C98B18-824A-2437-D0FC-ED2F53373D31}"/>
+              </a:ext>
+            </a:extLst>
+          </p:cNvPr>
+          <p:cNvSpPr txBox="1"/>
+          <p:nvPr/>
+        </p:nvSpPr>
+        <p:spPr>
+          <a:xfrm>
+            <a:off x="4033587" y="3938364"/>
+            <a:ext cx="5871410" cy="707886"/>
+          </a:xfrm>
+          <a:prstGeom prst="rect">
+            <a:avLst/>
+          </a:prstGeom>
+          <a:noFill/>
+        </p:spPr>
+        <p:txBody>
+          <a:bodyPr wrap="square" rtlCol="0">
+            <a:spAutoFit/>
+          </a:bodyPr>
+          <a:lstStyle/>
+          <a:p>
+            <a:r>
+              <a:rPr lang="en-GB" sz="4000" dirty="0">
+                <a:solidFill>
+                  <a:srgbClr val="008000"/>
+                </a:solidFill>
+              </a:rPr>
+              <a:t>Annual Checkup</a:t>
+            </a:r>
+          </a:p>
+        </p:txBody>
+      </p:sp>
+      <p:sp>
+        <p:nvSpPr>
+          <p:cNvPr id="17" name="Oval 16">
+            <a:extLst>
+              <a:ext uri="{FF2B5EF4-FFF2-40B4-BE49-F238E27FC236}">
+                <a16:creationId xmlns:a16="http://schemas.microsoft.com/office/drawing/2014/main" id="{F25B24A7-43F2-BE6F-8B99-044E40DCD157}"/>
+              </a:ext>
+            </a:extLst>
+          </p:cNvPr>
+          <p:cNvSpPr/>
+          <p:nvPr/>
+        </p:nvSpPr>
+        <p:spPr>
+          <a:xfrm>
+            <a:off x="3612482" y="4813704"/>
+            <a:ext cx="372979" cy="372979"/>
+          </a:xfrm>
+          <a:prstGeom prst="ellipse">
+            <a:avLst/>
+          </a:prstGeom>
+          <a:noFill/>
+          <a:ln>
+            <a:solidFill>
+              <a:srgbClr val="4B0082"/>
+            </a:solidFill>
+          </a:ln>
+        </p:spPr>
+        <p:style>
+          <a:lnRef idx="2">
+            <a:schemeClr val="accent1">
+              <a:shade val="15000"/>
+            </a:schemeClr>
+          </a:lnRef>
+          <a:fillRef idx="1">
+            <a:schemeClr val="accent1"/>
+          </a:fillRef>
+          <a:effectRef idx="0">
+            <a:schemeClr val="accent1"/>
+          </a:effectRef>
+          <a:fontRef idx="minor">
+            <a:schemeClr val="lt1"/>
+          </a:fontRef>
+        </p:style>
+        <p:txBody>
+          <a:bodyPr rtlCol="0" anchor="ctr"/>
+          <a:lstStyle/>
+          <a:p>
+            <a:pPr algn="ctr"/>
+            <a:endParaRPr lang="en-GB"/>
+          </a:p>
+        </p:txBody>
+      </p:sp>
+      <p:sp>
+        <p:nvSpPr>
+          <p:cNvPr id="18" name="TextBox 17">
+            <a:extLst>
+              <a:ext uri="{FF2B5EF4-FFF2-40B4-BE49-F238E27FC236}">
+                <a16:creationId xmlns:a16="http://schemas.microsoft.com/office/drawing/2014/main" id="{4D94A277-271C-9849-A13D-9C1AE3228BDC}"/>
+              </a:ext>
+            </a:extLst>
+          </p:cNvPr>
+          <p:cNvSpPr txBox="1"/>
+          <p:nvPr/>
+        </p:nvSpPr>
+        <p:spPr>
+          <a:xfrm>
+            <a:off x="4033587" y="4646250"/>
+            <a:ext cx="5871410" cy="707886"/>
+          </a:xfrm>
+          <a:prstGeom prst="rect">
+            <a:avLst/>
+          </a:prstGeom>
+          <a:noFill/>
+        </p:spPr>
+        <p:txBody>
+          <a:bodyPr wrap="square" rtlCol="0">
+            <a:spAutoFit/>
+          </a:bodyPr>
+          <a:lstStyle/>
+          <a:p>
+            <a:r>
+              <a:rPr lang="en-GB" sz="4000" dirty="0">
+                <a:solidFill>
+                  <a:srgbClr val="008000"/>
+                </a:solidFill>
+              </a:rPr>
+              <a:t>Prohibited Substances</a:t>
+            </a:r>
+          </a:p>
+        </p:txBody>
+      </p:sp>
+      <p:sp>
+        <p:nvSpPr>
+          <p:cNvPr id="19" name="Oval 18">
+            <a:extLst>
+              <a:ext uri="{FF2B5EF4-FFF2-40B4-BE49-F238E27FC236}">
+                <a16:creationId xmlns:a16="http://schemas.microsoft.com/office/drawing/2014/main" id="{F5125C39-B877-818B-1B32-61E340B21022}"/>
+              </a:ext>
+            </a:extLst>
+          </p:cNvPr>
+          <p:cNvSpPr/>
+          <p:nvPr/>
+        </p:nvSpPr>
+        <p:spPr>
+          <a:xfrm>
+            <a:off x="3612482" y="5517635"/>
+            <a:ext cx="372979" cy="372979"/>
+          </a:xfrm>
+          <a:prstGeom prst="ellipse">
+            <a:avLst/>
+          </a:prstGeom>
+          <a:noFill/>
+          <a:ln>
+            <a:solidFill>
+              <a:srgbClr val="4B0082"/>
+            </a:solidFill>
+          </a:ln>
+        </p:spPr>
+        <p:style>
+          <a:lnRef idx="2">
+            <a:schemeClr val="accent1">
+              <a:shade val="15000"/>
+            </a:schemeClr>
+          </a:lnRef>
+          <a:fillRef idx="1">
+            <a:schemeClr val="accent1"/>
+          </a:fillRef>
+          <a:effectRef idx="0">
+            <a:schemeClr val="accent1"/>
+          </a:effectRef>
+          <a:fontRef idx="minor">
+            <a:schemeClr val="lt1"/>
+          </a:fontRef>
+        </p:style>
+        <p:txBody>
+          <a:bodyPr rtlCol="0" anchor="ctr"/>
+          <a:lstStyle/>
+          <a:p>
+            <a:pPr algn="ctr"/>
+            <a:endParaRPr lang="en-GB"/>
+          </a:p>
+        </p:txBody>
+      </p:sp>
+      <p:sp>
+        <p:nvSpPr>
+          <p:cNvPr id="20" name="TextBox 19">
+            <a:extLst>
+              <a:ext uri="{FF2B5EF4-FFF2-40B4-BE49-F238E27FC236}">
+                <a16:creationId xmlns:a16="http://schemas.microsoft.com/office/drawing/2014/main" id="{A4CBE8CC-41A1-B8A1-55B3-6EB8427E677F}"/>
+              </a:ext>
+            </a:extLst>
+          </p:cNvPr>
+          <p:cNvSpPr txBox="1"/>
+          <p:nvPr/>
+        </p:nvSpPr>
+        <p:spPr>
+          <a:xfrm>
+            <a:off x="4033587" y="5350181"/>
+            <a:ext cx="5871410" cy="707886"/>
+          </a:xfrm>
+          <a:prstGeom prst="rect">
+            <a:avLst/>
+          </a:prstGeom>
+          <a:noFill/>
+        </p:spPr>
+        <p:txBody>
+          <a:bodyPr wrap="square" rtlCol="0">
+            <a:spAutoFit/>
+          </a:bodyPr>
+          <a:lstStyle/>
+          <a:p>
+            <a:r>
+              <a:rPr lang="en-GB" sz="4000" dirty="0">
+                <a:solidFill>
+                  <a:srgbClr val="008000"/>
+                </a:solidFill>
+              </a:rPr>
+              <a:t>Prisoner Release</a:t>
+            </a:r>
+          </a:p>
+        </p:txBody>
+      </p:sp>
+    </p:spTree>
+    <p:extLst>
+      <p:ext uri="{BB962C8B-B14F-4D97-AF65-F5344CB8AC3E}">
+        <p14:creationId xmlns:p14="http://schemas.microsoft.com/office/powerpoint/2010/main" val="1081667882"/>
+      </p:ext>
+    </p:extLst>
+  </p:cSld>
+  <p:clrMapOvr>
+    <a:masterClrMapping/>
+  </p:clrMapOvr>
+</p:sld>
+</file>
+
+<file path=ppt/slides/slide11.xml><?xml version="1.0" encoding="utf-8"?>
 <p:sld xmlns:a="http://schemas.openxmlformats.org/drawingml/2006/main" xmlns:r="http://schemas.openxmlformats.org/officeDocument/2006/relationships" xmlns:p="http://schemas.openxmlformats.org/presentationml/2006/main">
   <p:cSld>
     <p:spTree>
@@ -4243,7 +7304,7 @@
 </p:sld>
 </file>
 
-<file path=ppt/slides/slide11.xml><?xml version="1.0" encoding="utf-8"?>
+<file path=ppt/slides/slide12.xml><?xml version="1.0" encoding="utf-8"?>
 <p:sld xmlns:a="http://schemas.openxmlformats.org/drawingml/2006/main" xmlns:r="http://schemas.openxmlformats.org/officeDocument/2006/relationships" xmlns:p="http://schemas.openxmlformats.org/presentationml/2006/main">
   <p:cSld>
     <p:spTree>
@@ -4712,7 +7773,7 @@
 </p:sld>
 </file>
 
-<file path=ppt/slides/slide12.xml><?xml version="1.0" encoding="utf-8"?>
+<file path=ppt/slides/slide13.xml><?xml version="1.0" encoding="utf-8"?>
 <p:sld xmlns:a="http://schemas.openxmlformats.org/drawingml/2006/main" xmlns:r="http://schemas.openxmlformats.org/officeDocument/2006/relationships" xmlns:p="http://schemas.openxmlformats.org/presentationml/2006/main">
   <p:cSld>
     <p:spTree>
@@ -4862,6 +7923,77 @@
       </p:grpSpPr>
       <p:sp>
         <p:nvSpPr>
+          <p:cNvPr id="7" name="TextBox 6">
+            <a:extLst>
+              <a:ext uri="{FF2B5EF4-FFF2-40B4-BE49-F238E27FC236}">
+                <a16:creationId xmlns:a16="http://schemas.microsoft.com/office/drawing/2014/main" id="{AFFC7EE0-CF02-60F2-E895-D54CD3B327EC}"/>
+              </a:ext>
+            </a:extLst>
+          </p:cNvPr>
+          <p:cNvSpPr txBox="1"/>
+          <p:nvPr/>
+        </p:nvSpPr>
+        <p:spPr>
+          <a:xfrm>
+            <a:off x="3576000" y="2709000"/>
+            <a:ext cx="5040000" cy="1440000"/>
+          </a:xfrm>
+          <a:prstGeom prst="rect">
+            <a:avLst/>
+          </a:prstGeom>
+          <a:noFill/>
+        </p:spPr>
+        <p:txBody>
+          <a:bodyPr wrap="none" rtlCol="0" anchor="ctr">
+            <a:noAutofit/>
+          </a:bodyPr>
+          <a:lstStyle/>
+          <a:p>
+            <a:pPr algn="ctr"/>
+            <a:r>
+              <a:rPr lang="en-GB" sz="8800" b="1" dirty="0">
+                <a:ln w="0"/>
+                <a:solidFill>
+                  <a:srgbClr val="FF0000"/>
+                </a:solidFill>
+              </a:rPr>
+              <a:t>Save as JPG, not PNG</a:t>
+            </a:r>
+          </a:p>
+        </p:txBody>
+      </p:sp>
+    </p:spTree>
+    <p:extLst>
+      <p:ext uri="{BB962C8B-B14F-4D97-AF65-F5344CB8AC3E}">
+        <p14:creationId xmlns:p14="http://schemas.microsoft.com/office/powerpoint/2010/main" val="3342968671"/>
+      </p:ext>
+    </p:extLst>
+  </p:cSld>
+  <p:clrMapOvr>
+    <a:masterClrMapping/>
+  </p:clrMapOvr>
+</p:sld>
+</file>
+
+<file path=ppt/slides/slide3.xml><?xml version="1.0" encoding="utf-8"?>
+<p:sld xmlns:a="http://schemas.openxmlformats.org/drawingml/2006/main" xmlns:r="http://schemas.openxmlformats.org/officeDocument/2006/relationships" xmlns:p="http://schemas.openxmlformats.org/presentationml/2006/main">
+  <p:cSld>
+    <p:spTree>
+      <p:nvGrpSpPr>
+        <p:cNvPr id="1" name=""/>
+        <p:cNvGrpSpPr/>
+        <p:nvPr/>
+      </p:nvGrpSpPr>
+      <p:grpSpPr>
+        <a:xfrm>
+          <a:off x="0" y="0"/>
+          <a:ext cx="0" cy="0"/>
+          <a:chOff x="0" y="0"/>
+          <a:chExt cx="0" cy="0"/>
+        </a:xfrm>
+      </p:grpSpPr>
+      <p:sp>
+        <p:nvSpPr>
           <p:cNvPr id="2" name="TextBox 1">
             <a:extLst>
               <a:ext uri="{FF2B5EF4-FFF2-40B4-BE49-F238E27FC236}">
@@ -5053,7 +8185,7 @@
 </p:sld>
 </file>
 
-<file path=ppt/slides/slide3.xml><?xml version="1.0" encoding="utf-8"?>
+<file path=ppt/slides/slide4.xml><?xml version="1.0" encoding="utf-8"?>
 <p:sld xmlns:a="http://schemas.openxmlformats.org/drawingml/2006/main" xmlns:r="http://schemas.openxmlformats.org/officeDocument/2006/relationships" xmlns:p="http://schemas.openxmlformats.org/presentationml/2006/main">
   <p:cSld>
     <p:spTree>
@@ -5224,7 +8356,7 @@
 </p:sld>
 </file>
 
-<file path=ppt/slides/slide4.xml><?xml version="1.0" encoding="utf-8"?>
+<file path=ppt/slides/slide5.xml><?xml version="1.0" encoding="utf-8"?>
 <p:sld xmlns:a="http://schemas.openxmlformats.org/drawingml/2006/main" xmlns:r="http://schemas.openxmlformats.org/officeDocument/2006/relationships" xmlns:p="http://schemas.openxmlformats.org/presentationml/2006/main">
   <p:cSld>
     <p:spTree>
@@ -5395,7 +8527,7 @@
 </p:sld>
 </file>
 
-<file path=ppt/slides/slide5.xml><?xml version="1.0" encoding="utf-8"?>
+<file path=ppt/slides/slide6.xml><?xml version="1.0" encoding="utf-8"?>
 <p:sld xmlns:a="http://schemas.openxmlformats.org/drawingml/2006/main" xmlns:r="http://schemas.openxmlformats.org/officeDocument/2006/relationships" xmlns:p="http://schemas.openxmlformats.org/presentationml/2006/main">
   <p:cSld>
     <p:spTree>
@@ -5701,7 +8833,7 @@
 </p:sld>
 </file>
 
-<file path=ppt/slides/slide6.xml><?xml version="1.0" encoding="utf-8"?>
+<file path=ppt/slides/slide7.xml><?xml version="1.0" encoding="utf-8"?>
 <p:sld xmlns:a="http://schemas.openxmlformats.org/drawingml/2006/main" xmlns:r="http://schemas.openxmlformats.org/officeDocument/2006/relationships" xmlns:p="http://schemas.openxmlformats.org/presentationml/2006/main">
   <p:cSld>
     <p:spTree>
@@ -5917,7 +9049,7 @@
 </p:sld>
 </file>
 
-<file path=ppt/slides/slide7.xml><?xml version="1.0" encoding="utf-8"?>
+<file path=ppt/slides/slide8.xml><?xml version="1.0" encoding="utf-8"?>
 <p:sld xmlns:a="http://schemas.openxmlformats.org/drawingml/2006/main" xmlns:r="http://schemas.openxmlformats.org/officeDocument/2006/relationships" xmlns:p="http://schemas.openxmlformats.org/presentationml/2006/main">
   <p:cSld>
     <p:spTree>
@@ -6079,182 +9211,6 @@
     <p:extLst>
       <p:ext uri="{BB962C8B-B14F-4D97-AF65-F5344CB8AC3E}">
         <p14:creationId xmlns:p14="http://schemas.microsoft.com/office/powerpoint/2010/main" val="3773736444"/>
-      </p:ext>
-    </p:extLst>
-  </p:cSld>
-  <p:clrMapOvr>
-    <a:masterClrMapping/>
-  </p:clrMapOvr>
-</p:sld>
-</file>
-
-<file path=ppt/slides/slide8.xml><?xml version="1.0" encoding="utf-8"?>
-<p:sld xmlns:a="http://schemas.openxmlformats.org/drawingml/2006/main" xmlns:r="http://schemas.openxmlformats.org/officeDocument/2006/relationships" xmlns:p="http://schemas.openxmlformats.org/presentationml/2006/main">
-  <p:cSld>
-    <p:spTree>
-      <p:nvGrpSpPr>
-        <p:cNvPr id="1" name=""/>
-        <p:cNvGrpSpPr/>
-        <p:nvPr/>
-      </p:nvGrpSpPr>
-      <p:grpSpPr>
-        <a:xfrm>
-          <a:off x="0" y="0"/>
-          <a:ext cx="0" cy="0"/>
-          <a:chOff x="0" y="0"/>
-          <a:chExt cx="0" cy="0"/>
-        </a:xfrm>
-      </p:grpSpPr>
-      <p:sp>
-        <p:nvSpPr>
-          <p:cNvPr id="3" name="TextBox 2">
-            <a:extLst>
-              <a:ext uri="{FF2B5EF4-FFF2-40B4-BE49-F238E27FC236}">
-                <a16:creationId xmlns:a16="http://schemas.microsoft.com/office/drawing/2014/main" id="{D6B67DF0-4721-8B8B-C75D-269DD8554881}"/>
-              </a:ext>
-            </a:extLst>
-          </p:cNvPr>
-          <p:cNvSpPr txBox="1"/>
-          <p:nvPr/>
-        </p:nvSpPr>
-        <p:spPr>
-          <a:xfrm>
-            <a:off x="1126121" y="2598056"/>
-            <a:ext cx="9890221" cy="3486669"/>
-          </a:xfrm>
-          <a:prstGeom prst="rect">
-            <a:avLst/>
-          </a:prstGeom>
-          <a:noFill/>
-        </p:spPr>
-        <p:txBody>
-          <a:bodyPr wrap="none" rtlCol="0" anchor="ctr">
-            <a:noAutofit/>
-          </a:bodyPr>
-          <a:lstStyle>
-            <a:defPPr>
-              <a:defRPr lang="en-US"/>
-            </a:defPPr>
-            <a:lvl1pPr algn="ctr">
-              <a:defRPr sz="6000">
-                <a:ln w="0"/>
-                <a:effectLst>
-                  <a:outerShdw blurRad="38100" dist="19050" dir="2700000" algn="tl" rotWithShape="0">
-                    <a:schemeClr val="dk1">
-                      <a:alpha val="40000"/>
-                    </a:schemeClr>
-                  </a:outerShdw>
-                </a:effectLst>
-              </a:defRPr>
-            </a:lvl1pPr>
-          </a:lstStyle>
-          <a:p>
-            <a:pPr marL="1143000" indent="-1143000" algn="l">
-              <a:buFont typeface="+mj-lt"/>
-              <a:buAutoNum type="arabicPeriod"/>
-            </a:pPr>
-            <a:r>
-              <a:rPr lang="en-GB" dirty="0"/>
-              <a:t>Record identification</a:t>
-            </a:r>
-          </a:p>
-          <a:p>
-            <a:pPr marL="1143000" indent="-1143000" algn="l">
-              <a:buFont typeface="+mj-lt"/>
-              <a:buAutoNum type="arabicPeriod"/>
-            </a:pPr>
-            <a:r>
-              <a:rPr lang="en-GB" dirty="0"/>
-              <a:t>Medical check</a:t>
-            </a:r>
-          </a:p>
-          <a:p>
-            <a:pPr marL="1143000" indent="-1143000" algn="l">
-              <a:buFont typeface="+mj-lt"/>
-              <a:buAutoNum type="arabicPeriod"/>
-            </a:pPr>
-            <a:r>
-              <a:rPr lang="en-GB" dirty="0"/>
-              <a:t>Remove personal property</a:t>
-            </a:r>
-          </a:p>
-          <a:p>
-            <a:pPr marL="1143000" indent="-1143000" algn="l">
-              <a:buFont typeface="+mj-lt"/>
-              <a:buAutoNum type="arabicPeriod"/>
-            </a:pPr>
-            <a:r>
-              <a:rPr lang="en-GB" dirty="0"/>
-              <a:t>Cell assignment</a:t>
-            </a:r>
-          </a:p>
-        </p:txBody>
-      </p:sp>
-      <p:sp>
-        <p:nvSpPr>
-          <p:cNvPr id="7" name="TextBox 6">
-            <a:extLst>
-              <a:ext uri="{FF2B5EF4-FFF2-40B4-BE49-F238E27FC236}">
-                <a16:creationId xmlns:a16="http://schemas.microsoft.com/office/drawing/2014/main" id="{78FA00A8-F39F-1BC1-875B-9AF04FFD0A02}"/>
-              </a:ext>
-            </a:extLst>
-          </p:cNvPr>
-          <p:cNvSpPr txBox="1"/>
-          <p:nvPr/>
-        </p:nvSpPr>
-        <p:spPr>
-          <a:xfrm>
-            <a:off x="212777" y="255644"/>
-            <a:ext cx="5040000" cy="1440000"/>
-          </a:xfrm>
-          <a:prstGeom prst="rect">
-            <a:avLst/>
-          </a:prstGeom>
-          <a:noFill/>
-        </p:spPr>
-        <p:txBody>
-          <a:bodyPr wrap="none" rtlCol="0" anchor="ctr">
-            <a:noAutofit/>
-          </a:bodyPr>
-          <a:lstStyle/>
-          <a:p>
-            <a:pPr algn="ctr"/>
-            <a:r>
-              <a:rPr lang="en-GB" sz="6000" dirty="0">
-                <a:ln w="0"/>
-                <a:effectLst>
-                  <a:outerShdw blurRad="38100" dist="19050" dir="2700000" algn="tl" rotWithShape="0">
-                    <a:schemeClr val="dk1">
-                      <a:alpha val="40000"/>
-                    </a:schemeClr>
-                  </a:outerShdw>
-                </a:effectLst>
-              </a:rPr>
-              <a:t>Induction</a:t>
-            </a:r>
-          </a:p>
-          <a:p>
-            <a:pPr algn="ctr"/>
-            <a:r>
-              <a:rPr lang="en-GB" sz="6000" dirty="0">
-                <a:ln w="0"/>
-                <a:effectLst>
-                  <a:outerShdw blurRad="38100" dist="19050" dir="2700000" algn="tl" rotWithShape="0">
-                    <a:schemeClr val="dk1">
-                      <a:alpha val="40000"/>
-                    </a:schemeClr>
-                  </a:outerShdw>
-                </a:effectLst>
-              </a:rPr>
-              <a:t>Process</a:t>
-            </a:r>
-          </a:p>
-        </p:txBody>
-      </p:sp>
-    </p:spTree>
-    <p:extLst>
-      <p:ext uri="{BB962C8B-B14F-4D97-AF65-F5344CB8AC3E}">
-        <p14:creationId xmlns:p14="http://schemas.microsoft.com/office/powerpoint/2010/main" val="1670483054"/>
       </p:ext>
     </p:extLst>
   </p:cSld>
@@ -6283,929 +9239,146 @@
       </p:grpSpPr>
       <p:sp>
         <p:nvSpPr>
-          <p:cNvPr id="12" name="Rectangle 11">
-            <a:extLst>
-              <a:ext uri="{FF2B5EF4-FFF2-40B4-BE49-F238E27FC236}">
-                <a16:creationId xmlns:a16="http://schemas.microsoft.com/office/drawing/2014/main" id="{B7B07077-A5CD-B898-08FF-F759CC3CAEFB}"/>
-              </a:ext>
-            </a:extLst>
-          </p:cNvPr>
-          <p:cNvSpPr/>
-          <p:nvPr/>
-        </p:nvSpPr>
-        <p:spPr>
-          <a:xfrm>
-            <a:off x="0" y="0"/>
-            <a:ext cx="12192000" cy="6858000"/>
+          <p:cNvPr id="3" name="TextBox 2">
+            <a:extLst>
+              <a:ext uri="{FF2B5EF4-FFF2-40B4-BE49-F238E27FC236}">
+                <a16:creationId xmlns:a16="http://schemas.microsoft.com/office/drawing/2014/main" id="{D6B67DF0-4721-8B8B-C75D-269DD8554881}"/>
+              </a:ext>
+            </a:extLst>
+          </p:cNvPr>
+          <p:cNvSpPr txBox="1"/>
+          <p:nvPr/>
+        </p:nvSpPr>
+        <p:spPr>
+          <a:xfrm>
+            <a:off x="1126121" y="2598056"/>
+            <a:ext cx="9890221" cy="3486669"/>
           </a:xfrm>
           <a:prstGeom prst="rect">
             <a:avLst/>
           </a:prstGeom>
-          <a:solidFill>
-            <a:schemeClr val="bg1"/>
-          </a:solidFill>
-          <a:ln w="76200">
-            <a:solidFill>
-              <a:srgbClr val="4B0082"/>
-            </a:solidFill>
-          </a:ln>
-        </p:spPr>
-        <p:style>
-          <a:lnRef idx="2">
-            <a:schemeClr val="accent1">
-              <a:shade val="15000"/>
-            </a:schemeClr>
-          </a:lnRef>
-          <a:fillRef idx="1">
-            <a:schemeClr val="accent1"/>
-          </a:fillRef>
-          <a:effectRef idx="0">
-            <a:schemeClr val="accent1"/>
-          </a:effectRef>
-          <a:fontRef idx="minor">
-            <a:schemeClr val="lt1"/>
-          </a:fontRef>
-        </p:style>
-        <p:txBody>
-          <a:bodyPr rtlCol="0" anchor="ctr"/>
+          <a:noFill/>
+        </p:spPr>
+        <p:txBody>
+          <a:bodyPr wrap="none" rtlCol="0" anchor="ctr">
+            <a:noAutofit/>
+          </a:bodyPr>
+          <a:lstStyle>
+            <a:defPPr>
+              <a:defRPr lang="en-US"/>
+            </a:defPPr>
+            <a:lvl1pPr algn="ctr">
+              <a:defRPr sz="6000">
+                <a:ln w="0"/>
+                <a:effectLst>
+                  <a:outerShdw blurRad="38100" dist="19050" dir="2700000" algn="tl" rotWithShape="0">
+                    <a:schemeClr val="dk1">
+                      <a:alpha val="40000"/>
+                    </a:schemeClr>
+                  </a:outerShdw>
+                </a:effectLst>
+              </a:defRPr>
+            </a:lvl1pPr>
+          </a:lstStyle>
+          <a:p>
+            <a:pPr marL="1143000" indent="-1143000" algn="l">
+              <a:buFont typeface="+mj-lt"/>
+              <a:buAutoNum type="arabicPeriod"/>
+            </a:pPr>
+            <a:r>
+              <a:rPr lang="en-GB" dirty="0"/>
+              <a:t>Record identification</a:t>
+            </a:r>
+          </a:p>
+          <a:p>
+            <a:pPr marL="1143000" indent="-1143000" algn="l">
+              <a:buFont typeface="+mj-lt"/>
+              <a:buAutoNum type="arabicPeriod"/>
+            </a:pPr>
+            <a:r>
+              <a:rPr lang="en-GB" dirty="0"/>
+              <a:t>Medical check</a:t>
+            </a:r>
+          </a:p>
+          <a:p>
+            <a:pPr marL="1143000" indent="-1143000" algn="l">
+              <a:buFont typeface="+mj-lt"/>
+              <a:buAutoNum type="arabicPeriod"/>
+            </a:pPr>
+            <a:r>
+              <a:rPr lang="en-GB" dirty="0"/>
+              <a:t>Remove personal property</a:t>
+            </a:r>
+          </a:p>
+          <a:p>
+            <a:pPr marL="1143000" indent="-1143000" algn="l">
+              <a:buFont typeface="+mj-lt"/>
+              <a:buAutoNum type="arabicPeriod"/>
+            </a:pPr>
+            <a:r>
+              <a:rPr lang="en-GB" dirty="0"/>
+              <a:t>Cell assignment</a:t>
+            </a:r>
+          </a:p>
+        </p:txBody>
+      </p:sp>
+      <p:sp>
+        <p:nvSpPr>
+          <p:cNvPr id="7" name="TextBox 6">
+            <a:extLst>
+              <a:ext uri="{FF2B5EF4-FFF2-40B4-BE49-F238E27FC236}">
+                <a16:creationId xmlns:a16="http://schemas.microsoft.com/office/drawing/2014/main" id="{78FA00A8-F39F-1BC1-875B-9AF04FFD0A02}"/>
+              </a:ext>
+            </a:extLst>
+          </p:cNvPr>
+          <p:cNvSpPr txBox="1"/>
+          <p:nvPr/>
+        </p:nvSpPr>
+        <p:spPr>
+          <a:xfrm>
+            <a:off x="212777" y="255644"/>
+            <a:ext cx="5040000" cy="1440000"/>
+          </a:xfrm>
+          <a:prstGeom prst="rect">
+            <a:avLst/>
+          </a:prstGeom>
+          <a:noFill/>
+        </p:spPr>
+        <p:txBody>
+          <a:bodyPr wrap="none" rtlCol="0" anchor="ctr">
+            <a:noAutofit/>
+          </a:bodyPr>
           <a:lstStyle/>
           <a:p>
             <a:pPr algn="ctr"/>
-            <a:endParaRPr lang="en-GB"/>
-          </a:p>
-        </p:txBody>
-      </p:sp>
-      <p:sp>
-        <p:nvSpPr>
-          <p:cNvPr id="2" name="Rectangle: Rounded Corners 1">
-            <a:extLst>
-              <a:ext uri="{FF2B5EF4-FFF2-40B4-BE49-F238E27FC236}">
-                <a16:creationId xmlns:a16="http://schemas.microsoft.com/office/drawing/2014/main" id="{96B7F6F7-6C36-A423-552C-F05E8CD441AE}"/>
-              </a:ext>
-            </a:extLst>
-          </p:cNvPr>
-          <p:cNvSpPr/>
-          <p:nvPr/>
-        </p:nvSpPr>
-        <p:spPr>
-          <a:xfrm>
-            <a:off x="10280985" y="5696952"/>
-            <a:ext cx="1672389" cy="914400"/>
-          </a:xfrm>
-          <a:prstGeom prst="roundRect">
-            <a:avLst/>
-          </a:prstGeom>
-          <a:solidFill>
-            <a:srgbClr val="4B0082"/>
-          </a:solidFill>
-          <a:ln w="76200">
-            <a:solidFill>
-              <a:srgbClr val="4B0082"/>
-            </a:solidFill>
-          </a:ln>
-        </p:spPr>
-        <p:style>
-          <a:lnRef idx="2">
-            <a:schemeClr val="accent1">
-              <a:shade val="15000"/>
-            </a:schemeClr>
-          </a:lnRef>
-          <a:fillRef idx="1">
-            <a:schemeClr val="accent1"/>
-          </a:fillRef>
-          <a:effectRef idx="0">
-            <a:schemeClr val="accent1"/>
-          </a:effectRef>
-          <a:fontRef idx="minor">
-            <a:schemeClr val="lt1"/>
-          </a:fontRef>
-        </p:style>
-        <p:txBody>
-          <a:bodyPr rtlCol="0" anchor="ctr"/>
-          <a:lstStyle/>
+            <a:r>
+              <a:rPr lang="en-GB" sz="6000" dirty="0">
+                <a:ln w="0"/>
+                <a:effectLst>
+                  <a:outerShdw blurRad="38100" dist="19050" dir="2700000" algn="tl" rotWithShape="0">
+                    <a:schemeClr val="dk1">
+                      <a:alpha val="40000"/>
+                    </a:schemeClr>
+                  </a:outerShdw>
+                </a:effectLst>
+              </a:rPr>
+              <a:t>Induction</a:t>
+            </a:r>
+          </a:p>
           <a:p>
             <a:pPr algn="ctr"/>
             <a:r>
-              <a:rPr lang="en-GB" sz="3600" dirty="0">
-                <a:solidFill>
-                  <a:schemeClr val="bg1"/>
-                </a:solidFill>
+              <a:rPr lang="en-GB" sz="6000" dirty="0">
+                <a:ln w="0"/>
+                <a:effectLst>
+                  <a:outerShdw blurRad="38100" dist="19050" dir="2700000" algn="tl" rotWithShape="0">
+                    <a:schemeClr val="dk1">
+                      <a:alpha val="40000"/>
+                    </a:schemeClr>
+                  </a:outerShdw>
+                </a:effectLst>
               </a:rPr>
-              <a:t>SCAN</a:t>
-            </a:r>
-          </a:p>
-        </p:txBody>
-      </p:sp>
-      <p:sp>
-        <p:nvSpPr>
-          <p:cNvPr id="3" name="Rectangle: Rounded Corners 2">
-            <a:extLst>
-              <a:ext uri="{FF2B5EF4-FFF2-40B4-BE49-F238E27FC236}">
-                <a16:creationId xmlns:a16="http://schemas.microsoft.com/office/drawing/2014/main" id="{CBFA1F0B-AA43-15BF-A01F-2C9B9101A932}"/>
-              </a:ext>
-            </a:extLst>
-          </p:cNvPr>
-          <p:cNvSpPr/>
-          <p:nvPr/>
-        </p:nvSpPr>
-        <p:spPr>
-          <a:xfrm>
-            <a:off x="3483142" y="2195763"/>
-            <a:ext cx="6466973" cy="914400"/>
-          </a:xfrm>
-          <a:prstGeom prst="roundRect">
-            <a:avLst>
-              <a:gd name="adj" fmla="val 0"/>
-            </a:avLst>
-          </a:prstGeom>
-          <a:solidFill>
-            <a:schemeClr val="bg1"/>
-          </a:solidFill>
-          <a:ln w="38100">
-            <a:solidFill>
-              <a:srgbClr val="4B0082"/>
-            </a:solidFill>
-          </a:ln>
-        </p:spPr>
-        <p:style>
-          <a:lnRef idx="2">
-            <a:schemeClr val="accent1">
-              <a:shade val="15000"/>
-            </a:schemeClr>
-          </a:lnRef>
-          <a:fillRef idx="1">
-            <a:schemeClr val="accent1"/>
-          </a:fillRef>
-          <a:effectRef idx="0">
-            <a:schemeClr val="accent1"/>
-          </a:effectRef>
-          <a:fontRef idx="minor">
-            <a:schemeClr val="lt1"/>
-          </a:fontRef>
-        </p:style>
-        <p:txBody>
-          <a:bodyPr rtlCol="0" anchor="ctr"/>
-          <a:lstStyle/>
-          <a:p>
-            <a:r>
-              <a:rPr lang="en-GB" sz="3600" dirty="0">
-                <a:solidFill>
-                  <a:srgbClr val="008000"/>
-                </a:solidFill>
-              </a:rPr>
-              <a:t>H4095696</a:t>
-            </a:r>
-          </a:p>
-        </p:txBody>
-      </p:sp>
-      <p:sp>
-        <p:nvSpPr>
-          <p:cNvPr id="4" name="Rectangle: Rounded Corners 3">
-            <a:extLst>
-              <a:ext uri="{FF2B5EF4-FFF2-40B4-BE49-F238E27FC236}">
-                <a16:creationId xmlns:a16="http://schemas.microsoft.com/office/drawing/2014/main" id="{6B044FC1-E8B6-0734-0A04-20F100703A9C}"/>
-              </a:ext>
-            </a:extLst>
-          </p:cNvPr>
-          <p:cNvSpPr/>
-          <p:nvPr/>
-        </p:nvSpPr>
-        <p:spPr>
-          <a:xfrm>
-            <a:off x="872290" y="2195763"/>
-            <a:ext cx="2514600" cy="914400"/>
-          </a:xfrm>
-          <a:prstGeom prst="roundRect">
-            <a:avLst>
-              <a:gd name="adj" fmla="val 0"/>
-            </a:avLst>
-          </a:prstGeom>
-          <a:solidFill>
-            <a:schemeClr val="bg1"/>
-          </a:solidFill>
-          <a:ln>
-            <a:solidFill>
-              <a:schemeClr val="bg1"/>
-            </a:solidFill>
-          </a:ln>
-        </p:spPr>
-        <p:style>
-          <a:lnRef idx="2">
-            <a:schemeClr val="accent1">
-              <a:shade val="15000"/>
-            </a:schemeClr>
-          </a:lnRef>
-          <a:fillRef idx="1">
-            <a:schemeClr val="accent1"/>
-          </a:fillRef>
-          <a:effectRef idx="0">
-            <a:schemeClr val="accent1"/>
-          </a:effectRef>
-          <a:fontRef idx="minor">
-            <a:schemeClr val="lt1"/>
-          </a:fontRef>
-        </p:style>
-        <p:txBody>
-          <a:bodyPr rtlCol="0" anchor="ctr"/>
-          <a:lstStyle/>
-          <a:p>
-            <a:pPr algn="r"/>
-            <a:r>
-              <a:rPr lang="en-GB" sz="3600" dirty="0">
-                <a:solidFill>
-                  <a:srgbClr val="008000"/>
-                </a:solidFill>
-              </a:rPr>
-              <a:t>Prisoner ID:</a:t>
-            </a:r>
-          </a:p>
-        </p:txBody>
-      </p:sp>
-      <p:sp>
-        <p:nvSpPr>
-          <p:cNvPr id="5" name="Rectangle: Rounded Corners 4">
-            <a:extLst>
-              <a:ext uri="{FF2B5EF4-FFF2-40B4-BE49-F238E27FC236}">
-                <a16:creationId xmlns:a16="http://schemas.microsoft.com/office/drawing/2014/main" id="{BCE0A71C-F94E-C9D6-A7F8-194538B6B357}"/>
-              </a:ext>
-            </a:extLst>
-          </p:cNvPr>
-          <p:cNvSpPr/>
-          <p:nvPr/>
-        </p:nvSpPr>
-        <p:spPr>
-          <a:xfrm>
-            <a:off x="10280984" y="4646250"/>
-            <a:ext cx="1672389" cy="914400"/>
-          </a:xfrm>
-          <a:prstGeom prst="roundRect">
-            <a:avLst/>
-          </a:prstGeom>
-          <a:solidFill>
-            <a:schemeClr val="bg1"/>
-          </a:solidFill>
-          <a:ln w="76200">
-            <a:solidFill>
-              <a:srgbClr val="4B0082"/>
-            </a:solidFill>
-          </a:ln>
-        </p:spPr>
-        <p:style>
-          <a:lnRef idx="2">
-            <a:schemeClr val="accent1">
-              <a:shade val="15000"/>
-            </a:schemeClr>
-          </a:lnRef>
-          <a:fillRef idx="1">
-            <a:schemeClr val="accent1"/>
-          </a:fillRef>
-          <a:effectRef idx="0">
-            <a:schemeClr val="accent1"/>
-          </a:effectRef>
-          <a:fontRef idx="minor">
-            <a:schemeClr val="lt1"/>
-          </a:fontRef>
-        </p:style>
-        <p:txBody>
-          <a:bodyPr rtlCol="0" anchor="ctr"/>
-          <a:lstStyle/>
-          <a:p>
-            <a:pPr algn="ctr"/>
-            <a:r>
-              <a:rPr lang="en-GB" sz="3600" dirty="0">
-                <a:solidFill>
-                  <a:srgbClr val="4B0082"/>
-                </a:solidFill>
-              </a:rPr>
-              <a:t>Cancel</a:t>
-            </a:r>
-          </a:p>
-        </p:txBody>
-      </p:sp>
-      <p:sp>
-        <p:nvSpPr>
-          <p:cNvPr id="6" name="Rectangle: Rounded Corners 5">
-            <a:extLst>
-              <a:ext uri="{FF2B5EF4-FFF2-40B4-BE49-F238E27FC236}">
-                <a16:creationId xmlns:a16="http://schemas.microsoft.com/office/drawing/2014/main" id="{7DC07184-0DAD-6EA4-9BA3-BBDCEC534658}"/>
-              </a:ext>
-            </a:extLst>
-          </p:cNvPr>
-          <p:cNvSpPr/>
-          <p:nvPr/>
-        </p:nvSpPr>
-        <p:spPr>
-          <a:xfrm>
-            <a:off x="3483142" y="3230478"/>
-            <a:ext cx="6466973" cy="3380874"/>
-          </a:xfrm>
-          <a:prstGeom prst="roundRect">
-            <a:avLst>
-              <a:gd name="adj" fmla="val 0"/>
-            </a:avLst>
-          </a:prstGeom>
-          <a:solidFill>
-            <a:schemeClr val="bg1"/>
-          </a:solidFill>
-          <a:ln w="38100">
-            <a:solidFill>
-              <a:srgbClr val="4B0082"/>
-            </a:solidFill>
-          </a:ln>
-        </p:spPr>
-        <p:style>
-          <a:lnRef idx="2">
-            <a:schemeClr val="accent1">
-              <a:shade val="15000"/>
-            </a:schemeClr>
-          </a:lnRef>
-          <a:fillRef idx="1">
-            <a:schemeClr val="accent1"/>
-          </a:fillRef>
-          <a:effectRef idx="0">
-            <a:schemeClr val="accent1"/>
-          </a:effectRef>
-          <a:fontRef idx="minor">
-            <a:schemeClr val="lt1"/>
-          </a:fontRef>
-        </p:style>
-        <p:txBody>
-          <a:bodyPr rtlCol="0" anchor="t"/>
-          <a:lstStyle/>
-          <a:p>
-            <a:endParaRPr lang="en-GB" sz="3600" dirty="0">
-              <a:solidFill>
-                <a:sysClr val="windowText" lastClr="000000"/>
-              </a:solidFill>
-            </a:endParaRPr>
-          </a:p>
-        </p:txBody>
-      </p:sp>
-      <p:sp>
-        <p:nvSpPr>
-          <p:cNvPr id="7" name="Rectangle: Rounded Corners 6">
-            <a:extLst>
-              <a:ext uri="{FF2B5EF4-FFF2-40B4-BE49-F238E27FC236}">
-                <a16:creationId xmlns:a16="http://schemas.microsoft.com/office/drawing/2014/main" id="{E5EC01C6-BF45-122C-9463-D60EE81C8418}"/>
-              </a:ext>
-            </a:extLst>
-          </p:cNvPr>
-          <p:cNvSpPr/>
-          <p:nvPr/>
-        </p:nvSpPr>
-        <p:spPr>
-          <a:xfrm>
-            <a:off x="872290" y="3230479"/>
-            <a:ext cx="2514600" cy="914400"/>
-          </a:xfrm>
-          <a:prstGeom prst="roundRect">
-            <a:avLst>
-              <a:gd name="adj" fmla="val 0"/>
-            </a:avLst>
-          </a:prstGeom>
-          <a:solidFill>
-            <a:schemeClr val="bg1"/>
-          </a:solidFill>
-          <a:ln>
-            <a:solidFill>
-              <a:schemeClr val="bg1"/>
-            </a:solidFill>
-          </a:ln>
-        </p:spPr>
-        <p:style>
-          <a:lnRef idx="2">
-            <a:schemeClr val="accent1">
-              <a:shade val="15000"/>
-            </a:schemeClr>
-          </a:lnRef>
-          <a:fillRef idx="1">
-            <a:schemeClr val="accent1"/>
-          </a:fillRef>
-          <a:effectRef idx="0">
-            <a:schemeClr val="accent1"/>
-          </a:effectRef>
-          <a:fontRef idx="minor">
-            <a:schemeClr val="lt1"/>
-          </a:fontRef>
-        </p:style>
-        <p:txBody>
-          <a:bodyPr rtlCol="0" anchor="ctr"/>
-          <a:lstStyle/>
-          <a:p>
-            <a:pPr algn="r"/>
-            <a:r>
-              <a:rPr lang="en-GB" sz="3600" dirty="0">
-                <a:solidFill>
-                  <a:srgbClr val="008000"/>
-                </a:solidFill>
-              </a:rPr>
-              <a:t>Scan Type:</a:t>
-            </a:r>
-          </a:p>
-        </p:txBody>
-      </p:sp>
-      <p:sp>
-        <p:nvSpPr>
-          <p:cNvPr id="8" name="Oval 7">
-            <a:extLst>
-              <a:ext uri="{FF2B5EF4-FFF2-40B4-BE49-F238E27FC236}">
-                <a16:creationId xmlns:a16="http://schemas.microsoft.com/office/drawing/2014/main" id="{8ABEAE2C-BB48-9AB0-AA80-6A59CB8A058A}"/>
-              </a:ext>
-            </a:extLst>
-          </p:cNvPr>
-          <p:cNvSpPr/>
-          <p:nvPr/>
-        </p:nvSpPr>
-        <p:spPr>
-          <a:xfrm>
-            <a:off x="3612482" y="3397932"/>
-            <a:ext cx="372979" cy="372979"/>
-          </a:xfrm>
-          <a:prstGeom prst="ellipse">
-            <a:avLst/>
-          </a:prstGeom>
-          <a:solidFill>
-            <a:srgbClr val="4B0082"/>
-          </a:solidFill>
-          <a:ln>
-            <a:solidFill>
-              <a:srgbClr val="4B0082"/>
-            </a:solidFill>
-          </a:ln>
-        </p:spPr>
-        <p:style>
-          <a:lnRef idx="2">
-            <a:schemeClr val="accent1">
-              <a:shade val="15000"/>
-            </a:schemeClr>
-          </a:lnRef>
-          <a:fillRef idx="1">
-            <a:schemeClr val="accent1"/>
-          </a:fillRef>
-          <a:effectRef idx="0">
-            <a:schemeClr val="accent1"/>
-          </a:effectRef>
-          <a:fontRef idx="minor">
-            <a:schemeClr val="lt1"/>
-          </a:fontRef>
-        </p:style>
-        <p:txBody>
-          <a:bodyPr rtlCol="0" anchor="ctr"/>
-          <a:lstStyle/>
-          <a:p>
-            <a:pPr algn="ctr"/>
-            <a:endParaRPr lang="en-GB"/>
-          </a:p>
-        </p:txBody>
-      </p:sp>
-      <p:sp>
-        <p:nvSpPr>
-          <p:cNvPr id="11" name="Rectangle: Rounded Corners 10">
-            <a:extLst>
-              <a:ext uri="{FF2B5EF4-FFF2-40B4-BE49-F238E27FC236}">
-                <a16:creationId xmlns:a16="http://schemas.microsoft.com/office/drawing/2014/main" id="{69203E8E-3899-7DEF-B5B9-AFE6FAFB78A0}"/>
-              </a:ext>
-            </a:extLst>
-          </p:cNvPr>
-          <p:cNvSpPr/>
-          <p:nvPr/>
-        </p:nvSpPr>
-        <p:spPr>
-          <a:xfrm>
-            <a:off x="50132" y="48127"/>
-            <a:ext cx="12141868" cy="914400"/>
-          </a:xfrm>
-          <a:prstGeom prst="roundRect">
-            <a:avLst>
-              <a:gd name="adj" fmla="val 0"/>
-            </a:avLst>
-          </a:prstGeom>
-          <a:solidFill>
-            <a:schemeClr val="bg1"/>
-          </a:solidFill>
-          <a:ln w="28575">
-            <a:solidFill>
-              <a:srgbClr val="4B0082"/>
-            </a:solidFill>
-          </a:ln>
-        </p:spPr>
-        <p:style>
-          <a:lnRef idx="2">
-            <a:schemeClr val="accent3">
-              <a:shade val="15000"/>
-            </a:schemeClr>
-          </a:lnRef>
-          <a:fillRef idx="1">
-            <a:schemeClr val="accent3"/>
-          </a:fillRef>
-          <a:effectRef idx="0">
-            <a:schemeClr val="accent3"/>
-          </a:effectRef>
-          <a:fontRef idx="minor">
-            <a:schemeClr val="lt1"/>
-          </a:fontRef>
-        </p:style>
-        <p:txBody>
-          <a:bodyPr rtlCol="0" anchor="ctr"/>
-          <a:lstStyle/>
-          <a:p>
-            <a:r>
-              <a:rPr lang="en-GB" sz="3600" b="1" dirty="0">
-                <a:solidFill>
-                  <a:srgbClr val="008000"/>
-                </a:solidFill>
-              </a:rPr>
-              <a:t>World Orbital Prison: MEDICAL SCANNER</a:t>
-            </a:r>
-          </a:p>
-        </p:txBody>
-      </p:sp>
-      <p:sp>
-        <p:nvSpPr>
-          <p:cNvPr id="13" name="Rectangle: Rounded Corners 12">
-            <a:extLst>
-              <a:ext uri="{FF2B5EF4-FFF2-40B4-BE49-F238E27FC236}">
-                <a16:creationId xmlns:a16="http://schemas.microsoft.com/office/drawing/2014/main" id="{C7F7EFA2-A335-FC91-4BC2-49406381FBF5}"/>
-              </a:ext>
-            </a:extLst>
-          </p:cNvPr>
-          <p:cNvSpPr/>
-          <p:nvPr/>
-        </p:nvSpPr>
-        <p:spPr>
-          <a:xfrm>
-            <a:off x="50132" y="962527"/>
-            <a:ext cx="12141868" cy="914400"/>
-          </a:xfrm>
-          <a:prstGeom prst="roundRect">
-            <a:avLst>
-              <a:gd name="adj" fmla="val 0"/>
-            </a:avLst>
-          </a:prstGeom>
-          <a:solidFill>
-            <a:schemeClr val="bg1"/>
-          </a:solidFill>
-          <a:ln w="28575">
-            <a:solidFill>
-              <a:srgbClr val="4B0082"/>
-            </a:solidFill>
-          </a:ln>
-        </p:spPr>
-        <p:style>
-          <a:lnRef idx="2">
-            <a:schemeClr val="accent3">
-              <a:shade val="15000"/>
-            </a:schemeClr>
-          </a:lnRef>
-          <a:fillRef idx="1">
-            <a:schemeClr val="accent3"/>
-          </a:fillRef>
-          <a:effectRef idx="0">
-            <a:schemeClr val="accent3"/>
-          </a:effectRef>
-          <a:fontRef idx="minor">
-            <a:schemeClr val="lt1"/>
-          </a:fontRef>
-        </p:style>
-        <p:txBody>
-          <a:bodyPr rtlCol="0" anchor="ctr"/>
-          <a:lstStyle/>
-          <a:p>
-            <a:r>
-              <a:rPr lang="en-GB" sz="2400" dirty="0">
-                <a:solidFill>
-                  <a:srgbClr val="008000"/>
-                </a:solidFill>
-              </a:rPr>
-              <a:t>File   Home   </a:t>
-            </a:r>
-            <a:r>
-              <a:rPr lang="en-GB" sz="2400" u="sng" dirty="0">
-                <a:solidFill>
-                  <a:srgbClr val="008000"/>
-                </a:solidFill>
-              </a:rPr>
-              <a:t>Scan</a:t>
-            </a:r>
-            <a:r>
-              <a:rPr lang="en-GB" sz="2400" dirty="0">
-                <a:solidFill>
-                  <a:srgbClr val="008000"/>
-                </a:solidFill>
-              </a:rPr>
-              <a:t>   Help</a:t>
-            </a:r>
-          </a:p>
-        </p:txBody>
-      </p:sp>
-      <p:sp>
-        <p:nvSpPr>
-          <p:cNvPr id="14" name="TextBox 13">
-            <a:extLst>
-              <a:ext uri="{FF2B5EF4-FFF2-40B4-BE49-F238E27FC236}">
-                <a16:creationId xmlns:a16="http://schemas.microsoft.com/office/drawing/2014/main" id="{893694E0-B460-29FA-859C-6F619630ECAD}"/>
-              </a:ext>
-            </a:extLst>
-          </p:cNvPr>
-          <p:cNvSpPr txBox="1"/>
-          <p:nvPr/>
-        </p:nvSpPr>
-        <p:spPr>
-          <a:xfrm>
-            <a:off x="4033587" y="3230478"/>
-            <a:ext cx="5871410" cy="707886"/>
-          </a:xfrm>
-          <a:prstGeom prst="rect">
-            <a:avLst/>
-          </a:prstGeom>
-          <a:noFill/>
-        </p:spPr>
-        <p:txBody>
-          <a:bodyPr wrap="square" rtlCol="0">
-            <a:spAutoFit/>
-          </a:bodyPr>
-          <a:lstStyle/>
-          <a:p>
-            <a:r>
-              <a:rPr lang="en-GB" sz="4000" dirty="0">
-                <a:solidFill>
-                  <a:srgbClr val="008000"/>
-                </a:solidFill>
-              </a:rPr>
-              <a:t>Prisoner Induction</a:t>
-            </a:r>
-          </a:p>
-        </p:txBody>
-      </p:sp>
-      <p:sp>
-        <p:nvSpPr>
-          <p:cNvPr id="15" name="Oval 14">
-            <a:extLst>
-              <a:ext uri="{FF2B5EF4-FFF2-40B4-BE49-F238E27FC236}">
-                <a16:creationId xmlns:a16="http://schemas.microsoft.com/office/drawing/2014/main" id="{4B4783B0-6505-9F2C-3FF4-20AAD97201FA}"/>
-              </a:ext>
-            </a:extLst>
-          </p:cNvPr>
-          <p:cNvSpPr/>
-          <p:nvPr/>
-        </p:nvSpPr>
-        <p:spPr>
-          <a:xfrm>
-            <a:off x="3612482" y="4105818"/>
-            <a:ext cx="372979" cy="372979"/>
-          </a:xfrm>
-          <a:prstGeom prst="ellipse">
-            <a:avLst/>
-          </a:prstGeom>
-          <a:noFill/>
-          <a:ln>
-            <a:solidFill>
-              <a:srgbClr val="4B0082"/>
-            </a:solidFill>
-          </a:ln>
-        </p:spPr>
-        <p:style>
-          <a:lnRef idx="2">
-            <a:schemeClr val="accent1">
-              <a:shade val="15000"/>
-            </a:schemeClr>
-          </a:lnRef>
-          <a:fillRef idx="1">
-            <a:schemeClr val="accent1"/>
-          </a:fillRef>
-          <a:effectRef idx="0">
-            <a:schemeClr val="accent1"/>
-          </a:effectRef>
-          <a:fontRef idx="minor">
-            <a:schemeClr val="lt1"/>
-          </a:fontRef>
-        </p:style>
-        <p:txBody>
-          <a:bodyPr rtlCol="0" anchor="ctr"/>
-          <a:lstStyle/>
-          <a:p>
-            <a:pPr algn="ctr"/>
-            <a:endParaRPr lang="en-GB"/>
-          </a:p>
-        </p:txBody>
-      </p:sp>
-      <p:sp>
-        <p:nvSpPr>
-          <p:cNvPr id="16" name="TextBox 15">
-            <a:extLst>
-              <a:ext uri="{FF2B5EF4-FFF2-40B4-BE49-F238E27FC236}">
-                <a16:creationId xmlns:a16="http://schemas.microsoft.com/office/drawing/2014/main" id="{87C98B18-824A-2437-D0FC-ED2F53373D31}"/>
-              </a:ext>
-            </a:extLst>
-          </p:cNvPr>
-          <p:cNvSpPr txBox="1"/>
-          <p:nvPr/>
-        </p:nvSpPr>
-        <p:spPr>
-          <a:xfrm>
-            <a:off x="4033587" y="3938364"/>
-            <a:ext cx="5871410" cy="707886"/>
-          </a:xfrm>
-          <a:prstGeom prst="rect">
-            <a:avLst/>
-          </a:prstGeom>
-          <a:noFill/>
-        </p:spPr>
-        <p:txBody>
-          <a:bodyPr wrap="square" rtlCol="0">
-            <a:spAutoFit/>
-          </a:bodyPr>
-          <a:lstStyle/>
-          <a:p>
-            <a:r>
-              <a:rPr lang="en-GB" sz="4000" dirty="0">
-                <a:solidFill>
-                  <a:srgbClr val="008000"/>
-                </a:solidFill>
-              </a:rPr>
-              <a:t>Annual Checkup</a:t>
-            </a:r>
-          </a:p>
-        </p:txBody>
-      </p:sp>
-      <p:sp>
-        <p:nvSpPr>
-          <p:cNvPr id="17" name="Oval 16">
-            <a:extLst>
-              <a:ext uri="{FF2B5EF4-FFF2-40B4-BE49-F238E27FC236}">
-                <a16:creationId xmlns:a16="http://schemas.microsoft.com/office/drawing/2014/main" id="{F25B24A7-43F2-BE6F-8B99-044E40DCD157}"/>
-              </a:ext>
-            </a:extLst>
-          </p:cNvPr>
-          <p:cNvSpPr/>
-          <p:nvPr/>
-        </p:nvSpPr>
-        <p:spPr>
-          <a:xfrm>
-            <a:off x="3612482" y="4813704"/>
-            <a:ext cx="372979" cy="372979"/>
-          </a:xfrm>
-          <a:prstGeom prst="ellipse">
-            <a:avLst/>
-          </a:prstGeom>
-          <a:noFill/>
-          <a:ln>
-            <a:solidFill>
-              <a:srgbClr val="4B0082"/>
-            </a:solidFill>
-          </a:ln>
-        </p:spPr>
-        <p:style>
-          <a:lnRef idx="2">
-            <a:schemeClr val="accent1">
-              <a:shade val="15000"/>
-            </a:schemeClr>
-          </a:lnRef>
-          <a:fillRef idx="1">
-            <a:schemeClr val="accent1"/>
-          </a:fillRef>
-          <a:effectRef idx="0">
-            <a:schemeClr val="accent1"/>
-          </a:effectRef>
-          <a:fontRef idx="minor">
-            <a:schemeClr val="lt1"/>
-          </a:fontRef>
-        </p:style>
-        <p:txBody>
-          <a:bodyPr rtlCol="0" anchor="ctr"/>
-          <a:lstStyle/>
-          <a:p>
-            <a:pPr algn="ctr"/>
-            <a:endParaRPr lang="en-GB"/>
-          </a:p>
-        </p:txBody>
-      </p:sp>
-      <p:sp>
-        <p:nvSpPr>
-          <p:cNvPr id="18" name="TextBox 17">
-            <a:extLst>
-              <a:ext uri="{FF2B5EF4-FFF2-40B4-BE49-F238E27FC236}">
-                <a16:creationId xmlns:a16="http://schemas.microsoft.com/office/drawing/2014/main" id="{4D94A277-271C-9849-A13D-9C1AE3228BDC}"/>
-              </a:ext>
-            </a:extLst>
-          </p:cNvPr>
-          <p:cNvSpPr txBox="1"/>
-          <p:nvPr/>
-        </p:nvSpPr>
-        <p:spPr>
-          <a:xfrm>
-            <a:off x="4033587" y="4646250"/>
-            <a:ext cx="5871410" cy="707886"/>
-          </a:xfrm>
-          <a:prstGeom prst="rect">
-            <a:avLst/>
-          </a:prstGeom>
-          <a:noFill/>
-        </p:spPr>
-        <p:txBody>
-          <a:bodyPr wrap="square" rtlCol="0">
-            <a:spAutoFit/>
-          </a:bodyPr>
-          <a:lstStyle/>
-          <a:p>
-            <a:r>
-              <a:rPr lang="en-GB" sz="4000" dirty="0">
-                <a:solidFill>
-                  <a:srgbClr val="008000"/>
-                </a:solidFill>
-              </a:rPr>
-              <a:t>Prohibited Substances</a:t>
-            </a:r>
-          </a:p>
-        </p:txBody>
-      </p:sp>
-      <p:sp>
-        <p:nvSpPr>
-          <p:cNvPr id="19" name="Oval 18">
-            <a:extLst>
-              <a:ext uri="{FF2B5EF4-FFF2-40B4-BE49-F238E27FC236}">
-                <a16:creationId xmlns:a16="http://schemas.microsoft.com/office/drawing/2014/main" id="{F5125C39-B877-818B-1B32-61E340B21022}"/>
-              </a:ext>
-            </a:extLst>
-          </p:cNvPr>
-          <p:cNvSpPr/>
-          <p:nvPr/>
-        </p:nvSpPr>
-        <p:spPr>
-          <a:xfrm>
-            <a:off x="3612482" y="5517635"/>
-            <a:ext cx="372979" cy="372979"/>
-          </a:xfrm>
-          <a:prstGeom prst="ellipse">
-            <a:avLst/>
-          </a:prstGeom>
-          <a:noFill/>
-          <a:ln>
-            <a:solidFill>
-              <a:srgbClr val="4B0082"/>
-            </a:solidFill>
-          </a:ln>
-        </p:spPr>
-        <p:style>
-          <a:lnRef idx="2">
-            <a:schemeClr val="accent1">
-              <a:shade val="15000"/>
-            </a:schemeClr>
-          </a:lnRef>
-          <a:fillRef idx="1">
-            <a:schemeClr val="accent1"/>
-          </a:fillRef>
-          <a:effectRef idx="0">
-            <a:schemeClr val="accent1"/>
-          </a:effectRef>
-          <a:fontRef idx="minor">
-            <a:schemeClr val="lt1"/>
-          </a:fontRef>
-        </p:style>
-        <p:txBody>
-          <a:bodyPr rtlCol="0" anchor="ctr"/>
-          <a:lstStyle/>
-          <a:p>
-            <a:pPr algn="ctr"/>
-            <a:endParaRPr lang="en-GB"/>
-          </a:p>
-        </p:txBody>
-      </p:sp>
-      <p:sp>
-        <p:nvSpPr>
-          <p:cNvPr id="20" name="TextBox 19">
-            <a:extLst>
-              <a:ext uri="{FF2B5EF4-FFF2-40B4-BE49-F238E27FC236}">
-                <a16:creationId xmlns:a16="http://schemas.microsoft.com/office/drawing/2014/main" id="{A4CBE8CC-41A1-B8A1-55B3-6EB8427E677F}"/>
-              </a:ext>
-            </a:extLst>
-          </p:cNvPr>
-          <p:cNvSpPr txBox="1"/>
-          <p:nvPr/>
-        </p:nvSpPr>
-        <p:spPr>
-          <a:xfrm>
-            <a:off x="4033587" y="5350181"/>
-            <a:ext cx="5871410" cy="707886"/>
-          </a:xfrm>
-          <a:prstGeom prst="rect">
-            <a:avLst/>
-          </a:prstGeom>
-          <a:noFill/>
-        </p:spPr>
-        <p:txBody>
-          <a:bodyPr wrap="square" rtlCol="0">
-            <a:spAutoFit/>
-          </a:bodyPr>
-          <a:lstStyle/>
-          <a:p>
-            <a:r>
-              <a:rPr lang="en-GB" sz="4000" dirty="0">
-                <a:solidFill>
-                  <a:srgbClr val="008000"/>
-                </a:solidFill>
-              </a:rPr>
-              <a:t>Prisoner Release</a:t>
+              <a:t>Process</a:t>
             </a:r>
           </a:p>
         </p:txBody>
@@ -7213,7 +9386,7 @@
     </p:spTree>
     <p:extLst>
       <p:ext uri="{BB962C8B-B14F-4D97-AF65-F5344CB8AC3E}">
-        <p14:creationId xmlns:p14="http://schemas.microsoft.com/office/powerpoint/2010/main" val="1081667882"/>
+        <p14:creationId xmlns:p14="http://schemas.microsoft.com/office/powerpoint/2010/main" val="1670483054"/>
       </p:ext>
     </p:extLst>
   </p:cSld>

</xml_diff>

<commit_message>
Induction quest working with messages and voiceover
Update to the Game Message styling
</commit_message>
<xml_diff>
--- a/Assets/Materials + Textures/Personal/Roomnames/Roomnames.pptx
+++ b/Assets/Materials + Textures/Personal/Roomnames/Roomnames.pptx
@@ -16,8 +16,9 @@
     <p:sldId id="258" r:id="rId10"/>
     <p:sldId id="259" r:id="rId11"/>
     <p:sldId id="266" r:id="rId12"/>
-    <p:sldId id="267" r:id="rId13"/>
-    <p:sldId id="268" r:id="rId14"/>
+    <p:sldId id="270" r:id="rId13"/>
+    <p:sldId id="267" r:id="rId14"/>
+    <p:sldId id="268" r:id="rId15"/>
   </p:sldIdLst>
   <p:sldSz cx="12192000" cy="6858000"/>
   <p:notesSz cx="6858000" cy="9144000"/>
@@ -273,7 +274,7 @@
           <a:p>
             <a:fld id="{14389514-1D2E-45F5-8DC5-A75A64E20C29}" type="datetimeFigureOut">
               <a:rPr lang="en-GB" smtClean="0"/>
-              <a:t>18/10/2025</a:t>
+              <a:t>20/10/2025</a:t>
             </a:fld>
             <a:endParaRPr lang="en-GB"/>
           </a:p>
@@ -473,7 +474,7 @@
           <a:p>
             <a:fld id="{14389514-1D2E-45F5-8DC5-A75A64E20C29}" type="datetimeFigureOut">
               <a:rPr lang="en-GB" smtClean="0"/>
-              <a:t>18/10/2025</a:t>
+              <a:t>20/10/2025</a:t>
             </a:fld>
             <a:endParaRPr lang="en-GB"/>
           </a:p>
@@ -683,7 +684,7 @@
           <a:p>
             <a:fld id="{14389514-1D2E-45F5-8DC5-A75A64E20C29}" type="datetimeFigureOut">
               <a:rPr lang="en-GB" smtClean="0"/>
-              <a:t>18/10/2025</a:t>
+              <a:t>20/10/2025</a:t>
             </a:fld>
             <a:endParaRPr lang="en-GB"/>
           </a:p>
@@ -883,7 +884,7 @@
           <a:p>
             <a:fld id="{14389514-1D2E-45F5-8DC5-A75A64E20C29}" type="datetimeFigureOut">
               <a:rPr lang="en-GB" smtClean="0"/>
-              <a:t>18/10/2025</a:t>
+              <a:t>20/10/2025</a:t>
             </a:fld>
             <a:endParaRPr lang="en-GB"/>
           </a:p>
@@ -1159,7 +1160,7 @@
           <a:p>
             <a:fld id="{14389514-1D2E-45F5-8DC5-A75A64E20C29}" type="datetimeFigureOut">
               <a:rPr lang="en-GB" smtClean="0"/>
-              <a:t>18/10/2025</a:t>
+              <a:t>20/10/2025</a:t>
             </a:fld>
             <a:endParaRPr lang="en-GB"/>
           </a:p>
@@ -1427,7 +1428,7 @@
           <a:p>
             <a:fld id="{14389514-1D2E-45F5-8DC5-A75A64E20C29}" type="datetimeFigureOut">
               <a:rPr lang="en-GB" smtClean="0"/>
-              <a:t>18/10/2025</a:t>
+              <a:t>20/10/2025</a:t>
             </a:fld>
             <a:endParaRPr lang="en-GB"/>
           </a:p>
@@ -1842,7 +1843,7 @@
           <a:p>
             <a:fld id="{14389514-1D2E-45F5-8DC5-A75A64E20C29}" type="datetimeFigureOut">
               <a:rPr lang="en-GB" smtClean="0"/>
-              <a:t>18/10/2025</a:t>
+              <a:t>20/10/2025</a:t>
             </a:fld>
             <a:endParaRPr lang="en-GB"/>
           </a:p>
@@ -1984,7 +1985,7 @@
           <a:p>
             <a:fld id="{14389514-1D2E-45F5-8DC5-A75A64E20C29}" type="datetimeFigureOut">
               <a:rPr lang="en-GB" smtClean="0"/>
-              <a:t>18/10/2025</a:t>
+              <a:t>20/10/2025</a:t>
             </a:fld>
             <a:endParaRPr lang="en-GB"/>
           </a:p>
@@ -2097,7 +2098,7 @@
           <a:p>
             <a:fld id="{14389514-1D2E-45F5-8DC5-A75A64E20C29}" type="datetimeFigureOut">
               <a:rPr lang="en-GB" smtClean="0"/>
-              <a:t>18/10/2025</a:t>
+              <a:t>20/10/2025</a:t>
             </a:fld>
             <a:endParaRPr lang="en-GB"/>
           </a:p>
@@ -2410,7 +2411,7 @@
           <a:p>
             <a:fld id="{14389514-1D2E-45F5-8DC5-A75A64E20C29}" type="datetimeFigureOut">
               <a:rPr lang="en-GB" smtClean="0"/>
-              <a:t>18/10/2025</a:t>
+              <a:t>20/10/2025</a:t>
             </a:fld>
             <a:endParaRPr lang="en-GB"/>
           </a:p>
@@ -2699,7 +2700,7 @@
           <a:p>
             <a:fld id="{14389514-1D2E-45F5-8DC5-A75A64E20C29}" type="datetimeFigureOut">
               <a:rPr lang="en-GB" smtClean="0"/>
-              <a:t>18/10/2025</a:t>
+              <a:t>20/10/2025</a:t>
             </a:fld>
             <a:endParaRPr lang="en-GB"/>
           </a:p>
@@ -2942,7 +2943,7 @@
           <a:p>
             <a:fld id="{14389514-1D2E-45F5-8DC5-A75A64E20C29}" type="datetimeFigureOut">
               <a:rPr lang="en-GB" smtClean="0"/>
-              <a:t>18/10/2025</a:t>
+              <a:t>20/10/2025</a:t>
             </a:fld>
             <a:endParaRPr lang="en-GB"/>
           </a:p>
@@ -7323,10 +7324,10 @@
       </p:grpSpPr>
       <p:sp>
         <p:nvSpPr>
-          <p:cNvPr id="2" name="Rectangle 1">
-            <a:extLst>
-              <a:ext uri="{FF2B5EF4-FFF2-40B4-BE49-F238E27FC236}">
-                <a16:creationId xmlns:a16="http://schemas.microsoft.com/office/drawing/2014/main" id="{386690CD-4364-C29C-39CE-4E90A5DDF899}"/>
+          <p:cNvPr id="2" name="Arrow: Left 1">
+            <a:extLst>
+              <a:ext uri="{FF2B5EF4-FFF2-40B4-BE49-F238E27FC236}">
+                <a16:creationId xmlns:a16="http://schemas.microsoft.com/office/drawing/2014/main" id="{56BDB5AE-8899-5204-65FF-34846270FA99}"/>
               </a:ext>
             </a:extLst>
           </p:cNvPr>
@@ -7335,32 +7336,24 @@
         </p:nvSpPr>
         <p:spPr>
           <a:xfrm>
-            <a:off x="16639" y="0"/>
-            <a:ext cx="3888000" cy="3384000"/>
-          </a:xfrm>
-          <a:prstGeom prst="rect">
-            <a:avLst/>
-          </a:prstGeom>
-          <a:solidFill>
-            <a:schemeClr val="bg1"/>
-          </a:solidFill>
-          <a:ln>
-            <a:solidFill>
-              <a:schemeClr val="tx1"/>
-            </a:solidFill>
-          </a:ln>
+            <a:off x="0" y="1826990"/>
+            <a:ext cx="12192000" cy="2234534"/>
+          </a:xfrm>
+          <a:prstGeom prst="leftArrow">
+            <a:avLst/>
+          </a:prstGeom>
         </p:spPr>
         <p:style>
           <a:lnRef idx="2">
-            <a:schemeClr val="accent1">
+            <a:schemeClr val="dk1">
               <a:shade val="15000"/>
             </a:schemeClr>
           </a:lnRef>
           <a:fillRef idx="1">
-            <a:schemeClr val="accent1"/>
+            <a:schemeClr val="dk1"/>
           </a:fillRef>
           <a:effectRef idx="0">
-            <a:schemeClr val="accent1"/>
+            <a:schemeClr val="dk1"/>
           </a:effectRef>
           <a:fontRef idx="minor">
             <a:schemeClr val="lt1"/>
@@ -7372,390 +7365,12 @@
           <a:p>
             <a:pPr algn="ctr"/>
             <a:r>
-              <a:rPr lang="en-GB" sz="3600" b="1" dirty="0">
+              <a:rPr lang="en-GB" sz="8000" dirty="0">
                 <a:solidFill>
-                  <a:schemeClr val="tx1"/>
+                  <a:schemeClr val="bg1"/>
                 </a:solidFill>
-                <a:latin typeface="Ink Free" panose="03080402000500000000" pitchFamily="66" charset="0"/>
               </a:rPr>
-              <a:t>Prisoner</a:t>
-            </a:r>
-          </a:p>
-          <a:p>
-            <a:pPr algn="ctr"/>
-            <a:r>
-              <a:rPr lang="en-GB" sz="3600" b="1" dirty="0">
-                <a:solidFill>
-                  <a:schemeClr val="tx1"/>
-                </a:solidFill>
-                <a:latin typeface="Ink Free" panose="03080402000500000000" pitchFamily="66" charset="0"/>
-              </a:rPr>
-              <a:t>Property</a:t>
-            </a:r>
-          </a:p>
-          <a:p>
-            <a:pPr algn="ctr"/>
-            <a:r>
-              <a:rPr lang="en-GB" sz="3600" b="1" dirty="0">
-                <a:solidFill>
-                  <a:schemeClr val="tx1"/>
-                </a:solidFill>
-                <a:latin typeface="Ink Free" panose="03080402000500000000" pitchFamily="66" charset="0"/>
-              </a:rPr>
-              <a:t>Log</a:t>
-            </a:r>
-          </a:p>
-          <a:p>
-            <a:pPr algn="ctr"/>
-            <a:endParaRPr lang="en-GB" sz="3600" b="1" dirty="0">
-              <a:solidFill>
-                <a:schemeClr val="tx1"/>
-              </a:solidFill>
-              <a:latin typeface="Ink Free" panose="03080402000500000000" pitchFamily="66" charset="0"/>
-            </a:endParaRPr>
-          </a:p>
-          <a:p>
-            <a:pPr algn="ctr"/>
-            <a:r>
-              <a:rPr lang="en-GB" sz="3600" b="1" dirty="0">
-                <a:solidFill>
-                  <a:schemeClr val="tx1"/>
-                </a:solidFill>
-                <a:latin typeface="Ink Free" panose="03080402000500000000" pitchFamily="66" charset="0"/>
-              </a:rPr>
-              <a:t>DO NOT REMOVE</a:t>
-            </a:r>
-          </a:p>
-        </p:txBody>
-      </p:sp>
-      <p:sp>
-        <p:nvSpPr>
-          <p:cNvPr id="3" name="Rectangle 2">
-            <a:extLst>
-              <a:ext uri="{FF2B5EF4-FFF2-40B4-BE49-F238E27FC236}">
-                <a16:creationId xmlns:a16="http://schemas.microsoft.com/office/drawing/2014/main" id="{D98F959B-C84B-9873-5029-8E2E022104EE}"/>
-              </a:ext>
-            </a:extLst>
-          </p:cNvPr>
-          <p:cNvSpPr/>
-          <p:nvPr/>
-        </p:nvSpPr>
-        <p:spPr>
-          <a:xfrm>
-            <a:off x="4420639" y="0"/>
-            <a:ext cx="1814400" cy="2890800"/>
-          </a:xfrm>
-          <a:prstGeom prst="rect">
-            <a:avLst/>
-          </a:prstGeom>
-          <a:solidFill>
-            <a:schemeClr val="bg1"/>
-          </a:solidFill>
-          <a:ln>
-            <a:solidFill>
-              <a:schemeClr val="tx1"/>
-            </a:solidFill>
-          </a:ln>
-        </p:spPr>
-        <p:style>
-          <a:lnRef idx="2">
-            <a:schemeClr val="accent1">
-              <a:shade val="15000"/>
-            </a:schemeClr>
-          </a:lnRef>
-          <a:fillRef idx="1">
-            <a:schemeClr val="accent1"/>
-          </a:fillRef>
-          <a:effectRef idx="0">
-            <a:schemeClr val="accent1"/>
-          </a:effectRef>
-          <a:fontRef idx="minor">
-            <a:schemeClr val="lt1"/>
-          </a:fontRef>
-        </p:style>
-        <p:txBody>
-          <a:bodyPr rtlCol="0" anchor="t"/>
-          <a:lstStyle/>
-          <a:p>
-            <a:pPr algn="ctr"/>
-            <a:r>
-              <a:rPr lang="en-GB" sz="3200" b="1" dirty="0">
-                <a:solidFill>
-                  <a:schemeClr val="tx1"/>
-                </a:solidFill>
-                <a:latin typeface="Ink Free" panose="03080402000500000000" pitchFamily="66" charset="0"/>
-              </a:rPr>
-              <a:t>Prisoner Property Log</a:t>
-            </a:r>
-          </a:p>
-          <a:p>
-            <a:pPr algn="ctr"/>
-            <a:endParaRPr lang="en-GB" sz="3200" b="1" dirty="0">
-              <a:solidFill>
-                <a:schemeClr val="tx1"/>
-              </a:solidFill>
-              <a:latin typeface="Ink Free" panose="03080402000500000000" pitchFamily="66" charset="0"/>
-            </a:endParaRPr>
-          </a:p>
-          <a:p>
-            <a:pPr algn="ctr"/>
-            <a:r>
-              <a:rPr lang="en-GB" sz="3200" b="1" dirty="0">
-                <a:solidFill>
-                  <a:schemeClr val="tx1"/>
-                </a:solidFill>
-                <a:latin typeface="Ink Free" panose="03080402000500000000" pitchFamily="66" charset="0"/>
-              </a:rPr>
-              <a:t>A to G</a:t>
-            </a:r>
-          </a:p>
-        </p:txBody>
-      </p:sp>
-      <p:sp>
-        <p:nvSpPr>
-          <p:cNvPr id="5" name="Rectangle 4">
-            <a:extLst>
-              <a:ext uri="{FF2B5EF4-FFF2-40B4-BE49-F238E27FC236}">
-                <a16:creationId xmlns:a16="http://schemas.microsoft.com/office/drawing/2014/main" id="{B2B5AB23-B448-DCD5-F814-E14DDDC39E92}"/>
-              </a:ext>
-            </a:extLst>
-          </p:cNvPr>
-          <p:cNvSpPr/>
-          <p:nvPr/>
-        </p:nvSpPr>
-        <p:spPr>
-          <a:xfrm>
-            <a:off x="6407701" y="0"/>
-            <a:ext cx="1814400" cy="2890800"/>
-          </a:xfrm>
-          <a:prstGeom prst="rect">
-            <a:avLst/>
-          </a:prstGeom>
-          <a:solidFill>
-            <a:schemeClr val="bg1"/>
-          </a:solidFill>
-          <a:ln>
-            <a:solidFill>
-              <a:schemeClr val="tx1"/>
-            </a:solidFill>
-          </a:ln>
-        </p:spPr>
-        <p:style>
-          <a:lnRef idx="2">
-            <a:schemeClr val="accent1">
-              <a:shade val="15000"/>
-            </a:schemeClr>
-          </a:lnRef>
-          <a:fillRef idx="1">
-            <a:schemeClr val="accent1"/>
-          </a:fillRef>
-          <a:effectRef idx="0">
-            <a:schemeClr val="accent1"/>
-          </a:effectRef>
-          <a:fontRef idx="minor">
-            <a:schemeClr val="lt1"/>
-          </a:fontRef>
-        </p:style>
-        <p:txBody>
-          <a:bodyPr rtlCol="0" anchor="t"/>
-          <a:lstStyle/>
-          <a:p>
-            <a:pPr algn="ctr"/>
-            <a:r>
-              <a:rPr lang="en-GB" sz="3200" b="1" dirty="0">
-                <a:solidFill>
-                  <a:schemeClr val="tx1"/>
-                </a:solidFill>
-                <a:latin typeface="Ink Free" panose="03080402000500000000" pitchFamily="66" charset="0"/>
-              </a:rPr>
-              <a:t>Prisoner Property Log</a:t>
-            </a:r>
-          </a:p>
-          <a:p>
-            <a:pPr algn="ctr"/>
-            <a:endParaRPr lang="en-GB" sz="3200" b="1" dirty="0">
-              <a:solidFill>
-                <a:schemeClr val="tx1"/>
-              </a:solidFill>
-              <a:latin typeface="Ink Free" panose="03080402000500000000" pitchFamily="66" charset="0"/>
-            </a:endParaRPr>
-          </a:p>
-          <a:p>
-            <a:pPr algn="ctr"/>
-            <a:r>
-              <a:rPr lang="en-GB" sz="3200" b="1" dirty="0">
-                <a:solidFill>
-                  <a:schemeClr val="tx1"/>
-                </a:solidFill>
-                <a:latin typeface="Ink Free" panose="03080402000500000000" pitchFamily="66" charset="0"/>
-              </a:rPr>
-              <a:t>H to M</a:t>
-            </a:r>
-          </a:p>
-        </p:txBody>
-      </p:sp>
-      <p:sp>
-        <p:nvSpPr>
-          <p:cNvPr id="6" name="Rectangle 5">
-            <a:extLst>
-              <a:ext uri="{FF2B5EF4-FFF2-40B4-BE49-F238E27FC236}">
-                <a16:creationId xmlns:a16="http://schemas.microsoft.com/office/drawing/2014/main" id="{0AA5D6CD-244B-1AF2-F9CC-13590DDFB58B}"/>
-              </a:ext>
-            </a:extLst>
-          </p:cNvPr>
-          <p:cNvSpPr/>
-          <p:nvPr/>
-        </p:nvSpPr>
-        <p:spPr>
-          <a:xfrm>
-            <a:off x="8328820" y="0"/>
-            <a:ext cx="1814400" cy="2890800"/>
-          </a:xfrm>
-          <a:prstGeom prst="rect">
-            <a:avLst/>
-          </a:prstGeom>
-          <a:solidFill>
-            <a:schemeClr val="bg1"/>
-          </a:solidFill>
-          <a:ln>
-            <a:solidFill>
-              <a:schemeClr val="tx1"/>
-            </a:solidFill>
-          </a:ln>
-        </p:spPr>
-        <p:style>
-          <a:lnRef idx="2">
-            <a:schemeClr val="accent1">
-              <a:shade val="15000"/>
-            </a:schemeClr>
-          </a:lnRef>
-          <a:fillRef idx="1">
-            <a:schemeClr val="accent1"/>
-          </a:fillRef>
-          <a:effectRef idx="0">
-            <a:schemeClr val="accent1"/>
-          </a:effectRef>
-          <a:fontRef idx="minor">
-            <a:schemeClr val="lt1"/>
-          </a:fontRef>
-        </p:style>
-        <p:txBody>
-          <a:bodyPr rtlCol="0" anchor="t"/>
-          <a:lstStyle/>
-          <a:p>
-            <a:pPr algn="ctr"/>
-            <a:r>
-              <a:rPr lang="en-GB" sz="3200" b="1" dirty="0">
-                <a:solidFill>
-                  <a:schemeClr val="tx1"/>
-                </a:solidFill>
-                <a:latin typeface="Ink Free" panose="03080402000500000000" pitchFamily="66" charset="0"/>
-              </a:rPr>
-              <a:t>Prisoner Property Log</a:t>
-            </a:r>
-          </a:p>
-          <a:p>
-            <a:pPr algn="ctr"/>
-            <a:endParaRPr lang="en-GB" sz="3200" b="1" dirty="0">
-              <a:solidFill>
-                <a:schemeClr val="tx1"/>
-              </a:solidFill>
-              <a:latin typeface="Ink Free" panose="03080402000500000000" pitchFamily="66" charset="0"/>
-            </a:endParaRPr>
-          </a:p>
-          <a:p>
-            <a:pPr algn="ctr"/>
-            <a:r>
-              <a:rPr lang="en-GB" sz="3200" b="1" dirty="0">
-                <a:solidFill>
-                  <a:schemeClr val="tx1"/>
-                </a:solidFill>
-                <a:latin typeface="Ink Free" panose="03080402000500000000" pitchFamily="66" charset="0"/>
-              </a:rPr>
-              <a:t>N to S</a:t>
-            </a:r>
-          </a:p>
-        </p:txBody>
-      </p:sp>
-      <p:sp>
-        <p:nvSpPr>
-          <p:cNvPr id="7" name="Rectangle 6">
-            <a:extLst>
-              <a:ext uri="{FF2B5EF4-FFF2-40B4-BE49-F238E27FC236}">
-                <a16:creationId xmlns:a16="http://schemas.microsoft.com/office/drawing/2014/main" id="{42900016-3906-3F54-B656-71124F0F5C9C}"/>
-              </a:ext>
-            </a:extLst>
-          </p:cNvPr>
-          <p:cNvSpPr/>
-          <p:nvPr/>
-        </p:nvSpPr>
-        <p:spPr>
-          <a:xfrm>
-            <a:off x="10189339" y="0"/>
-            <a:ext cx="1814400" cy="2890800"/>
-          </a:xfrm>
-          <a:prstGeom prst="rect">
-            <a:avLst/>
-          </a:prstGeom>
-          <a:solidFill>
-            <a:schemeClr val="bg1"/>
-          </a:solidFill>
-          <a:ln>
-            <a:solidFill>
-              <a:schemeClr val="tx1"/>
-            </a:solidFill>
-          </a:ln>
-        </p:spPr>
-        <p:style>
-          <a:lnRef idx="2">
-            <a:schemeClr val="accent1">
-              <a:shade val="15000"/>
-            </a:schemeClr>
-          </a:lnRef>
-          <a:fillRef idx="1">
-            <a:schemeClr val="accent1"/>
-          </a:fillRef>
-          <a:effectRef idx="0">
-            <a:schemeClr val="accent1"/>
-          </a:effectRef>
-          <a:fontRef idx="minor">
-            <a:schemeClr val="lt1"/>
-          </a:fontRef>
-        </p:style>
-        <p:txBody>
-          <a:bodyPr rtlCol="0" anchor="t"/>
-          <a:lstStyle/>
-          <a:p>
-            <a:pPr algn="ctr"/>
-            <a:r>
-              <a:rPr lang="en-GB" sz="3200" b="1" dirty="0">
-                <a:solidFill>
-                  <a:schemeClr val="tx1"/>
-                </a:solidFill>
-                <a:latin typeface="Ink Free" panose="03080402000500000000" pitchFamily="66" charset="0"/>
-              </a:rPr>
-              <a:t>Prisoner Property Log</a:t>
-            </a:r>
-          </a:p>
-          <a:p>
-            <a:pPr algn="ctr"/>
-            <a:endParaRPr lang="en-GB" sz="3200" b="1" dirty="0">
-              <a:solidFill>
-                <a:schemeClr val="tx1"/>
-              </a:solidFill>
-              <a:latin typeface="Ink Free" panose="03080402000500000000" pitchFamily="66" charset="0"/>
-            </a:endParaRPr>
-          </a:p>
-          <a:p>
-            <a:pPr algn="ctr"/>
-            <a:r>
-              <a:rPr lang="en-GB" sz="3200" b="1" dirty="0">
-                <a:solidFill>
-                  <a:schemeClr val="tx1"/>
-                </a:solidFill>
-                <a:latin typeface="Ink Free" panose="03080402000500000000" pitchFamily="66" charset="0"/>
-              </a:rPr>
-              <a:t>T to Z</a:t>
+              <a:t>To the cells</a:t>
             </a:r>
           </a:p>
         </p:txBody>
@@ -7763,7 +7378,7 @@
     </p:spTree>
     <p:extLst>
       <p:ext uri="{BB962C8B-B14F-4D97-AF65-F5344CB8AC3E}">
-        <p14:creationId xmlns:p14="http://schemas.microsoft.com/office/powerpoint/2010/main" val="753657027"/>
+        <p14:creationId xmlns:p14="http://schemas.microsoft.com/office/powerpoint/2010/main" val="347006527"/>
       </p:ext>
     </p:extLst>
   </p:cSld>
@@ -7792,6 +7407,475 @@
       </p:grpSpPr>
       <p:sp>
         <p:nvSpPr>
+          <p:cNvPr id="2" name="Rectangle 1">
+            <a:extLst>
+              <a:ext uri="{FF2B5EF4-FFF2-40B4-BE49-F238E27FC236}">
+                <a16:creationId xmlns:a16="http://schemas.microsoft.com/office/drawing/2014/main" id="{386690CD-4364-C29C-39CE-4E90A5DDF899}"/>
+              </a:ext>
+            </a:extLst>
+          </p:cNvPr>
+          <p:cNvSpPr/>
+          <p:nvPr/>
+        </p:nvSpPr>
+        <p:spPr>
+          <a:xfrm>
+            <a:off x="16639" y="0"/>
+            <a:ext cx="3888000" cy="3384000"/>
+          </a:xfrm>
+          <a:prstGeom prst="rect">
+            <a:avLst/>
+          </a:prstGeom>
+          <a:solidFill>
+            <a:schemeClr val="bg1"/>
+          </a:solidFill>
+          <a:ln>
+            <a:solidFill>
+              <a:schemeClr val="tx1"/>
+            </a:solidFill>
+          </a:ln>
+        </p:spPr>
+        <p:style>
+          <a:lnRef idx="2">
+            <a:schemeClr val="accent1">
+              <a:shade val="15000"/>
+            </a:schemeClr>
+          </a:lnRef>
+          <a:fillRef idx="1">
+            <a:schemeClr val="accent1"/>
+          </a:fillRef>
+          <a:effectRef idx="0">
+            <a:schemeClr val="accent1"/>
+          </a:effectRef>
+          <a:fontRef idx="minor">
+            <a:schemeClr val="lt1"/>
+          </a:fontRef>
+        </p:style>
+        <p:txBody>
+          <a:bodyPr rtlCol="0" anchor="ctr"/>
+          <a:lstStyle/>
+          <a:p>
+            <a:pPr algn="ctr"/>
+            <a:r>
+              <a:rPr lang="en-GB" sz="3600" b="1" dirty="0">
+                <a:solidFill>
+                  <a:schemeClr val="tx1"/>
+                </a:solidFill>
+                <a:latin typeface="Ink Free" panose="03080402000500000000" pitchFamily="66" charset="0"/>
+              </a:rPr>
+              <a:t>Prisoner</a:t>
+            </a:r>
+          </a:p>
+          <a:p>
+            <a:pPr algn="ctr"/>
+            <a:r>
+              <a:rPr lang="en-GB" sz="3600" b="1" dirty="0">
+                <a:solidFill>
+                  <a:schemeClr val="tx1"/>
+                </a:solidFill>
+                <a:latin typeface="Ink Free" panose="03080402000500000000" pitchFamily="66" charset="0"/>
+              </a:rPr>
+              <a:t>Property</a:t>
+            </a:r>
+          </a:p>
+          <a:p>
+            <a:pPr algn="ctr"/>
+            <a:r>
+              <a:rPr lang="en-GB" sz="3600" b="1" dirty="0">
+                <a:solidFill>
+                  <a:schemeClr val="tx1"/>
+                </a:solidFill>
+                <a:latin typeface="Ink Free" panose="03080402000500000000" pitchFamily="66" charset="0"/>
+              </a:rPr>
+              <a:t>Log</a:t>
+            </a:r>
+          </a:p>
+          <a:p>
+            <a:pPr algn="ctr"/>
+            <a:endParaRPr lang="en-GB" sz="3600" b="1" dirty="0">
+              <a:solidFill>
+                <a:schemeClr val="tx1"/>
+              </a:solidFill>
+              <a:latin typeface="Ink Free" panose="03080402000500000000" pitchFamily="66" charset="0"/>
+            </a:endParaRPr>
+          </a:p>
+          <a:p>
+            <a:pPr algn="ctr"/>
+            <a:r>
+              <a:rPr lang="en-GB" sz="3600" b="1" dirty="0">
+                <a:solidFill>
+                  <a:schemeClr val="tx1"/>
+                </a:solidFill>
+                <a:latin typeface="Ink Free" panose="03080402000500000000" pitchFamily="66" charset="0"/>
+              </a:rPr>
+              <a:t>DO NOT REMOVE</a:t>
+            </a:r>
+          </a:p>
+        </p:txBody>
+      </p:sp>
+      <p:sp>
+        <p:nvSpPr>
+          <p:cNvPr id="3" name="Rectangle 2">
+            <a:extLst>
+              <a:ext uri="{FF2B5EF4-FFF2-40B4-BE49-F238E27FC236}">
+                <a16:creationId xmlns:a16="http://schemas.microsoft.com/office/drawing/2014/main" id="{D98F959B-C84B-9873-5029-8E2E022104EE}"/>
+              </a:ext>
+            </a:extLst>
+          </p:cNvPr>
+          <p:cNvSpPr/>
+          <p:nvPr/>
+        </p:nvSpPr>
+        <p:spPr>
+          <a:xfrm>
+            <a:off x="4420639" y="0"/>
+            <a:ext cx="1814400" cy="2890800"/>
+          </a:xfrm>
+          <a:prstGeom prst="rect">
+            <a:avLst/>
+          </a:prstGeom>
+          <a:solidFill>
+            <a:schemeClr val="bg1"/>
+          </a:solidFill>
+          <a:ln>
+            <a:solidFill>
+              <a:schemeClr val="tx1"/>
+            </a:solidFill>
+          </a:ln>
+        </p:spPr>
+        <p:style>
+          <a:lnRef idx="2">
+            <a:schemeClr val="accent1">
+              <a:shade val="15000"/>
+            </a:schemeClr>
+          </a:lnRef>
+          <a:fillRef idx="1">
+            <a:schemeClr val="accent1"/>
+          </a:fillRef>
+          <a:effectRef idx="0">
+            <a:schemeClr val="accent1"/>
+          </a:effectRef>
+          <a:fontRef idx="minor">
+            <a:schemeClr val="lt1"/>
+          </a:fontRef>
+        </p:style>
+        <p:txBody>
+          <a:bodyPr rtlCol="0" anchor="t"/>
+          <a:lstStyle/>
+          <a:p>
+            <a:pPr algn="ctr"/>
+            <a:r>
+              <a:rPr lang="en-GB" sz="3200" b="1" dirty="0">
+                <a:solidFill>
+                  <a:schemeClr val="tx1"/>
+                </a:solidFill>
+                <a:latin typeface="Ink Free" panose="03080402000500000000" pitchFamily="66" charset="0"/>
+              </a:rPr>
+              <a:t>Prisoner Property Log</a:t>
+            </a:r>
+          </a:p>
+          <a:p>
+            <a:pPr algn="ctr"/>
+            <a:endParaRPr lang="en-GB" sz="3200" b="1" dirty="0">
+              <a:solidFill>
+                <a:schemeClr val="tx1"/>
+              </a:solidFill>
+              <a:latin typeface="Ink Free" panose="03080402000500000000" pitchFamily="66" charset="0"/>
+            </a:endParaRPr>
+          </a:p>
+          <a:p>
+            <a:pPr algn="ctr"/>
+            <a:r>
+              <a:rPr lang="en-GB" sz="3200" b="1" dirty="0">
+                <a:solidFill>
+                  <a:schemeClr val="tx1"/>
+                </a:solidFill>
+                <a:latin typeface="Ink Free" panose="03080402000500000000" pitchFamily="66" charset="0"/>
+              </a:rPr>
+              <a:t>A to G</a:t>
+            </a:r>
+          </a:p>
+        </p:txBody>
+      </p:sp>
+      <p:sp>
+        <p:nvSpPr>
+          <p:cNvPr id="5" name="Rectangle 4">
+            <a:extLst>
+              <a:ext uri="{FF2B5EF4-FFF2-40B4-BE49-F238E27FC236}">
+                <a16:creationId xmlns:a16="http://schemas.microsoft.com/office/drawing/2014/main" id="{B2B5AB23-B448-DCD5-F814-E14DDDC39E92}"/>
+              </a:ext>
+            </a:extLst>
+          </p:cNvPr>
+          <p:cNvSpPr/>
+          <p:nvPr/>
+        </p:nvSpPr>
+        <p:spPr>
+          <a:xfrm>
+            <a:off x="6407701" y="0"/>
+            <a:ext cx="1814400" cy="2890800"/>
+          </a:xfrm>
+          <a:prstGeom prst="rect">
+            <a:avLst/>
+          </a:prstGeom>
+          <a:solidFill>
+            <a:schemeClr val="bg1"/>
+          </a:solidFill>
+          <a:ln>
+            <a:solidFill>
+              <a:schemeClr val="tx1"/>
+            </a:solidFill>
+          </a:ln>
+        </p:spPr>
+        <p:style>
+          <a:lnRef idx="2">
+            <a:schemeClr val="accent1">
+              <a:shade val="15000"/>
+            </a:schemeClr>
+          </a:lnRef>
+          <a:fillRef idx="1">
+            <a:schemeClr val="accent1"/>
+          </a:fillRef>
+          <a:effectRef idx="0">
+            <a:schemeClr val="accent1"/>
+          </a:effectRef>
+          <a:fontRef idx="minor">
+            <a:schemeClr val="lt1"/>
+          </a:fontRef>
+        </p:style>
+        <p:txBody>
+          <a:bodyPr rtlCol="0" anchor="t"/>
+          <a:lstStyle/>
+          <a:p>
+            <a:pPr algn="ctr"/>
+            <a:r>
+              <a:rPr lang="en-GB" sz="3200" b="1" dirty="0">
+                <a:solidFill>
+                  <a:schemeClr val="tx1"/>
+                </a:solidFill>
+                <a:latin typeface="Ink Free" panose="03080402000500000000" pitchFamily="66" charset="0"/>
+              </a:rPr>
+              <a:t>Prisoner Property Log</a:t>
+            </a:r>
+          </a:p>
+          <a:p>
+            <a:pPr algn="ctr"/>
+            <a:endParaRPr lang="en-GB" sz="3200" b="1" dirty="0">
+              <a:solidFill>
+                <a:schemeClr val="tx1"/>
+              </a:solidFill>
+              <a:latin typeface="Ink Free" panose="03080402000500000000" pitchFamily="66" charset="0"/>
+            </a:endParaRPr>
+          </a:p>
+          <a:p>
+            <a:pPr algn="ctr"/>
+            <a:r>
+              <a:rPr lang="en-GB" sz="3200" b="1" dirty="0">
+                <a:solidFill>
+                  <a:schemeClr val="tx1"/>
+                </a:solidFill>
+                <a:latin typeface="Ink Free" panose="03080402000500000000" pitchFamily="66" charset="0"/>
+              </a:rPr>
+              <a:t>H to M</a:t>
+            </a:r>
+          </a:p>
+        </p:txBody>
+      </p:sp>
+      <p:sp>
+        <p:nvSpPr>
+          <p:cNvPr id="6" name="Rectangle 5">
+            <a:extLst>
+              <a:ext uri="{FF2B5EF4-FFF2-40B4-BE49-F238E27FC236}">
+                <a16:creationId xmlns:a16="http://schemas.microsoft.com/office/drawing/2014/main" id="{0AA5D6CD-244B-1AF2-F9CC-13590DDFB58B}"/>
+              </a:ext>
+            </a:extLst>
+          </p:cNvPr>
+          <p:cNvSpPr/>
+          <p:nvPr/>
+        </p:nvSpPr>
+        <p:spPr>
+          <a:xfrm>
+            <a:off x="8328820" y="0"/>
+            <a:ext cx="1814400" cy="2890800"/>
+          </a:xfrm>
+          <a:prstGeom prst="rect">
+            <a:avLst/>
+          </a:prstGeom>
+          <a:solidFill>
+            <a:schemeClr val="bg1"/>
+          </a:solidFill>
+          <a:ln>
+            <a:solidFill>
+              <a:schemeClr val="tx1"/>
+            </a:solidFill>
+          </a:ln>
+        </p:spPr>
+        <p:style>
+          <a:lnRef idx="2">
+            <a:schemeClr val="accent1">
+              <a:shade val="15000"/>
+            </a:schemeClr>
+          </a:lnRef>
+          <a:fillRef idx="1">
+            <a:schemeClr val="accent1"/>
+          </a:fillRef>
+          <a:effectRef idx="0">
+            <a:schemeClr val="accent1"/>
+          </a:effectRef>
+          <a:fontRef idx="minor">
+            <a:schemeClr val="lt1"/>
+          </a:fontRef>
+        </p:style>
+        <p:txBody>
+          <a:bodyPr rtlCol="0" anchor="t"/>
+          <a:lstStyle/>
+          <a:p>
+            <a:pPr algn="ctr"/>
+            <a:r>
+              <a:rPr lang="en-GB" sz="3200" b="1" dirty="0">
+                <a:solidFill>
+                  <a:schemeClr val="tx1"/>
+                </a:solidFill>
+                <a:latin typeface="Ink Free" panose="03080402000500000000" pitchFamily="66" charset="0"/>
+              </a:rPr>
+              <a:t>Prisoner Property Log</a:t>
+            </a:r>
+          </a:p>
+          <a:p>
+            <a:pPr algn="ctr"/>
+            <a:endParaRPr lang="en-GB" sz="3200" b="1" dirty="0">
+              <a:solidFill>
+                <a:schemeClr val="tx1"/>
+              </a:solidFill>
+              <a:latin typeface="Ink Free" panose="03080402000500000000" pitchFamily="66" charset="0"/>
+            </a:endParaRPr>
+          </a:p>
+          <a:p>
+            <a:pPr algn="ctr"/>
+            <a:r>
+              <a:rPr lang="en-GB" sz="3200" b="1" dirty="0">
+                <a:solidFill>
+                  <a:schemeClr val="tx1"/>
+                </a:solidFill>
+                <a:latin typeface="Ink Free" panose="03080402000500000000" pitchFamily="66" charset="0"/>
+              </a:rPr>
+              <a:t>N to S</a:t>
+            </a:r>
+          </a:p>
+        </p:txBody>
+      </p:sp>
+      <p:sp>
+        <p:nvSpPr>
+          <p:cNvPr id="7" name="Rectangle 6">
+            <a:extLst>
+              <a:ext uri="{FF2B5EF4-FFF2-40B4-BE49-F238E27FC236}">
+                <a16:creationId xmlns:a16="http://schemas.microsoft.com/office/drawing/2014/main" id="{42900016-3906-3F54-B656-71124F0F5C9C}"/>
+              </a:ext>
+            </a:extLst>
+          </p:cNvPr>
+          <p:cNvSpPr/>
+          <p:nvPr/>
+        </p:nvSpPr>
+        <p:spPr>
+          <a:xfrm>
+            <a:off x="10189339" y="0"/>
+            <a:ext cx="1814400" cy="2890800"/>
+          </a:xfrm>
+          <a:prstGeom prst="rect">
+            <a:avLst/>
+          </a:prstGeom>
+          <a:solidFill>
+            <a:schemeClr val="bg1"/>
+          </a:solidFill>
+          <a:ln>
+            <a:solidFill>
+              <a:schemeClr val="tx1"/>
+            </a:solidFill>
+          </a:ln>
+        </p:spPr>
+        <p:style>
+          <a:lnRef idx="2">
+            <a:schemeClr val="accent1">
+              <a:shade val="15000"/>
+            </a:schemeClr>
+          </a:lnRef>
+          <a:fillRef idx="1">
+            <a:schemeClr val="accent1"/>
+          </a:fillRef>
+          <a:effectRef idx="0">
+            <a:schemeClr val="accent1"/>
+          </a:effectRef>
+          <a:fontRef idx="minor">
+            <a:schemeClr val="lt1"/>
+          </a:fontRef>
+        </p:style>
+        <p:txBody>
+          <a:bodyPr rtlCol="0" anchor="t"/>
+          <a:lstStyle/>
+          <a:p>
+            <a:pPr algn="ctr"/>
+            <a:r>
+              <a:rPr lang="en-GB" sz="3200" b="1" dirty="0">
+                <a:solidFill>
+                  <a:schemeClr val="tx1"/>
+                </a:solidFill>
+                <a:latin typeface="Ink Free" panose="03080402000500000000" pitchFamily="66" charset="0"/>
+              </a:rPr>
+              <a:t>Prisoner Property Log</a:t>
+            </a:r>
+          </a:p>
+          <a:p>
+            <a:pPr algn="ctr"/>
+            <a:endParaRPr lang="en-GB" sz="3200" b="1" dirty="0">
+              <a:solidFill>
+                <a:schemeClr val="tx1"/>
+              </a:solidFill>
+              <a:latin typeface="Ink Free" panose="03080402000500000000" pitchFamily="66" charset="0"/>
+            </a:endParaRPr>
+          </a:p>
+          <a:p>
+            <a:pPr algn="ctr"/>
+            <a:r>
+              <a:rPr lang="en-GB" sz="3200" b="1" dirty="0">
+                <a:solidFill>
+                  <a:schemeClr val="tx1"/>
+                </a:solidFill>
+                <a:latin typeface="Ink Free" panose="03080402000500000000" pitchFamily="66" charset="0"/>
+              </a:rPr>
+              <a:t>T to Z</a:t>
+            </a:r>
+          </a:p>
+        </p:txBody>
+      </p:sp>
+    </p:spTree>
+    <p:extLst>
+      <p:ext uri="{BB962C8B-B14F-4D97-AF65-F5344CB8AC3E}">
+        <p14:creationId xmlns:p14="http://schemas.microsoft.com/office/powerpoint/2010/main" val="753657027"/>
+      </p:ext>
+    </p:extLst>
+  </p:cSld>
+  <p:clrMapOvr>
+    <a:masterClrMapping/>
+  </p:clrMapOvr>
+</p:sld>
+</file>
+
+<file path=ppt/slides/slide14.xml><?xml version="1.0" encoding="utf-8"?>
+<p:sld xmlns:a="http://schemas.openxmlformats.org/drawingml/2006/main" xmlns:r="http://schemas.openxmlformats.org/officeDocument/2006/relationships" xmlns:p="http://schemas.openxmlformats.org/presentationml/2006/main">
+  <p:cSld>
+    <p:spTree>
+      <p:nvGrpSpPr>
+        <p:cNvPr id="1" name=""/>
+        <p:cNvGrpSpPr/>
+        <p:nvPr/>
+      </p:nvGrpSpPr>
+      <p:grpSpPr>
+        <a:xfrm>
+          <a:off x="0" y="0"/>
+          <a:ext cx="0" cy="0"/>
+          <a:chOff x="0" y="0"/>
+          <a:chExt cx="0" cy="0"/>
+        </a:xfrm>
+      </p:grpSpPr>
+      <p:sp>
+        <p:nvSpPr>
           <p:cNvPr id="2" name="Rectangle: Rounded Corners 1">
             <a:extLst>
               <a:ext uri="{FF2B5EF4-FFF2-40B4-BE49-F238E27FC236}">
@@ -7814,13 +7898,10 @@
           </a:prstGeom>
           <a:gradFill flip="none" rotWithShape="1">
             <a:gsLst>
-              <a:gs pos="0">
+              <a:gs pos="51000">
                 <a:schemeClr val="tx1"/>
               </a:gs>
-              <a:gs pos="69000">
-                <a:schemeClr val="tx1"/>
-              </a:gs>
-              <a:gs pos="97000">
+              <a:gs pos="100000">
                 <a:schemeClr val="bg1"/>
               </a:gs>
             </a:gsLst>

</xml_diff>